<commit_message>
feat: Completed Module 1 - Project Presentation documents
</commit_message>
<xml_diff>
--- a/Module 1 - Project Presentation/Quick Start Finance - Project Presentation.pptx
+++ b/Module 1 - Project Presentation/Quick Start Finance - Project Presentation.pptx
@@ -1,24 +1,24 @@
 
 <file path=ppt/presentation.xml><?xml version="1.0" encoding="utf-8"?>
-<p:presentation xmlns:a="http://schemas.openxmlformats.org/drawingml/2006/main" xmlns:r="http://schemas.openxmlformats.org/officeDocument/2006/relationships" xmlns:mc="http://schemas.openxmlformats.org/markup-compatibility/2006" xmlns:mv="urn:schemas-microsoft-com:mac:vml" xmlns:p="http://schemas.openxmlformats.org/presentationml/2006/main" xmlns:c="http://schemas.openxmlformats.org/drawingml/2006/chart" xmlns:dgm="http://schemas.openxmlformats.org/drawingml/2006/diagram" xmlns:o="urn:schemas-microsoft-com:office:office" xmlns:v="urn:schemas-microsoft-com:vml" xmlns:pvml="urn:schemas-microsoft-com:office:powerpoint" xmlns:com="http://schemas.openxmlformats.org/drawingml/2006/compatibility" xmlns:p14="http://schemas.microsoft.com/office/powerpoint/2010/main" xmlns:p15="http://schemas.microsoft.com/office/powerpoint/2012/main" xmlns:ahyp="http://schemas.microsoft.com/office/drawing/2018/hyperlinkcolor" autoCompressPictures="0" strictFirstAndLastChars="0" saveSubsetFonts="1">
+<p:presentation xmlns:a="http://schemas.openxmlformats.org/drawingml/2006/main" xmlns:r="http://schemas.openxmlformats.org/officeDocument/2006/relationships" xmlns:p="http://schemas.openxmlformats.org/presentationml/2006/main" strictFirstAndLastChars="0" saveSubsetFonts="1" autoCompressPictures="0">
   <p:sldMasterIdLst>
-    <p:sldMasterId id="2147483659" r:id="rId4"/>
+    <p:sldMasterId id="2147483659" r:id="rId1"/>
   </p:sldMasterIdLst>
   <p:notesMasterIdLst>
-    <p:notesMasterId r:id="rId5"/>
+    <p:notesMasterId r:id="rId8"/>
   </p:notesMasterIdLst>
   <p:sldIdLst>
-    <p:sldId id="256" r:id="rId6"/>
-    <p:sldId id="257" r:id="rId7"/>
-    <p:sldId id="258" r:id="rId8"/>
-    <p:sldId id="259" r:id="rId9"/>
-    <p:sldId id="260" r:id="rId10"/>
-    <p:sldId id="261" r:id="rId11"/>
+    <p:sldId id="256" r:id="rId2"/>
+    <p:sldId id="257" r:id="rId3"/>
+    <p:sldId id="258" r:id="rId4"/>
+    <p:sldId id="259" r:id="rId5"/>
+    <p:sldId id="260" r:id="rId6"/>
+    <p:sldId id="261" r:id="rId7"/>
   </p:sldIdLst>
-  <p:sldSz cy="5143500" cx="9144000"/>
+  <p:sldSz cx="9144000" cy="5143500" type="screen16x9"/>
   <p:notesSz cx="6858000" cy="9144000"/>
   <p:defaultTextStyle>
-    <a:defPPr lvl="0" marR="0" rtl="0" algn="l">
+    <a:defPPr marR="0" lvl="0" algn="l" rtl="0">
       <a:lnSpc>
         <a:spcPct val="100000"/>
       </a:lnSpc>
@@ -29,7 +29,7 @@
         <a:spcPts val="0"/>
       </a:spcAft>
     </a:defPPr>
-    <a:lvl1pPr lvl="0" marR="0" rtl="0" algn="l">
+    <a:lvl1pPr marR="0" lvl="0" algn="l" rtl="0">
       <a:lnSpc>
         <a:spcPct val="100000"/>
       </a:lnSpc>
@@ -43,7 +43,7 @@
         <a:srgbClr val="000000"/>
       </a:buClr>
       <a:buFont typeface="Arial"/>
-      <a:defRPr b="0" i="0" sz="1400" u="none" cap="none" strike="noStrike">
+      <a:defRPr sz="1400" b="0" i="0" u="none" strike="noStrike" cap="none">
         <a:solidFill>
           <a:srgbClr val="000000"/>
         </a:solidFill>
@@ -53,7 +53,7 @@
         <a:sym typeface="Arial"/>
       </a:defRPr>
     </a:lvl1pPr>
-    <a:lvl2pPr lvl="1" marR="0" rtl="0" algn="l">
+    <a:lvl2pPr marR="0" lvl="1" algn="l" rtl="0">
       <a:lnSpc>
         <a:spcPct val="100000"/>
       </a:lnSpc>
@@ -67,7 +67,7 @@
         <a:srgbClr val="000000"/>
       </a:buClr>
       <a:buFont typeface="Arial"/>
-      <a:defRPr b="0" i="0" sz="1400" u="none" cap="none" strike="noStrike">
+      <a:defRPr sz="1400" b="0" i="0" u="none" strike="noStrike" cap="none">
         <a:solidFill>
           <a:srgbClr val="000000"/>
         </a:solidFill>
@@ -77,7 +77,7 @@
         <a:sym typeface="Arial"/>
       </a:defRPr>
     </a:lvl2pPr>
-    <a:lvl3pPr lvl="2" marR="0" rtl="0" algn="l">
+    <a:lvl3pPr marR="0" lvl="2" algn="l" rtl="0">
       <a:lnSpc>
         <a:spcPct val="100000"/>
       </a:lnSpc>
@@ -91,7 +91,7 @@
         <a:srgbClr val="000000"/>
       </a:buClr>
       <a:buFont typeface="Arial"/>
-      <a:defRPr b="0" i="0" sz="1400" u="none" cap="none" strike="noStrike">
+      <a:defRPr sz="1400" b="0" i="0" u="none" strike="noStrike" cap="none">
         <a:solidFill>
           <a:srgbClr val="000000"/>
         </a:solidFill>
@@ -101,7 +101,7 @@
         <a:sym typeface="Arial"/>
       </a:defRPr>
     </a:lvl3pPr>
-    <a:lvl4pPr lvl="3" marR="0" rtl="0" algn="l">
+    <a:lvl4pPr marR="0" lvl="3" algn="l" rtl="0">
       <a:lnSpc>
         <a:spcPct val="100000"/>
       </a:lnSpc>
@@ -115,7 +115,7 @@
         <a:srgbClr val="000000"/>
       </a:buClr>
       <a:buFont typeface="Arial"/>
-      <a:defRPr b="0" i="0" sz="1400" u="none" cap="none" strike="noStrike">
+      <a:defRPr sz="1400" b="0" i="0" u="none" strike="noStrike" cap="none">
         <a:solidFill>
           <a:srgbClr val="000000"/>
         </a:solidFill>
@@ -125,7 +125,7 @@
         <a:sym typeface="Arial"/>
       </a:defRPr>
     </a:lvl4pPr>
-    <a:lvl5pPr lvl="4" marR="0" rtl="0" algn="l">
+    <a:lvl5pPr marR="0" lvl="4" algn="l" rtl="0">
       <a:lnSpc>
         <a:spcPct val="100000"/>
       </a:lnSpc>
@@ -139,7 +139,7 @@
         <a:srgbClr val="000000"/>
       </a:buClr>
       <a:buFont typeface="Arial"/>
-      <a:defRPr b="0" i="0" sz="1400" u="none" cap="none" strike="noStrike">
+      <a:defRPr sz="1400" b="0" i="0" u="none" strike="noStrike" cap="none">
         <a:solidFill>
           <a:srgbClr val="000000"/>
         </a:solidFill>
@@ -149,7 +149,7 @@
         <a:sym typeface="Arial"/>
       </a:defRPr>
     </a:lvl5pPr>
-    <a:lvl6pPr lvl="5" marR="0" rtl="0" algn="l">
+    <a:lvl6pPr marR="0" lvl="5" algn="l" rtl="0">
       <a:lnSpc>
         <a:spcPct val="100000"/>
       </a:lnSpc>
@@ -163,7 +163,7 @@
         <a:srgbClr val="000000"/>
       </a:buClr>
       <a:buFont typeface="Arial"/>
-      <a:defRPr b="0" i="0" sz="1400" u="none" cap="none" strike="noStrike">
+      <a:defRPr sz="1400" b="0" i="0" u="none" strike="noStrike" cap="none">
         <a:solidFill>
           <a:srgbClr val="000000"/>
         </a:solidFill>
@@ -173,7 +173,7 @@
         <a:sym typeface="Arial"/>
       </a:defRPr>
     </a:lvl6pPr>
-    <a:lvl7pPr lvl="6" marR="0" rtl="0" algn="l">
+    <a:lvl7pPr marR="0" lvl="6" algn="l" rtl="0">
       <a:lnSpc>
         <a:spcPct val="100000"/>
       </a:lnSpc>
@@ -187,7 +187,7 @@
         <a:srgbClr val="000000"/>
       </a:buClr>
       <a:buFont typeface="Arial"/>
-      <a:defRPr b="0" i="0" sz="1400" u="none" cap="none" strike="noStrike">
+      <a:defRPr sz="1400" b="0" i="0" u="none" strike="noStrike" cap="none">
         <a:solidFill>
           <a:srgbClr val="000000"/>
         </a:solidFill>
@@ -197,7 +197,7 @@
         <a:sym typeface="Arial"/>
       </a:defRPr>
     </a:lvl7pPr>
-    <a:lvl8pPr lvl="7" marR="0" rtl="0" algn="l">
+    <a:lvl8pPr marR="0" lvl="7" algn="l" rtl="0">
       <a:lnSpc>
         <a:spcPct val="100000"/>
       </a:lnSpc>
@@ -211,7 +211,7 @@
         <a:srgbClr val="000000"/>
       </a:buClr>
       <a:buFont typeface="Arial"/>
-      <a:defRPr b="0" i="0" sz="1400" u="none" cap="none" strike="noStrike">
+      <a:defRPr sz="1400" b="0" i="0" u="none" strike="noStrike" cap="none">
         <a:solidFill>
           <a:srgbClr val="000000"/>
         </a:solidFill>
@@ -221,7 +221,7 @@
         <a:sym typeface="Arial"/>
       </a:defRPr>
     </a:lvl8pPr>
-    <a:lvl9pPr lvl="8" marR="0" rtl="0" algn="l">
+    <a:lvl9pPr marR="0" lvl="8" algn="l" rtl="0">
       <a:lnSpc>
         <a:spcPct val="100000"/>
       </a:lnSpc>
@@ -235,7 +235,7 @@
         <a:srgbClr val="000000"/>
       </a:buClr>
       <a:buFont typeface="Arial"/>
-      <a:defRPr b="0" i="0" sz="1400" u="none" cap="none" strike="noStrike">
+      <a:defRPr sz="1400" b="0" i="0" u="none" strike="noStrike" cap="none">
         <a:solidFill>
           <a:srgbClr val="000000"/>
         </a:solidFill>
@@ -248,7 +248,7 @@
   </p:defaultTextStyle>
   <p:extLst>
     <p:ext uri="{EFAFB233-063F-42B5-8137-9DF3F51BA10A}">
-      <p15:sldGuideLst>
+      <p15:sldGuideLst xmlns:p15="http://schemas.microsoft.com/office/powerpoint/2012/main">
         <p15:guide id="1" orient="horz" pos="1620">
           <p15:clr>
             <a:srgbClr val="A4A3A4"/>
@@ -266,11 +266,16 @@
 </file>
 
 <file path=ppt/notesMasters/notesMaster1.xml><?xml version="1.0" encoding="utf-8"?>
-<p:notesMaster xmlns:a="http://schemas.openxmlformats.org/drawingml/2006/main" xmlns:r="http://schemas.openxmlformats.org/officeDocument/2006/relationships" xmlns:mc="http://schemas.openxmlformats.org/markup-compatibility/2006" xmlns:mv="urn:schemas-microsoft-com:mac:vml" xmlns:p="http://schemas.openxmlformats.org/presentationml/2006/main" xmlns:c="http://schemas.openxmlformats.org/drawingml/2006/chart" xmlns:dgm="http://schemas.openxmlformats.org/drawingml/2006/diagram" xmlns:o="urn:schemas-microsoft-com:office:office" xmlns:v="urn:schemas-microsoft-com:vml" xmlns:pvml="urn:schemas-microsoft-com:office:powerpoint" xmlns:com="http://schemas.openxmlformats.org/drawingml/2006/compatibility" xmlns:p14="http://schemas.microsoft.com/office/powerpoint/2010/main" xmlns:p15="http://schemas.microsoft.com/office/powerpoint/2012/main" xmlns:ahyp="http://schemas.microsoft.com/office/drawing/2018/hyperlinkcolor">
+<p:notesMaster xmlns:a="http://schemas.openxmlformats.org/drawingml/2006/main" xmlns:r="http://schemas.openxmlformats.org/officeDocument/2006/relationships" xmlns:p="http://schemas.openxmlformats.org/presentationml/2006/main">
   <p:cSld>
+    <p:bg>
+      <p:bgRef idx="1001">
+        <a:schemeClr val="bg1"/>
+      </p:bgRef>
+    </p:bg>
     <p:spTree>
       <p:nvGrpSpPr>
-        <p:cNvPr id="2" name="Shape 2"/>
+        <p:cNvPr id="1" name="Shape 2"/>
         <p:cNvGrpSpPr/>
         <p:nvPr/>
       </p:nvGrpSpPr>
@@ -285,9 +290,11 @@
       <p:sp>
         <p:nvSpPr>
           <p:cNvPr id="3" name="Google Shape;3;n"/>
-          <p:cNvSpPr/>
+          <p:cNvSpPr>
+            <a:spLocks noGrp="1" noRot="1" noChangeAspect="1"/>
+          </p:cNvSpPr>
           <p:nvPr>
-            <p:ph idx="2" type="sldImg"/>
+            <p:ph type="sldImg" idx="2"/>
           </p:nvPr>
         </p:nvSpPr>
         <p:spPr>
@@ -296,9 +303,13 @@
             <a:ext cx="6096075" cy="3429000"/>
           </a:xfrm>
           <a:custGeom>
-            <a:rect b="b" l="l" r="r" t="t"/>
+            <a:avLst/>
+            <a:gdLst/>
+            <a:ahLst/>
+            <a:cxnLst/>
+            <a:rect l="l" t="t" r="r" b="b"/>
             <a:pathLst>
-              <a:path extrusionOk="0" h="120000" w="120000">
+              <a:path w="120000" h="120000" extrusionOk="0">
                 <a:moveTo>
                   <a:pt x="0" y="0"/>
                 </a:moveTo>
@@ -316,23 +327,25 @@
             </a:pathLst>
           </a:custGeom>
           <a:noFill/>
-          <a:ln cap="flat" cmpd="sng" w="9525">
+          <a:ln w="9525" cap="flat" cmpd="sng">
             <a:solidFill>
               <a:srgbClr val="000000"/>
             </a:solidFill>
             <a:prstDash val="solid"/>
             <a:round/>
-            <a:headEnd len="sm" w="sm" type="none"/>
-            <a:tailEnd len="sm" w="sm" type="none"/>
+            <a:headEnd type="none" w="sm" len="sm"/>
+            <a:tailEnd type="none" w="sm" len="sm"/>
           </a:ln>
         </p:spPr>
       </p:sp>
       <p:sp>
         <p:nvSpPr>
           <p:cNvPr id="4" name="Google Shape;4;n"/>
-          <p:cNvSpPr txBox="1"/>
+          <p:cNvSpPr txBox="1">
+            <a:spLocks noGrp="1"/>
+          </p:cNvSpPr>
           <p:nvPr>
-            <p:ph idx="1" type="body"/>
+            <p:ph type="body" idx="1"/>
           </p:nvPr>
         </p:nvSpPr>
         <p:spPr>
@@ -349,11 +362,11 @@
           </a:ln>
         </p:spPr>
         <p:txBody>
-          <a:bodyPr anchorCtr="0" anchor="t" bIns="91425" lIns="91425" spcFirstLastPara="1" rIns="91425" wrap="square" tIns="91425">
+          <a:bodyPr spcFirstLastPara="1" wrap="square" lIns="91425" tIns="91425" rIns="91425" bIns="91425" anchor="t" anchorCtr="0">
             <a:noAutofit/>
           </a:bodyPr>
           <a:lstStyle>
-            <a:lvl1pPr indent="-298450" lvl="0" marL="457200">
+            <a:lvl1pPr marL="457200" lvl="0" indent="-298450">
               <a:spcBef>
                 <a:spcPts val="0"/>
               </a:spcBef>
@@ -364,7 +377,7 @@
               <a:buChar char="●"/>
               <a:defRPr sz="1100"/>
             </a:lvl1pPr>
-            <a:lvl2pPr indent="-298450" lvl="1" marL="914400">
+            <a:lvl2pPr marL="914400" lvl="1" indent="-298450">
               <a:spcBef>
                 <a:spcPts val="0"/>
               </a:spcBef>
@@ -375,7 +388,7 @@
               <a:buChar char="○"/>
               <a:defRPr sz="1100"/>
             </a:lvl2pPr>
-            <a:lvl3pPr indent="-298450" lvl="2" marL="1371600">
+            <a:lvl3pPr marL="1371600" lvl="2" indent="-298450">
               <a:spcBef>
                 <a:spcPts val="0"/>
               </a:spcBef>
@@ -386,7 +399,7 @@
               <a:buChar char="■"/>
               <a:defRPr sz="1100"/>
             </a:lvl3pPr>
-            <a:lvl4pPr indent="-298450" lvl="3" marL="1828800">
+            <a:lvl4pPr marL="1828800" lvl="3" indent="-298450">
               <a:spcBef>
                 <a:spcPts val="0"/>
               </a:spcBef>
@@ -397,7 +410,7 @@
               <a:buChar char="●"/>
               <a:defRPr sz="1100"/>
             </a:lvl4pPr>
-            <a:lvl5pPr indent="-298450" lvl="4" marL="2286000">
+            <a:lvl5pPr marL="2286000" lvl="4" indent="-298450">
               <a:spcBef>
                 <a:spcPts val="0"/>
               </a:spcBef>
@@ -408,7 +421,7 @@
               <a:buChar char="○"/>
               <a:defRPr sz="1100"/>
             </a:lvl5pPr>
-            <a:lvl6pPr indent="-298450" lvl="5" marL="2743200">
+            <a:lvl6pPr marL="2743200" lvl="5" indent="-298450">
               <a:spcBef>
                 <a:spcPts val="0"/>
               </a:spcBef>
@@ -419,7 +432,7 @@
               <a:buChar char="■"/>
               <a:defRPr sz="1100"/>
             </a:lvl6pPr>
-            <a:lvl7pPr indent="-298450" lvl="6" marL="3200400">
+            <a:lvl7pPr marL="3200400" lvl="6" indent="-298450">
               <a:spcBef>
                 <a:spcPts val="0"/>
               </a:spcBef>
@@ -430,7 +443,7 @@
               <a:buChar char="●"/>
               <a:defRPr sz="1100"/>
             </a:lvl7pPr>
-            <a:lvl8pPr indent="-298450" lvl="7" marL="3657600">
+            <a:lvl8pPr marL="3657600" lvl="7" indent="-298450">
               <a:spcBef>
                 <a:spcPts val="0"/>
               </a:spcBef>
@@ -441,7 +454,7 @@
               <a:buChar char="○"/>
               <a:defRPr sz="1100"/>
             </a:lvl8pPr>
-            <a:lvl9pPr indent="-298450" lvl="8" marL="4114800">
+            <a:lvl9pPr marL="4114800" lvl="8" indent="-298450">
               <a:spcBef>
                 <a:spcPts val="0"/>
               </a:spcBef>
@@ -453,14 +466,16 @@
               <a:defRPr sz="1100"/>
             </a:lvl9pPr>
           </a:lstStyle>
-          <a:p/>
+          <a:p>
+            <a:endParaRPr/>
+          </a:p>
         </p:txBody>
       </p:sp>
     </p:spTree>
   </p:cSld>
-  <p:clrMap accent1="accent1" accent2="accent2" accent3="accent3" accent4="accent4" accent5="accent5" accent6="accent6" bg1="lt1" bg2="dk2" tx1="dk1" tx2="lt2" folHlink="folHlink" hlink="hlink"/>
+  <p:clrMap bg1="lt1" tx1="dk1" bg2="dk2" tx2="lt2" accent1="accent1" accent2="accent2" accent3="accent3" accent4="accent4" accent5="accent5" accent6="accent6" hlink="hlink" folHlink="folHlink"/>
   <p:notesStyle>
-    <a:defPPr lvl="0" marR="0" rtl="0" algn="l">
+    <a:defPPr marR="0" lvl="0" algn="l" rtl="0">
       <a:lnSpc>
         <a:spcPct val="100000"/>
       </a:lnSpc>
@@ -471,7 +486,7 @@
         <a:spcPts val="0"/>
       </a:spcAft>
     </a:defPPr>
-    <a:lvl1pPr lvl="0" marR="0" rtl="0" algn="l">
+    <a:lvl1pPr marR="0" lvl="0" algn="l" rtl="0">
       <a:lnSpc>
         <a:spcPct val="100000"/>
       </a:lnSpc>
@@ -485,7 +500,7 @@
         <a:srgbClr val="000000"/>
       </a:buClr>
       <a:buFont typeface="Arial"/>
-      <a:defRPr b="0" i="0" sz="1400" u="none" cap="none" strike="noStrike">
+      <a:defRPr sz="1400" b="0" i="0" u="none" strike="noStrike" cap="none">
         <a:solidFill>
           <a:srgbClr val="000000"/>
         </a:solidFill>
@@ -495,7 +510,7 @@
         <a:sym typeface="Arial"/>
       </a:defRPr>
     </a:lvl1pPr>
-    <a:lvl2pPr lvl="1" marR="0" rtl="0" algn="l">
+    <a:lvl2pPr marR="0" lvl="1" algn="l" rtl="0">
       <a:lnSpc>
         <a:spcPct val="100000"/>
       </a:lnSpc>
@@ -509,7 +524,7 @@
         <a:srgbClr val="000000"/>
       </a:buClr>
       <a:buFont typeface="Arial"/>
-      <a:defRPr b="0" i="0" sz="1400" u="none" cap="none" strike="noStrike">
+      <a:defRPr sz="1400" b="0" i="0" u="none" strike="noStrike" cap="none">
         <a:solidFill>
           <a:srgbClr val="000000"/>
         </a:solidFill>
@@ -519,7 +534,7 @@
         <a:sym typeface="Arial"/>
       </a:defRPr>
     </a:lvl2pPr>
-    <a:lvl3pPr lvl="2" marR="0" rtl="0" algn="l">
+    <a:lvl3pPr marR="0" lvl="2" algn="l" rtl="0">
       <a:lnSpc>
         <a:spcPct val="100000"/>
       </a:lnSpc>
@@ -533,7 +548,7 @@
         <a:srgbClr val="000000"/>
       </a:buClr>
       <a:buFont typeface="Arial"/>
-      <a:defRPr b="0" i="0" sz="1400" u="none" cap="none" strike="noStrike">
+      <a:defRPr sz="1400" b="0" i="0" u="none" strike="noStrike" cap="none">
         <a:solidFill>
           <a:srgbClr val="000000"/>
         </a:solidFill>
@@ -543,7 +558,7 @@
         <a:sym typeface="Arial"/>
       </a:defRPr>
     </a:lvl3pPr>
-    <a:lvl4pPr lvl="3" marR="0" rtl="0" algn="l">
+    <a:lvl4pPr marR="0" lvl="3" algn="l" rtl="0">
       <a:lnSpc>
         <a:spcPct val="100000"/>
       </a:lnSpc>
@@ -557,7 +572,7 @@
         <a:srgbClr val="000000"/>
       </a:buClr>
       <a:buFont typeface="Arial"/>
-      <a:defRPr b="0" i="0" sz="1400" u="none" cap="none" strike="noStrike">
+      <a:defRPr sz="1400" b="0" i="0" u="none" strike="noStrike" cap="none">
         <a:solidFill>
           <a:srgbClr val="000000"/>
         </a:solidFill>
@@ -567,7 +582,7 @@
         <a:sym typeface="Arial"/>
       </a:defRPr>
     </a:lvl4pPr>
-    <a:lvl5pPr lvl="4" marR="0" rtl="0" algn="l">
+    <a:lvl5pPr marR="0" lvl="4" algn="l" rtl="0">
       <a:lnSpc>
         <a:spcPct val="100000"/>
       </a:lnSpc>
@@ -581,7 +596,7 @@
         <a:srgbClr val="000000"/>
       </a:buClr>
       <a:buFont typeface="Arial"/>
-      <a:defRPr b="0" i="0" sz="1400" u="none" cap="none" strike="noStrike">
+      <a:defRPr sz="1400" b="0" i="0" u="none" strike="noStrike" cap="none">
         <a:solidFill>
           <a:srgbClr val="000000"/>
         </a:solidFill>
@@ -591,7 +606,7 @@
         <a:sym typeface="Arial"/>
       </a:defRPr>
     </a:lvl5pPr>
-    <a:lvl6pPr lvl="5" marR="0" rtl="0" algn="l">
+    <a:lvl6pPr marR="0" lvl="5" algn="l" rtl="0">
       <a:lnSpc>
         <a:spcPct val="100000"/>
       </a:lnSpc>
@@ -605,7 +620,7 @@
         <a:srgbClr val="000000"/>
       </a:buClr>
       <a:buFont typeface="Arial"/>
-      <a:defRPr b="0" i="0" sz="1400" u="none" cap="none" strike="noStrike">
+      <a:defRPr sz="1400" b="0" i="0" u="none" strike="noStrike" cap="none">
         <a:solidFill>
           <a:srgbClr val="000000"/>
         </a:solidFill>
@@ -615,7 +630,7 @@
         <a:sym typeface="Arial"/>
       </a:defRPr>
     </a:lvl6pPr>
-    <a:lvl7pPr lvl="6" marR="0" rtl="0" algn="l">
+    <a:lvl7pPr marR="0" lvl="6" algn="l" rtl="0">
       <a:lnSpc>
         <a:spcPct val="100000"/>
       </a:lnSpc>
@@ -629,7 +644,7 @@
         <a:srgbClr val="000000"/>
       </a:buClr>
       <a:buFont typeface="Arial"/>
-      <a:defRPr b="0" i="0" sz="1400" u="none" cap="none" strike="noStrike">
+      <a:defRPr sz="1400" b="0" i="0" u="none" strike="noStrike" cap="none">
         <a:solidFill>
           <a:srgbClr val="000000"/>
         </a:solidFill>
@@ -639,7 +654,7 @@
         <a:sym typeface="Arial"/>
       </a:defRPr>
     </a:lvl7pPr>
-    <a:lvl8pPr lvl="7" marR="0" rtl="0" algn="l">
+    <a:lvl8pPr marR="0" lvl="7" algn="l" rtl="0">
       <a:lnSpc>
         <a:spcPct val="100000"/>
       </a:lnSpc>
@@ -653,7 +668,7 @@
         <a:srgbClr val="000000"/>
       </a:buClr>
       <a:buFont typeface="Arial"/>
-      <a:defRPr b="0" i="0" sz="1400" u="none" cap="none" strike="noStrike">
+      <a:defRPr sz="1400" b="0" i="0" u="none" strike="noStrike" cap="none">
         <a:solidFill>
           <a:srgbClr val="000000"/>
         </a:solidFill>
@@ -663,7 +678,7 @@
         <a:sym typeface="Arial"/>
       </a:defRPr>
     </a:lvl8pPr>
-    <a:lvl9pPr lvl="8" marR="0" rtl="0" algn="l">
+    <a:lvl9pPr marR="0" lvl="8" algn="l" rtl="0">
       <a:lnSpc>
         <a:spcPct val="100000"/>
       </a:lnSpc>
@@ -677,7 +692,7 @@
         <a:srgbClr val="000000"/>
       </a:buClr>
       <a:buFont typeface="Arial"/>
-      <a:defRPr b="0" i="0" sz="1400" u="none" cap="none" strike="noStrike">
+      <a:defRPr sz="1400" b="0" i="0" u="none" strike="noStrike" cap="none">
         <a:solidFill>
           <a:srgbClr val="000000"/>
         </a:solidFill>
@@ -692,11 +707,11 @@
 </file>
 
 <file path=ppt/notesSlides/notesSlide1.xml><?xml version="1.0" encoding="utf-8"?>
-<p:notes xmlns:a="http://schemas.openxmlformats.org/drawingml/2006/main" xmlns:r="http://schemas.openxmlformats.org/officeDocument/2006/relationships" xmlns:mc="http://schemas.openxmlformats.org/markup-compatibility/2006" xmlns:mv="urn:schemas-microsoft-com:mac:vml" xmlns:p="http://schemas.openxmlformats.org/presentationml/2006/main" xmlns:c="http://schemas.openxmlformats.org/drawingml/2006/chart" xmlns:dgm="http://schemas.openxmlformats.org/drawingml/2006/diagram" xmlns:o="urn:schemas-microsoft-com:office:office" xmlns:v="urn:schemas-microsoft-com:vml" xmlns:pvml="urn:schemas-microsoft-com:office:powerpoint" xmlns:com="http://schemas.openxmlformats.org/drawingml/2006/compatibility" xmlns:p14="http://schemas.microsoft.com/office/powerpoint/2010/main" xmlns:p15="http://schemas.microsoft.com/office/powerpoint/2012/main" xmlns:ahyp="http://schemas.microsoft.com/office/drawing/2018/hyperlinkcolor" showMasterPhAnim="0" showMasterSp="0">
+<p:notes xmlns:a="http://schemas.openxmlformats.org/drawingml/2006/main" xmlns:r="http://schemas.openxmlformats.org/officeDocument/2006/relationships" xmlns:p="http://schemas.openxmlformats.org/presentationml/2006/main" showMasterSp="0" showMasterPhAnim="0">
   <p:cSld>
     <p:spTree>
       <p:nvGrpSpPr>
-        <p:cNvPr id="50" name="Shape 50"/>
+        <p:cNvPr id="1" name="Shape 50"/>
         <p:cNvGrpSpPr/>
         <p:nvPr/>
       </p:nvGrpSpPr>
@@ -711,9 +726,11 @@
       <p:sp>
         <p:nvSpPr>
           <p:cNvPr id="51" name="Google Shape;51;g178eee333d0_0_498:notes"/>
-          <p:cNvSpPr/>
+          <p:cNvSpPr>
+            <a:spLocks noGrp="1" noRot="1" noChangeAspect="1"/>
+          </p:cNvSpPr>
           <p:nvPr>
-            <p:ph idx="2" type="sldImg"/>
+            <p:ph type="sldImg" idx="2"/>
           </p:nvPr>
         </p:nvSpPr>
         <p:spPr>
@@ -722,9 +739,13 @@
             <a:ext cx="6096000" cy="3429000"/>
           </a:xfrm>
           <a:custGeom>
-            <a:rect b="b" l="l" r="r" t="t"/>
+            <a:avLst/>
+            <a:gdLst/>
+            <a:ahLst/>
+            <a:cxnLst/>
+            <a:rect l="l" t="t" r="r" b="b"/>
             <a:pathLst>
-              <a:path extrusionOk="0" h="120000" w="120000">
+              <a:path w="120000" h="120000" extrusionOk="0">
                 <a:moveTo>
                   <a:pt x="0" y="0"/>
                 </a:moveTo>
@@ -746,9 +767,11 @@
       <p:sp>
         <p:nvSpPr>
           <p:cNvPr id="52" name="Google Shape;52;g178eee333d0_0_498:notes"/>
-          <p:cNvSpPr txBox="1"/>
+          <p:cNvSpPr txBox="1">
+            <a:spLocks noGrp="1"/>
+          </p:cNvSpPr>
           <p:nvPr>
-            <p:ph idx="1" type="body"/>
+            <p:ph type="body" idx="1"/>
           </p:nvPr>
         </p:nvSpPr>
         <p:spPr>
@@ -761,12 +784,12 @@
           </a:prstGeom>
         </p:spPr>
         <p:txBody>
-          <a:bodyPr anchorCtr="0" anchor="t" bIns="91425" lIns="91425" spcFirstLastPara="1" rIns="91425" wrap="square" tIns="91425">
+          <a:bodyPr spcFirstLastPara="1" wrap="square" lIns="91425" tIns="91425" rIns="91425" bIns="91425" anchor="t" anchorCtr="0">
             <a:noAutofit/>
           </a:bodyPr>
           <a:lstStyle/>
           <a:p>
-            <a:pPr indent="0" lvl="0" marL="0" rtl="0" algn="l">
+            <a:pPr marL="0" lvl="0" indent="0" algn="l" rtl="0">
               <a:spcBef>
                 <a:spcPts val="0"/>
               </a:spcBef>
@@ -775,9 +798,6 @@
               </a:spcAft>
               <a:buNone/>
             </a:pPr>
-            <a:r>
-              <a:t/>
-            </a:r>
             <a:endParaRPr/>
           </a:p>
         </p:txBody>
@@ -791,11 +811,11 @@
 </file>
 
 <file path=ppt/notesSlides/notesSlide2.xml><?xml version="1.0" encoding="utf-8"?>
-<p:notes xmlns:a="http://schemas.openxmlformats.org/drawingml/2006/main" xmlns:r="http://schemas.openxmlformats.org/officeDocument/2006/relationships" xmlns:mc="http://schemas.openxmlformats.org/markup-compatibility/2006" xmlns:mv="urn:schemas-microsoft-com:mac:vml" xmlns:p="http://schemas.openxmlformats.org/presentationml/2006/main" xmlns:c="http://schemas.openxmlformats.org/drawingml/2006/chart" xmlns:dgm="http://schemas.openxmlformats.org/drawingml/2006/diagram" xmlns:o="urn:schemas-microsoft-com:office:office" xmlns:v="urn:schemas-microsoft-com:vml" xmlns:pvml="urn:schemas-microsoft-com:office:powerpoint" xmlns:com="http://schemas.openxmlformats.org/drawingml/2006/compatibility" xmlns:p14="http://schemas.microsoft.com/office/powerpoint/2010/main" xmlns:p15="http://schemas.microsoft.com/office/powerpoint/2012/main" xmlns:ahyp="http://schemas.microsoft.com/office/drawing/2018/hyperlinkcolor" showMasterPhAnim="0" showMasterSp="0">
+<p:notes xmlns:a="http://schemas.openxmlformats.org/drawingml/2006/main" xmlns:r="http://schemas.openxmlformats.org/officeDocument/2006/relationships" xmlns:p="http://schemas.openxmlformats.org/presentationml/2006/main" showMasterSp="0" showMasterPhAnim="0">
   <p:cSld>
     <p:spTree>
       <p:nvGrpSpPr>
-        <p:cNvPr id="56" name="Shape 56"/>
+        <p:cNvPr id="1" name="Shape 56"/>
         <p:cNvGrpSpPr/>
         <p:nvPr/>
       </p:nvGrpSpPr>
@@ -810,9 +830,11 @@
       <p:sp>
         <p:nvSpPr>
           <p:cNvPr id="57" name="Google Shape;57;g17e1a264188_0_9:notes"/>
-          <p:cNvSpPr/>
+          <p:cNvSpPr>
+            <a:spLocks noGrp="1" noRot="1" noChangeAspect="1"/>
+          </p:cNvSpPr>
           <p:nvPr>
-            <p:ph idx="2" type="sldImg"/>
+            <p:ph type="sldImg" idx="2"/>
           </p:nvPr>
         </p:nvSpPr>
         <p:spPr>
@@ -821,9 +843,13 @@
             <a:ext cx="6096000" cy="3429000"/>
           </a:xfrm>
           <a:custGeom>
-            <a:rect b="b" l="l" r="r" t="t"/>
+            <a:avLst/>
+            <a:gdLst/>
+            <a:ahLst/>
+            <a:cxnLst/>
+            <a:rect l="l" t="t" r="r" b="b"/>
             <a:pathLst>
-              <a:path extrusionOk="0" h="120000" w="120000">
+              <a:path w="120000" h="120000" extrusionOk="0">
                 <a:moveTo>
                   <a:pt x="0" y="0"/>
                 </a:moveTo>
@@ -845,9 +871,11 @@
       <p:sp>
         <p:nvSpPr>
           <p:cNvPr id="58" name="Google Shape;58;g17e1a264188_0_9:notes"/>
-          <p:cNvSpPr txBox="1"/>
+          <p:cNvSpPr txBox="1">
+            <a:spLocks noGrp="1"/>
+          </p:cNvSpPr>
           <p:nvPr>
-            <p:ph idx="1" type="body"/>
+            <p:ph type="body" idx="1"/>
           </p:nvPr>
         </p:nvSpPr>
         <p:spPr>
@@ -860,12 +888,12 @@
           </a:prstGeom>
         </p:spPr>
         <p:txBody>
-          <a:bodyPr anchorCtr="0" anchor="t" bIns="91425" lIns="91425" spcFirstLastPara="1" rIns="91425" wrap="square" tIns="91425">
+          <a:bodyPr spcFirstLastPara="1" wrap="square" lIns="91425" tIns="91425" rIns="91425" bIns="91425" anchor="t" anchorCtr="0">
             <a:noAutofit/>
           </a:bodyPr>
           <a:lstStyle/>
           <a:p>
-            <a:pPr indent="0" lvl="0" marL="0" rtl="0" algn="l">
+            <a:pPr marL="0" lvl="0" indent="0" algn="l" rtl="0">
               <a:spcBef>
                 <a:spcPts val="0"/>
               </a:spcBef>
@@ -874,9 +902,6 @@
               </a:spcAft>
               <a:buNone/>
             </a:pPr>
-            <a:r>
-              <a:t/>
-            </a:r>
             <a:endParaRPr/>
           </a:p>
         </p:txBody>
@@ -890,11 +915,11 @@
 </file>
 
 <file path=ppt/notesSlides/notesSlide3.xml><?xml version="1.0" encoding="utf-8"?>
-<p:notes xmlns:a="http://schemas.openxmlformats.org/drawingml/2006/main" xmlns:r="http://schemas.openxmlformats.org/officeDocument/2006/relationships" xmlns:mc="http://schemas.openxmlformats.org/markup-compatibility/2006" xmlns:mv="urn:schemas-microsoft-com:mac:vml" xmlns:p="http://schemas.openxmlformats.org/presentationml/2006/main" xmlns:c="http://schemas.openxmlformats.org/drawingml/2006/chart" xmlns:dgm="http://schemas.openxmlformats.org/drawingml/2006/diagram" xmlns:o="urn:schemas-microsoft-com:office:office" xmlns:v="urn:schemas-microsoft-com:vml" xmlns:pvml="urn:schemas-microsoft-com:office:powerpoint" xmlns:com="http://schemas.openxmlformats.org/drawingml/2006/compatibility" xmlns:p14="http://schemas.microsoft.com/office/powerpoint/2010/main" xmlns:p15="http://schemas.microsoft.com/office/powerpoint/2012/main" xmlns:ahyp="http://schemas.microsoft.com/office/drawing/2018/hyperlinkcolor" showMasterPhAnim="0" showMasterSp="0">
+<p:notes xmlns:a="http://schemas.openxmlformats.org/drawingml/2006/main" xmlns:r="http://schemas.openxmlformats.org/officeDocument/2006/relationships" xmlns:p="http://schemas.openxmlformats.org/presentationml/2006/main" showMasterSp="0" showMasterPhAnim="0">
   <p:cSld>
     <p:spTree>
       <p:nvGrpSpPr>
-        <p:cNvPr id="64" name="Shape 64"/>
+        <p:cNvPr id="1" name="Shape 64"/>
         <p:cNvGrpSpPr/>
         <p:nvPr/>
       </p:nvGrpSpPr>
@@ -909,9 +934,11 @@
       <p:sp>
         <p:nvSpPr>
           <p:cNvPr id="65" name="Google Shape;65;g2010cea313c_0_2:notes"/>
-          <p:cNvSpPr/>
+          <p:cNvSpPr>
+            <a:spLocks noGrp="1" noRot="1" noChangeAspect="1"/>
+          </p:cNvSpPr>
           <p:nvPr>
-            <p:ph idx="2" type="sldImg"/>
+            <p:ph type="sldImg" idx="2"/>
           </p:nvPr>
         </p:nvSpPr>
         <p:spPr>
@@ -920,9 +947,13 @@
             <a:ext cx="6096000" cy="3429000"/>
           </a:xfrm>
           <a:custGeom>
-            <a:rect b="b" l="l" r="r" t="t"/>
+            <a:avLst/>
+            <a:gdLst/>
+            <a:ahLst/>
+            <a:cxnLst/>
+            <a:rect l="l" t="t" r="r" b="b"/>
             <a:pathLst>
-              <a:path extrusionOk="0" h="120000" w="120000">
+              <a:path w="120000" h="120000" extrusionOk="0">
                 <a:moveTo>
                   <a:pt x="0" y="0"/>
                 </a:moveTo>
@@ -944,9 +975,11 @@
       <p:sp>
         <p:nvSpPr>
           <p:cNvPr id="66" name="Google Shape;66;g2010cea313c_0_2:notes"/>
-          <p:cNvSpPr txBox="1"/>
+          <p:cNvSpPr txBox="1">
+            <a:spLocks noGrp="1"/>
+          </p:cNvSpPr>
           <p:nvPr>
-            <p:ph idx="1" type="body"/>
+            <p:ph type="body" idx="1"/>
           </p:nvPr>
         </p:nvSpPr>
         <p:spPr>
@@ -959,12 +992,12 @@
           </a:prstGeom>
         </p:spPr>
         <p:txBody>
-          <a:bodyPr anchorCtr="0" anchor="t" bIns="91425" lIns="91425" spcFirstLastPara="1" rIns="91425" wrap="square" tIns="91425">
+          <a:bodyPr spcFirstLastPara="1" wrap="square" lIns="91425" tIns="91425" rIns="91425" bIns="91425" anchor="t" anchorCtr="0">
             <a:noAutofit/>
           </a:bodyPr>
           <a:lstStyle/>
           <a:p>
-            <a:pPr indent="0" lvl="0" marL="0" rtl="0" algn="l">
+            <a:pPr marL="0" lvl="0" indent="0" algn="l" rtl="0">
               <a:spcBef>
                 <a:spcPts val="0"/>
               </a:spcBef>
@@ -973,9 +1006,6 @@
               </a:spcAft>
               <a:buNone/>
             </a:pPr>
-            <a:r>
-              <a:t/>
-            </a:r>
             <a:endParaRPr/>
           </a:p>
         </p:txBody>
@@ -989,11 +1019,11 @@
 </file>
 
 <file path=ppt/notesSlides/notesSlide4.xml><?xml version="1.0" encoding="utf-8"?>
-<p:notes xmlns:a="http://schemas.openxmlformats.org/drawingml/2006/main" xmlns:r="http://schemas.openxmlformats.org/officeDocument/2006/relationships" xmlns:mc="http://schemas.openxmlformats.org/markup-compatibility/2006" xmlns:mv="urn:schemas-microsoft-com:mac:vml" xmlns:p="http://schemas.openxmlformats.org/presentationml/2006/main" xmlns:c="http://schemas.openxmlformats.org/drawingml/2006/chart" xmlns:dgm="http://schemas.openxmlformats.org/drawingml/2006/diagram" xmlns:o="urn:schemas-microsoft-com:office:office" xmlns:v="urn:schemas-microsoft-com:vml" xmlns:pvml="urn:schemas-microsoft-com:office:powerpoint" xmlns:com="http://schemas.openxmlformats.org/drawingml/2006/compatibility" xmlns:p14="http://schemas.microsoft.com/office/powerpoint/2010/main" xmlns:p15="http://schemas.microsoft.com/office/powerpoint/2012/main" xmlns:ahyp="http://schemas.microsoft.com/office/drawing/2018/hyperlinkcolor" showMasterPhAnim="0" showMasterSp="0">
+<p:notes xmlns:a="http://schemas.openxmlformats.org/drawingml/2006/main" xmlns:r="http://schemas.openxmlformats.org/officeDocument/2006/relationships" xmlns:p="http://schemas.openxmlformats.org/presentationml/2006/main" showMasterSp="0" showMasterPhAnim="0">
   <p:cSld>
     <p:spTree>
       <p:nvGrpSpPr>
-        <p:cNvPr id="72" name="Shape 72"/>
+        <p:cNvPr id="1" name="Shape 72"/>
         <p:cNvGrpSpPr/>
         <p:nvPr/>
       </p:nvGrpSpPr>
@@ -1008,20 +1038,26 @@
       <p:sp>
         <p:nvSpPr>
           <p:cNvPr id="73" name="Google Shape;73;g2010cea313c_0_10:notes"/>
-          <p:cNvSpPr/>
+          <p:cNvSpPr>
+            <a:spLocks noGrp="1" noRot="1" noChangeAspect="1"/>
+          </p:cNvSpPr>
           <p:nvPr>
-            <p:ph idx="2" type="sldImg"/>
+            <p:ph type="sldImg" idx="2"/>
           </p:nvPr>
         </p:nvSpPr>
         <p:spPr>
           <a:xfrm>
-            <a:off x="381300" y="685800"/>
+            <a:off x="381000" y="685800"/>
             <a:ext cx="6096000" cy="3429000"/>
           </a:xfrm>
           <a:custGeom>
-            <a:rect b="b" l="l" r="r" t="t"/>
+            <a:avLst/>
+            <a:gdLst/>
+            <a:ahLst/>
+            <a:cxnLst/>
+            <a:rect l="l" t="t" r="r" b="b"/>
             <a:pathLst>
-              <a:path extrusionOk="0" h="120000" w="120000">
+              <a:path w="120000" h="120000" extrusionOk="0">
                 <a:moveTo>
                   <a:pt x="0" y="0"/>
                 </a:moveTo>
@@ -1043,9 +1079,11 @@
       <p:sp>
         <p:nvSpPr>
           <p:cNvPr id="74" name="Google Shape;74;g2010cea313c_0_10:notes"/>
-          <p:cNvSpPr txBox="1"/>
+          <p:cNvSpPr txBox="1">
+            <a:spLocks noGrp="1"/>
+          </p:cNvSpPr>
           <p:nvPr>
-            <p:ph idx="1" type="body"/>
+            <p:ph type="body" idx="1"/>
           </p:nvPr>
         </p:nvSpPr>
         <p:spPr>
@@ -1058,12 +1096,12 @@
           </a:prstGeom>
         </p:spPr>
         <p:txBody>
-          <a:bodyPr anchorCtr="0" anchor="t" bIns="91425" lIns="91425" spcFirstLastPara="1" rIns="91425" wrap="square" tIns="91425">
+          <a:bodyPr spcFirstLastPara="1" wrap="square" lIns="91425" tIns="91425" rIns="91425" bIns="91425" anchor="t" anchorCtr="0">
             <a:noAutofit/>
           </a:bodyPr>
           <a:lstStyle/>
           <a:p>
-            <a:pPr indent="0" lvl="0" marL="0" rtl="0" algn="l">
+            <a:pPr marL="0" lvl="0" indent="0" algn="l" rtl="0">
               <a:spcBef>
                 <a:spcPts val="0"/>
               </a:spcBef>
@@ -1072,9 +1110,6 @@
               </a:spcAft>
               <a:buNone/>
             </a:pPr>
-            <a:r>
-              <a:t/>
-            </a:r>
             <a:endParaRPr/>
           </a:p>
         </p:txBody>
@@ -1088,11 +1123,11 @@
 </file>
 
 <file path=ppt/notesSlides/notesSlide5.xml><?xml version="1.0" encoding="utf-8"?>
-<p:notes xmlns:a="http://schemas.openxmlformats.org/drawingml/2006/main" xmlns:r="http://schemas.openxmlformats.org/officeDocument/2006/relationships" xmlns:mc="http://schemas.openxmlformats.org/markup-compatibility/2006" xmlns:mv="urn:schemas-microsoft-com:mac:vml" xmlns:p="http://schemas.openxmlformats.org/presentationml/2006/main" xmlns:c="http://schemas.openxmlformats.org/drawingml/2006/chart" xmlns:dgm="http://schemas.openxmlformats.org/drawingml/2006/diagram" xmlns:o="urn:schemas-microsoft-com:office:office" xmlns:v="urn:schemas-microsoft-com:vml" xmlns:pvml="urn:schemas-microsoft-com:office:powerpoint" xmlns:com="http://schemas.openxmlformats.org/drawingml/2006/compatibility" xmlns:p14="http://schemas.microsoft.com/office/powerpoint/2010/main" xmlns:p15="http://schemas.microsoft.com/office/powerpoint/2012/main" xmlns:ahyp="http://schemas.microsoft.com/office/drawing/2018/hyperlinkcolor" showMasterPhAnim="0" showMasterSp="0">
+<p:notes xmlns:a="http://schemas.openxmlformats.org/drawingml/2006/main" xmlns:r="http://schemas.openxmlformats.org/officeDocument/2006/relationships" xmlns:p="http://schemas.openxmlformats.org/presentationml/2006/main" showMasterSp="0" showMasterPhAnim="0">
   <p:cSld>
     <p:spTree>
       <p:nvGrpSpPr>
-        <p:cNvPr id="80" name="Shape 80"/>
+        <p:cNvPr id="1" name="Shape 80"/>
         <p:cNvGrpSpPr/>
         <p:nvPr/>
       </p:nvGrpSpPr>
@@ -1107,20 +1142,26 @@
       <p:sp>
         <p:nvSpPr>
           <p:cNvPr id="81" name="Google Shape;81;g2010cea313c_0_18:notes"/>
-          <p:cNvSpPr/>
+          <p:cNvSpPr>
+            <a:spLocks noGrp="1" noRot="1" noChangeAspect="1"/>
+          </p:cNvSpPr>
           <p:nvPr>
-            <p:ph idx="2" type="sldImg"/>
+            <p:ph type="sldImg" idx="2"/>
           </p:nvPr>
         </p:nvSpPr>
         <p:spPr>
           <a:xfrm>
-            <a:off x="381300" y="685800"/>
+            <a:off x="381000" y="685800"/>
             <a:ext cx="6096000" cy="3429000"/>
           </a:xfrm>
           <a:custGeom>
-            <a:rect b="b" l="l" r="r" t="t"/>
+            <a:avLst/>
+            <a:gdLst/>
+            <a:ahLst/>
+            <a:cxnLst/>
+            <a:rect l="l" t="t" r="r" b="b"/>
             <a:pathLst>
-              <a:path extrusionOk="0" h="120000" w="120000">
+              <a:path w="120000" h="120000" extrusionOk="0">
                 <a:moveTo>
                   <a:pt x="0" y="0"/>
                 </a:moveTo>
@@ -1142,9 +1183,11 @@
       <p:sp>
         <p:nvSpPr>
           <p:cNvPr id="82" name="Google Shape;82;g2010cea313c_0_18:notes"/>
-          <p:cNvSpPr txBox="1"/>
+          <p:cNvSpPr txBox="1">
+            <a:spLocks noGrp="1"/>
+          </p:cNvSpPr>
           <p:nvPr>
-            <p:ph idx="1" type="body"/>
+            <p:ph type="body" idx="1"/>
           </p:nvPr>
         </p:nvSpPr>
         <p:spPr>
@@ -1157,12 +1200,12 @@
           </a:prstGeom>
         </p:spPr>
         <p:txBody>
-          <a:bodyPr anchorCtr="0" anchor="t" bIns="91425" lIns="91425" spcFirstLastPara="1" rIns="91425" wrap="square" tIns="91425">
+          <a:bodyPr spcFirstLastPara="1" wrap="square" lIns="91425" tIns="91425" rIns="91425" bIns="91425" anchor="t" anchorCtr="0">
             <a:noAutofit/>
           </a:bodyPr>
           <a:lstStyle/>
           <a:p>
-            <a:pPr indent="0" lvl="0" marL="0" rtl="0" algn="l">
+            <a:pPr marL="0" lvl="0" indent="0" algn="l" rtl="0">
               <a:spcBef>
                 <a:spcPts val="0"/>
               </a:spcBef>
@@ -1171,9 +1214,6 @@
               </a:spcAft>
               <a:buNone/>
             </a:pPr>
-            <a:r>
-              <a:t/>
-            </a:r>
             <a:endParaRPr/>
           </a:p>
         </p:txBody>
@@ -1187,11 +1227,11 @@
 </file>
 
 <file path=ppt/notesSlides/notesSlide6.xml><?xml version="1.0" encoding="utf-8"?>
-<p:notes xmlns:a="http://schemas.openxmlformats.org/drawingml/2006/main" xmlns:r="http://schemas.openxmlformats.org/officeDocument/2006/relationships" xmlns:mc="http://schemas.openxmlformats.org/markup-compatibility/2006" xmlns:mv="urn:schemas-microsoft-com:mac:vml" xmlns:p="http://schemas.openxmlformats.org/presentationml/2006/main" xmlns:c="http://schemas.openxmlformats.org/drawingml/2006/chart" xmlns:dgm="http://schemas.openxmlformats.org/drawingml/2006/diagram" xmlns:o="urn:schemas-microsoft-com:office:office" xmlns:v="urn:schemas-microsoft-com:vml" xmlns:pvml="urn:schemas-microsoft-com:office:powerpoint" xmlns:com="http://schemas.openxmlformats.org/drawingml/2006/compatibility" xmlns:p14="http://schemas.microsoft.com/office/powerpoint/2010/main" xmlns:p15="http://schemas.microsoft.com/office/powerpoint/2012/main" xmlns:ahyp="http://schemas.microsoft.com/office/drawing/2018/hyperlinkcolor" showMasterPhAnim="0" showMasterSp="0">
+<p:notes xmlns:a="http://schemas.openxmlformats.org/drawingml/2006/main" xmlns:r="http://schemas.openxmlformats.org/officeDocument/2006/relationships" xmlns:p="http://schemas.openxmlformats.org/presentationml/2006/main" showMasterSp="0" showMasterPhAnim="0">
   <p:cSld>
     <p:spTree>
       <p:nvGrpSpPr>
-        <p:cNvPr id="88" name="Shape 88"/>
+        <p:cNvPr id="1" name="Shape 88"/>
         <p:cNvGrpSpPr/>
         <p:nvPr/>
       </p:nvGrpSpPr>
@@ -1206,9 +1246,11 @@
       <p:sp>
         <p:nvSpPr>
           <p:cNvPr id="89" name="Google Shape;89;g2010cea313c_0_28:notes"/>
-          <p:cNvSpPr/>
+          <p:cNvSpPr>
+            <a:spLocks noGrp="1" noRot="1" noChangeAspect="1"/>
+          </p:cNvSpPr>
           <p:nvPr>
-            <p:ph idx="2" type="sldImg"/>
+            <p:ph type="sldImg" idx="2"/>
           </p:nvPr>
         </p:nvSpPr>
         <p:spPr>
@@ -1217,9 +1259,13 @@
             <a:ext cx="6096000" cy="3429000"/>
           </a:xfrm>
           <a:custGeom>
-            <a:rect b="b" l="l" r="r" t="t"/>
+            <a:avLst/>
+            <a:gdLst/>
+            <a:ahLst/>
+            <a:cxnLst/>
+            <a:rect l="l" t="t" r="r" b="b"/>
             <a:pathLst>
-              <a:path extrusionOk="0" h="120000" w="120000">
+              <a:path w="120000" h="120000" extrusionOk="0">
                 <a:moveTo>
                   <a:pt x="0" y="0"/>
                 </a:moveTo>
@@ -1241,9 +1287,11 @@
       <p:sp>
         <p:nvSpPr>
           <p:cNvPr id="90" name="Google Shape;90;g2010cea313c_0_28:notes"/>
-          <p:cNvSpPr txBox="1"/>
+          <p:cNvSpPr txBox="1">
+            <a:spLocks noGrp="1"/>
+          </p:cNvSpPr>
           <p:nvPr>
-            <p:ph idx="1" type="body"/>
+            <p:ph type="body" idx="1"/>
           </p:nvPr>
         </p:nvSpPr>
         <p:spPr>
@@ -1256,12 +1304,12 @@
           </a:prstGeom>
         </p:spPr>
         <p:txBody>
-          <a:bodyPr anchorCtr="0" anchor="t" bIns="91425" lIns="91425" spcFirstLastPara="1" rIns="91425" wrap="square" tIns="91425">
+          <a:bodyPr spcFirstLastPara="1" wrap="square" lIns="91425" tIns="91425" rIns="91425" bIns="91425" anchor="t" anchorCtr="0">
             <a:noAutofit/>
           </a:bodyPr>
           <a:lstStyle/>
           <a:p>
-            <a:pPr indent="0" lvl="0" marL="0" rtl="0" algn="l">
+            <a:pPr marL="0" lvl="0" indent="0" algn="l" rtl="0">
               <a:spcBef>
                 <a:spcPts val="0"/>
               </a:spcBef>
@@ -1270,9 +1318,6 @@
               </a:spcAft>
               <a:buNone/>
             </a:pPr>
-            <a:r>
-              <a:t/>
-            </a:r>
             <a:endParaRPr/>
           </a:p>
         </p:txBody>
@@ -1286,11 +1331,11 @@
 </file>
 
 <file path=ppt/slideLayouts/slideLayout1.xml><?xml version="1.0" encoding="utf-8"?>
-<p:sldLayout xmlns:a="http://schemas.openxmlformats.org/drawingml/2006/main" xmlns:r="http://schemas.openxmlformats.org/officeDocument/2006/relationships" xmlns:mc="http://schemas.openxmlformats.org/markup-compatibility/2006" xmlns:mv="urn:schemas-microsoft-com:mac:vml" xmlns:p="http://schemas.openxmlformats.org/presentationml/2006/main" xmlns:c="http://schemas.openxmlformats.org/drawingml/2006/chart" xmlns:dgm="http://schemas.openxmlformats.org/drawingml/2006/diagram" xmlns:o="urn:schemas-microsoft-com:office:office" xmlns:v="urn:schemas-microsoft-com:vml" xmlns:pvml="urn:schemas-microsoft-com:office:powerpoint" xmlns:com="http://schemas.openxmlformats.org/drawingml/2006/compatibility" xmlns:p14="http://schemas.microsoft.com/office/powerpoint/2010/main" xmlns:p15="http://schemas.microsoft.com/office/powerpoint/2012/main" xmlns:ahyp="http://schemas.microsoft.com/office/drawing/2018/hyperlinkcolor" matchingName="Title slide" type="title">
+<p:sldLayout xmlns:a="http://schemas.openxmlformats.org/drawingml/2006/main" xmlns:r="http://schemas.openxmlformats.org/officeDocument/2006/relationships" xmlns:p="http://schemas.openxmlformats.org/presentationml/2006/main" matchingName="Title slide" type="title">
   <p:cSld name="TITLE">
     <p:spTree>
       <p:nvGrpSpPr>
-        <p:cNvPr id="9" name="Shape 9"/>
+        <p:cNvPr id="1" name="Shape 9"/>
         <p:cNvGrpSpPr/>
         <p:nvPr/>
       </p:nvGrpSpPr>
@@ -1305,7 +1350,9 @@
       <p:sp>
         <p:nvSpPr>
           <p:cNvPr id="10" name="Google Shape;10;p2"/>
-          <p:cNvSpPr txBox="1"/>
+          <p:cNvSpPr txBox="1">
+            <a:spLocks noGrp="1"/>
+          </p:cNvSpPr>
           <p:nvPr>
             <p:ph type="ctrTitle"/>
           </p:nvPr>
@@ -1320,7 +1367,7 @@
           </a:prstGeom>
         </p:spPr>
         <p:txBody>
-          <a:bodyPr anchorCtr="0" anchor="b" bIns="91425" lIns="91425" spcFirstLastPara="1" rIns="91425" wrap="square" tIns="91425">
+          <a:bodyPr spcFirstLastPara="1" wrap="square" lIns="91425" tIns="91425" rIns="91425" bIns="91425" anchor="b" anchorCtr="0">
             <a:normAutofit/>
           </a:bodyPr>
           <a:lstStyle>
@@ -1424,15 +1471,19 @@
               <a:defRPr sz="5200"/>
             </a:lvl9pPr>
           </a:lstStyle>
-          <a:p/>
+          <a:p>
+            <a:endParaRPr/>
+          </a:p>
         </p:txBody>
       </p:sp>
       <p:sp>
         <p:nvSpPr>
           <p:cNvPr id="11" name="Google Shape;11;p2"/>
-          <p:cNvSpPr txBox="1"/>
+          <p:cNvSpPr txBox="1">
+            <a:spLocks noGrp="1"/>
+          </p:cNvSpPr>
           <p:nvPr>
-            <p:ph idx="1" type="subTitle"/>
+            <p:ph type="subTitle" idx="1"/>
           </p:nvPr>
         </p:nvSpPr>
         <p:spPr>
@@ -1445,7 +1496,7 @@
           </a:prstGeom>
         </p:spPr>
         <p:txBody>
-          <a:bodyPr anchorCtr="0" anchor="t" bIns="91425" lIns="91425" spcFirstLastPara="1" rIns="91425" wrap="square" tIns="91425">
+          <a:bodyPr spcFirstLastPara="1" wrap="square" lIns="91425" tIns="91425" rIns="91425" bIns="91425" anchor="t" anchorCtr="0">
             <a:normAutofit/>
           </a:bodyPr>
           <a:lstStyle>
@@ -1576,15 +1627,19 @@
               <a:defRPr sz="2800"/>
             </a:lvl9pPr>
           </a:lstStyle>
-          <a:p/>
+          <a:p>
+            <a:endParaRPr/>
+          </a:p>
         </p:txBody>
       </p:sp>
       <p:sp>
         <p:nvSpPr>
           <p:cNvPr id="12" name="Google Shape;12;p2"/>
-          <p:cNvSpPr txBox="1"/>
+          <p:cNvSpPr txBox="1">
+            <a:spLocks noGrp="1"/>
+          </p:cNvSpPr>
           <p:nvPr>
-            <p:ph idx="12" type="sldNum"/>
+            <p:ph type="sldNum" idx="12"/>
           </p:nvPr>
         </p:nvSpPr>
         <p:spPr>
@@ -1597,7 +1652,7 @@
           </a:prstGeom>
         </p:spPr>
         <p:txBody>
-          <a:bodyPr anchorCtr="0" anchor="ctr" bIns="91425" lIns="91425" spcFirstLastPara="1" rIns="91425" wrap="square" tIns="91425">
+          <a:bodyPr spcFirstLastPara="1" wrap="square" lIns="91425" tIns="91425" rIns="91425" bIns="91425" anchor="ctr" anchorCtr="0">
             <a:normAutofit/>
           </a:bodyPr>
           <a:lstStyle>
@@ -1639,7 +1694,7 @@
             </a:lvl9pPr>
           </a:lstStyle>
           <a:p>
-            <a:pPr indent="0" lvl="0" marL="0" rtl="0" algn="r">
+            <a:pPr marL="0" lvl="0" indent="0" algn="r" rtl="0">
               <a:spcBef>
                 <a:spcPts val="0"/>
               </a:spcBef>
@@ -1665,11 +1720,11 @@
 </file>
 
 <file path=ppt/slideLayouts/slideLayout10.xml><?xml version="1.0" encoding="utf-8"?>
-<p:sldLayout xmlns:a="http://schemas.openxmlformats.org/drawingml/2006/main" xmlns:r="http://schemas.openxmlformats.org/officeDocument/2006/relationships" xmlns:mc="http://schemas.openxmlformats.org/markup-compatibility/2006" xmlns:mv="urn:schemas-microsoft-com:mac:vml" xmlns:p="http://schemas.openxmlformats.org/presentationml/2006/main" xmlns:c="http://schemas.openxmlformats.org/drawingml/2006/chart" xmlns:dgm="http://schemas.openxmlformats.org/drawingml/2006/diagram" xmlns:o="urn:schemas-microsoft-com:office:office" xmlns:v="urn:schemas-microsoft-com:vml" xmlns:pvml="urn:schemas-microsoft-com:office:powerpoint" xmlns:com="http://schemas.openxmlformats.org/drawingml/2006/compatibility" xmlns:p14="http://schemas.microsoft.com/office/powerpoint/2010/main" xmlns:p15="http://schemas.microsoft.com/office/powerpoint/2012/main" xmlns:ahyp="http://schemas.microsoft.com/office/drawing/2018/hyperlinkcolor" matchingName="Big number">
+<p:sldLayout xmlns:a="http://schemas.openxmlformats.org/drawingml/2006/main" xmlns:r="http://schemas.openxmlformats.org/officeDocument/2006/relationships" xmlns:p="http://schemas.openxmlformats.org/presentationml/2006/main" matchingName="Big number">
   <p:cSld name="BIG_NUMBER">
     <p:spTree>
       <p:nvGrpSpPr>
-        <p:cNvPr id="44" name="Shape 44"/>
+        <p:cNvPr id="1" name="Shape 44"/>
         <p:cNvGrpSpPr/>
         <p:nvPr/>
       </p:nvGrpSpPr>
@@ -1684,9 +1739,11 @@
       <p:sp>
         <p:nvSpPr>
           <p:cNvPr id="45" name="Google Shape;45;p11"/>
-          <p:cNvSpPr txBox="1"/>
+          <p:cNvSpPr txBox="1">
+            <a:spLocks noGrp="1"/>
+          </p:cNvSpPr>
           <p:nvPr>
-            <p:ph hasCustomPrompt="1" type="title"/>
+            <p:ph type="title" hasCustomPrompt="1"/>
           </p:nvPr>
         </p:nvSpPr>
         <p:spPr>
@@ -1699,7 +1756,7 @@
           </a:prstGeom>
         </p:spPr>
         <p:txBody>
-          <a:bodyPr anchorCtr="0" anchor="b" bIns="91425" lIns="91425" spcFirstLastPara="1" rIns="91425" wrap="square" tIns="91425">
+          <a:bodyPr spcFirstLastPara="1" wrap="square" lIns="91425" tIns="91425" rIns="91425" bIns="91425" anchor="b" anchorCtr="0">
             <a:normAutofit/>
           </a:bodyPr>
           <a:lstStyle>
@@ -1813,9 +1870,11 @@
       <p:sp>
         <p:nvSpPr>
           <p:cNvPr id="46" name="Google Shape;46;p11"/>
-          <p:cNvSpPr txBox="1"/>
+          <p:cNvSpPr txBox="1">
+            <a:spLocks noGrp="1"/>
+          </p:cNvSpPr>
           <p:nvPr>
-            <p:ph idx="1" type="body"/>
+            <p:ph type="body" idx="1"/>
           </p:nvPr>
         </p:nvSpPr>
         <p:spPr>
@@ -1828,11 +1887,11 @@
           </a:prstGeom>
         </p:spPr>
         <p:txBody>
-          <a:bodyPr anchorCtr="0" anchor="t" bIns="91425" lIns="91425" spcFirstLastPara="1" rIns="91425" wrap="square" tIns="91425">
+          <a:bodyPr spcFirstLastPara="1" wrap="square" lIns="91425" tIns="91425" rIns="91425" bIns="91425" anchor="t" anchorCtr="0">
             <a:normAutofit/>
           </a:bodyPr>
           <a:lstStyle>
-            <a:lvl1pPr indent="-342900" lvl="0" marL="457200" algn="ctr">
+            <a:lvl1pPr marL="457200" lvl="0" indent="-342900" algn="ctr">
               <a:spcBef>
                 <a:spcPts val="0"/>
               </a:spcBef>
@@ -1843,7 +1902,7 @@
               <a:buChar char="●"/>
               <a:defRPr/>
             </a:lvl1pPr>
-            <a:lvl2pPr indent="-317500" lvl="1" marL="914400" algn="ctr">
+            <a:lvl2pPr marL="914400" lvl="1" indent="-317500" algn="ctr">
               <a:spcBef>
                 <a:spcPts val="0"/>
               </a:spcBef>
@@ -1854,7 +1913,7 @@
               <a:buChar char="○"/>
               <a:defRPr/>
             </a:lvl2pPr>
-            <a:lvl3pPr indent="-317500" lvl="2" marL="1371600" algn="ctr">
+            <a:lvl3pPr marL="1371600" lvl="2" indent="-317500" algn="ctr">
               <a:spcBef>
                 <a:spcPts val="0"/>
               </a:spcBef>
@@ -1865,7 +1924,7 @@
               <a:buChar char="■"/>
               <a:defRPr/>
             </a:lvl3pPr>
-            <a:lvl4pPr indent="-317500" lvl="3" marL="1828800" algn="ctr">
+            <a:lvl4pPr marL="1828800" lvl="3" indent="-317500" algn="ctr">
               <a:spcBef>
                 <a:spcPts val="0"/>
               </a:spcBef>
@@ -1876,7 +1935,7 @@
               <a:buChar char="●"/>
               <a:defRPr/>
             </a:lvl4pPr>
-            <a:lvl5pPr indent="-317500" lvl="4" marL="2286000" algn="ctr">
+            <a:lvl5pPr marL="2286000" lvl="4" indent="-317500" algn="ctr">
               <a:spcBef>
                 <a:spcPts val="0"/>
               </a:spcBef>
@@ -1887,7 +1946,7 @@
               <a:buChar char="○"/>
               <a:defRPr/>
             </a:lvl5pPr>
-            <a:lvl6pPr indent="-317500" lvl="5" marL="2743200" algn="ctr">
+            <a:lvl6pPr marL="2743200" lvl="5" indent="-317500" algn="ctr">
               <a:spcBef>
                 <a:spcPts val="0"/>
               </a:spcBef>
@@ -1898,7 +1957,7 @@
               <a:buChar char="■"/>
               <a:defRPr/>
             </a:lvl6pPr>
-            <a:lvl7pPr indent="-317500" lvl="6" marL="3200400" algn="ctr">
+            <a:lvl7pPr marL="3200400" lvl="6" indent="-317500" algn="ctr">
               <a:spcBef>
                 <a:spcPts val="0"/>
               </a:spcBef>
@@ -1909,7 +1968,7 @@
               <a:buChar char="●"/>
               <a:defRPr/>
             </a:lvl7pPr>
-            <a:lvl8pPr indent="-317500" lvl="7" marL="3657600" algn="ctr">
+            <a:lvl8pPr marL="3657600" lvl="7" indent="-317500" algn="ctr">
               <a:spcBef>
                 <a:spcPts val="0"/>
               </a:spcBef>
@@ -1920,7 +1979,7 @@
               <a:buChar char="○"/>
               <a:defRPr/>
             </a:lvl8pPr>
-            <a:lvl9pPr indent="-317500" lvl="8" marL="4114800" algn="ctr">
+            <a:lvl9pPr marL="4114800" lvl="8" indent="-317500" algn="ctr">
               <a:spcBef>
                 <a:spcPts val="0"/>
               </a:spcBef>
@@ -1932,15 +1991,19 @@
               <a:defRPr/>
             </a:lvl9pPr>
           </a:lstStyle>
-          <a:p/>
+          <a:p>
+            <a:endParaRPr/>
+          </a:p>
         </p:txBody>
       </p:sp>
       <p:sp>
         <p:nvSpPr>
           <p:cNvPr id="47" name="Google Shape;47;p11"/>
-          <p:cNvSpPr txBox="1"/>
+          <p:cNvSpPr txBox="1">
+            <a:spLocks noGrp="1"/>
+          </p:cNvSpPr>
           <p:nvPr>
-            <p:ph idx="12" type="sldNum"/>
+            <p:ph type="sldNum" idx="12"/>
           </p:nvPr>
         </p:nvSpPr>
         <p:spPr>
@@ -1953,7 +2016,7 @@
           </a:prstGeom>
         </p:spPr>
         <p:txBody>
-          <a:bodyPr anchorCtr="0" anchor="ctr" bIns="91425" lIns="91425" spcFirstLastPara="1" rIns="91425" wrap="square" tIns="91425">
+          <a:bodyPr spcFirstLastPara="1" wrap="square" lIns="91425" tIns="91425" rIns="91425" bIns="91425" anchor="ctr" anchorCtr="0">
             <a:normAutofit/>
           </a:bodyPr>
           <a:lstStyle>
@@ -1995,7 +2058,7 @@
             </a:lvl9pPr>
           </a:lstStyle>
           <a:p>
-            <a:pPr indent="0" lvl="0" marL="0" rtl="0" algn="r">
+            <a:pPr marL="0" lvl="0" indent="0" algn="r" rtl="0">
               <a:spcBef>
                 <a:spcPts val="0"/>
               </a:spcBef>
@@ -2021,11 +2084,11 @@
 </file>
 
 <file path=ppt/slideLayouts/slideLayout11.xml><?xml version="1.0" encoding="utf-8"?>
-<p:sldLayout xmlns:a="http://schemas.openxmlformats.org/drawingml/2006/main" xmlns:r="http://schemas.openxmlformats.org/officeDocument/2006/relationships" xmlns:mc="http://schemas.openxmlformats.org/markup-compatibility/2006" xmlns:mv="urn:schemas-microsoft-com:mac:vml" xmlns:p="http://schemas.openxmlformats.org/presentationml/2006/main" xmlns:c="http://schemas.openxmlformats.org/drawingml/2006/chart" xmlns:dgm="http://schemas.openxmlformats.org/drawingml/2006/diagram" xmlns:o="urn:schemas-microsoft-com:office:office" xmlns:v="urn:schemas-microsoft-com:vml" xmlns:pvml="urn:schemas-microsoft-com:office:powerpoint" xmlns:com="http://schemas.openxmlformats.org/drawingml/2006/compatibility" xmlns:p14="http://schemas.microsoft.com/office/powerpoint/2010/main" xmlns:p15="http://schemas.microsoft.com/office/powerpoint/2012/main" xmlns:ahyp="http://schemas.microsoft.com/office/drawing/2018/hyperlinkcolor" matchingName="Blank" type="blank">
+<p:sldLayout xmlns:a="http://schemas.openxmlformats.org/drawingml/2006/main" xmlns:r="http://schemas.openxmlformats.org/officeDocument/2006/relationships" xmlns:p="http://schemas.openxmlformats.org/presentationml/2006/main" matchingName="Blank" type="blank">
   <p:cSld name="BLANK">
     <p:spTree>
       <p:nvGrpSpPr>
-        <p:cNvPr id="48" name="Shape 48"/>
+        <p:cNvPr id="1" name="Shape 48"/>
         <p:cNvGrpSpPr/>
         <p:nvPr/>
       </p:nvGrpSpPr>
@@ -2040,9 +2103,11 @@
       <p:sp>
         <p:nvSpPr>
           <p:cNvPr id="49" name="Google Shape;49;p12"/>
-          <p:cNvSpPr txBox="1"/>
+          <p:cNvSpPr txBox="1">
+            <a:spLocks noGrp="1"/>
+          </p:cNvSpPr>
           <p:nvPr>
-            <p:ph idx="12" type="sldNum"/>
+            <p:ph type="sldNum" idx="12"/>
           </p:nvPr>
         </p:nvSpPr>
         <p:spPr>
@@ -2055,7 +2120,7 @@
           </a:prstGeom>
         </p:spPr>
         <p:txBody>
-          <a:bodyPr anchorCtr="0" anchor="ctr" bIns="91425" lIns="91425" spcFirstLastPara="1" rIns="91425" wrap="square" tIns="91425">
+          <a:bodyPr spcFirstLastPara="1" wrap="square" lIns="91425" tIns="91425" rIns="91425" bIns="91425" anchor="ctr" anchorCtr="0">
             <a:normAutofit/>
           </a:bodyPr>
           <a:lstStyle>
@@ -2097,7 +2162,7 @@
             </a:lvl9pPr>
           </a:lstStyle>
           <a:p>
-            <a:pPr indent="0" lvl="0" marL="0" rtl="0" algn="r">
+            <a:pPr marL="0" lvl="0" indent="0" algn="r" rtl="0">
               <a:spcBef>
                 <a:spcPts val="0"/>
               </a:spcBef>
@@ -2123,11 +2188,11 @@
 </file>
 
 <file path=ppt/slideLayouts/slideLayout2.xml><?xml version="1.0" encoding="utf-8"?>
-<p:sldLayout xmlns:a="http://schemas.openxmlformats.org/drawingml/2006/main" xmlns:r="http://schemas.openxmlformats.org/officeDocument/2006/relationships" xmlns:mc="http://schemas.openxmlformats.org/markup-compatibility/2006" xmlns:mv="urn:schemas-microsoft-com:mac:vml" xmlns:p="http://schemas.openxmlformats.org/presentationml/2006/main" xmlns:c="http://schemas.openxmlformats.org/drawingml/2006/chart" xmlns:dgm="http://schemas.openxmlformats.org/drawingml/2006/diagram" xmlns:o="urn:schemas-microsoft-com:office:office" xmlns:v="urn:schemas-microsoft-com:vml" xmlns:pvml="urn:schemas-microsoft-com:office:powerpoint" xmlns:com="http://schemas.openxmlformats.org/drawingml/2006/compatibility" xmlns:p14="http://schemas.microsoft.com/office/powerpoint/2010/main" xmlns:p15="http://schemas.microsoft.com/office/powerpoint/2012/main" xmlns:ahyp="http://schemas.microsoft.com/office/drawing/2018/hyperlinkcolor" matchingName="Section header" type="secHead">
+<p:sldLayout xmlns:a="http://schemas.openxmlformats.org/drawingml/2006/main" xmlns:r="http://schemas.openxmlformats.org/officeDocument/2006/relationships" xmlns:p="http://schemas.openxmlformats.org/presentationml/2006/main" matchingName="Section header" type="secHead">
   <p:cSld name="SECTION_HEADER">
     <p:spTree>
       <p:nvGrpSpPr>
-        <p:cNvPr id="13" name="Shape 13"/>
+        <p:cNvPr id="1" name="Shape 13"/>
         <p:cNvGrpSpPr/>
         <p:nvPr/>
       </p:nvGrpSpPr>
@@ -2142,7 +2207,9 @@
       <p:sp>
         <p:nvSpPr>
           <p:cNvPr id="14" name="Google Shape;14;p3"/>
-          <p:cNvSpPr txBox="1"/>
+          <p:cNvSpPr txBox="1">
+            <a:spLocks noGrp="1"/>
+          </p:cNvSpPr>
           <p:nvPr>
             <p:ph type="title"/>
           </p:nvPr>
@@ -2157,7 +2224,7 @@
           </a:prstGeom>
         </p:spPr>
         <p:txBody>
-          <a:bodyPr anchorCtr="0" anchor="ctr" bIns="91425" lIns="91425" spcFirstLastPara="1" rIns="91425" wrap="square" tIns="91425">
+          <a:bodyPr spcFirstLastPara="1" wrap="square" lIns="91425" tIns="91425" rIns="91425" bIns="91425" anchor="ctr" anchorCtr="0">
             <a:normAutofit/>
           </a:bodyPr>
           <a:lstStyle>
@@ -2261,15 +2328,19 @@
               <a:defRPr sz="3600"/>
             </a:lvl9pPr>
           </a:lstStyle>
-          <a:p/>
+          <a:p>
+            <a:endParaRPr/>
+          </a:p>
         </p:txBody>
       </p:sp>
       <p:sp>
         <p:nvSpPr>
           <p:cNvPr id="15" name="Google Shape;15;p3"/>
-          <p:cNvSpPr txBox="1"/>
+          <p:cNvSpPr txBox="1">
+            <a:spLocks noGrp="1"/>
+          </p:cNvSpPr>
           <p:nvPr>
-            <p:ph idx="12" type="sldNum"/>
+            <p:ph type="sldNum" idx="12"/>
           </p:nvPr>
         </p:nvSpPr>
         <p:spPr>
@@ -2282,7 +2353,7 @@
           </a:prstGeom>
         </p:spPr>
         <p:txBody>
-          <a:bodyPr anchorCtr="0" anchor="ctr" bIns="91425" lIns="91425" spcFirstLastPara="1" rIns="91425" wrap="square" tIns="91425">
+          <a:bodyPr spcFirstLastPara="1" wrap="square" lIns="91425" tIns="91425" rIns="91425" bIns="91425" anchor="ctr" anchorCtr="0">
             <a:normAutofit/>
           </a:bodyPr>
           <a:lstStyle>
@@ -2324,7 +2395,7 @@
             </a:lvl9pPr>
           </a:lstStyle>
           <a:p>
-            <a:pPr indent="0" lvl="0" marL="0" rtl="0" algn="r">
+            <a:pPr marL="0" lvl="0" indent="0" algn="r" rtl="0">
               <a:spcBef>
                 <a:spcPts val="0"/>
               </a:spcBef>
@@ -2350,11 +2421,11 @@
 </file>
 
 <file path=ppt/slideLayouts/slideLayout3.xml><?xml version="1.0" encoding="utf-8"?>
-<p:sldLayout xmlns:a="http://schemas.openxmlformats.org/drawingml/2006/main" xmlns:r="http://schemas.openxmlformats.org/officeDocument/2006/relationships" xmlns:mc="http://schemas.openxmlformats.org/markup-compatibility/2006" xmlns:mv="urn:schemas-microsoft-com:mac:vml" xmlns:p="http://schemas.openxmlformats.org/presentationml/2006/main" xmlns:c="http://schemas.openxmlformats.org/drawingml/2006/chart" xmlns:dgm="http://schemas.openxmlformats.org/drawingml/2006/diagram" xmlns:o="urn:schemas-microsoft-com:office:office" xmlns:v="urn:schemas-microsoft-com:vml" xmlns:pvml="urn:schemas-microsoft-com:office:powerpoint" xmlns:com="http://schemas.openxmlformats.org/drawingml/2006/compatibility" xmlns:p14="http://schemas.microsoft.com/office/powerpoint/2010/main" xmlns:p15="http://schemas.microsoft.com/office/powerpoint/2012/main" xmlns:ahyp="http://schemas.microsoft.com/office/drawing/2018/hyperlinkcolor" matchingName="Title and body" type="tx">
+<p:sldLayout xmlns:a="http://schemas.openxmlformats.org/drawingml/2006/main" xmlns:r="http://schemas.openxmlformats.org/officeDocument/2006/relationships" xmlns:p="http://schemas.openxmlformats.org/presentationml/2006/main" matchingName="Title and body" type="tx">
   <p:cSld name="TITLE_AND_BODY">
     <p:spTree>
       <p:nvGrpSpPr>
-        <p:cNvPr id="16" name="Shape 16"/>
+        <p:cNvPr id="1" name="Shape 16"/>
         <p:cNvGrpSpPr/>
         <p:nvPr/>
       </p:nvGrpSpPr>
@@ -2369,7 +2440,9 @@
       <p:sp>
         <p:nvSpPr>
           <p:cNvPr id="17" name="Google Shape;17;p4"/>
-          <p:cNvSpPr txBox="1"/>
+          <p:cNvSpPr txBox="1">
+            <a:spLocks noGrp="1"/>
+          </p:cNvSpPr>
           <p:nvPr>
             <p:ph type="title"/>
           </p:nvPr>
@@ -2384,7 +2457,7 @@
           </a:prstGeom>
         </p:spPr>
         <p:txBody>
-          <a:bodyPr anchorCtr="0" anchor="t" bIns="91425" lIns="91425" spcFirstLastPara="1" rIns="91425" wrap="square" tIns="91425">
+          <a:bodyPr spcFirstLastPara="1" wrap="square" lIns="91425" tIns="91425" rIns="91425" bIns="91425" anchor="t" anchorCtr="0">
             <a:normAutofit/>
           </a:bodyPr>
           <a:lstStyle>
@@ -2488,15 +2561,19 @@
               <a:defRPr/>
             </a:lvl9pPr>
           </a:lstStyle>
-          <a:p/>
+          <a:p>
+            <a:endParaRPr/>
+          </a:p>
         </p:txBody>
       </p:sp>
       <p:sp>
         <p:nvSpPr>
           <p:cNvPr id="18" name="Google Shape;18;p4"/>
-          <p:cNvSpPr txBox="1"/>
+          <p:cNvSpPr txBox="1">
+            <a:spLocks noGrp="1"/>
+          </p:cNvSpPr>
           <p:nvPr>
-            <p:ph idx="1" type="body"/>
+            <p:ph type="body" idx="1"/>
           </p:nvPr>
         </p:nvSpPr>
         <p:spPr>
@@ -2509,11 +2586,11 @@
           </a:prstGeom>
         </p:spPr>
         <p:txBody>
-          <a:bodyPr anchorCtr="0" anchor="t" bIns="91425" lIns="91425" spcFirstLastPara="1" rIns="91425" wrap="square" tIns="91425">
+          <a:bodyPr spcFirstLastPara="1" wrap="square" lIns="91425" tIns="91425" rIns="91425" bIns="91425" anchor="t" anchorCtr="0">
             <a:normAutofit/>
           </a:bodyPr>
           <a:lstStyle>
-            <a:lvl1pPr indent="-342900" lvl="0" marL="457200">
+            <a:lvl1pPr marL="457200" lvl="0" indent="-342900">
               <a:spcBef>
                 <a:spcPts val="0"/>
               </a:spcBef>
@@ -2524,7 +2601,7 @@
               <a:buChar char="●"/>
               <a:defRPr/>
             </a:lvl1pPr>
-            <a:lvl2pPr indent="-317500" lvl="1" marL="914400">
+            <a:lvl2pPr marL="914400" lvl="1" indent="-317500">
               <a:spcBef>
                 <a:spcPts val="0"/>
               </a:spcBef>
@@ -2535,7 +2612,7 @@
               <a:buChar char="○"/>
               <a:defRPr/>
             </a:lvl2pPr>
-            <a:lvl3pPr indent="-317500" lvl="2" marL="1371600">
+            <a:lvl3pPr marL="1371600" lvl="2" indent="-317500">
               <a:spcBef>
                 <a:spcPts val="0"/>
               </a:spcBef>
@@ -2546,7 +2623,7 @@
               <a:buChar char="■"/>
               <a:defRPr/>
             </a:lvl3pPr>
-            <a:lvl4pPr indent="-317500" lvl="3" marL="1828800">
+            <a:lvl4pPr marL="1828800" lvl="3" indent="-317500">
               <a:spcBef>
                 <a:spcPts val="0"/>
               </a:spcBef>
@@ -2557,7 +2634,7 @@
               <a:buChar char="●"/>
               <a:defRPr/>
             </a:lvl4pPr>
-            <a:lvl5pPr indent="-317500" lvl="4" marL="2286000">
+            <a:lvl5pPr marL="2286000" lvl="4" indent="-317500">
               <a:spcBef>
                 <a:spcPts val="0"/>
               </a:spcBef>
@@ -2568,7 +2645,7 @@
               <a:buChar char="○"/>
               <a:defRPr/>
             </a:lvl5pPr>
-            <a:lvl6pPr indent="-317500" lvl="5" marL="2743200">
+            <a:lvl6pPr marL="2743200" lvl="5" indent="-317500">
               <a:spcBef>
                 <a:spcPts val="0"/>
               </a:spcBef>
@@ -2579,7 +2656,7 @@
               <a:buChar char="■"/>
               <a:defRPr/>
             </a:lvl6pPr>
-            <a:lvl7pPr indent="-317500" lvl="6" marL="3200400">
+            <a:lvl7pPr marL="3200400" lvl="6" indent="-317500">
               <a:spcBef>
                 <a:spcPts val="0"/>
               </a:spcBef>
@@ -2590,7 +2667,7 @@
               <a:buChar char="●"/>
               <a:defRPr/>
             </a:lvl7pPr>
-            <a:lvl8pPr indent="-317500" lvl="7" marL="3657600">
+            <a:lvl8pPr marL="3657600" lvl="7" indent="-317500">
               <a:spcBef>
                 <a:spcPts val="0"/>
               </a:spcBef>
@@ -2601,7 +2678,7 @@
               <a:buChar char="○"/>
               <a:defRPr/>
             </a:lvl8pPr>
-            <a:lvl9pPr indent="-317500" lvl="8" marL="4114800">
+            <a:lvl9pPr marL="4114800" lvl="8" indent="-317500">
               <a:spcBef>
                 <a:spcPts val="0"/>
               </a:spcBef>
@@ -2613,15 +2690,19 @@
               <a:defRPr/>
             </a:lvl9pPr>
           </a:lstStyle>
-          <a:p/>
+          <a:p>
+            <a:endParaRPr/>
+          </a:p>
         </p:txBody>
       </p:sp>
       <p:sp>
         <p:nvSpPr>
           <p:cNvPr id="19" name="Google Shape;19;p4"/>
-          <p:cNvSpPr txBox="1"/>
+          <p:cNvSpPr txBox="1">
+            <a:spLocks noGrp="1"/>
+          </p:cNvSpPr>
           <p:nvPr>
-            <p:ph idx="12" type="sldNum"/>
+            <p:ph type="sldNum" idx="12"/>
           </p:nvPr>
         </p:nvSpPr>
         <p:spPr>
@@ -2634,7 +2715,7 @@
           </a:prstGeom>
         </p:spPr>
         <p:txBody>
-          <a:bodyPr anchorCtr="0" anchor="ctr" bIns="91425" lIns="91425" spcFirstLastPara="1" rIns="91425" wrap="square" tIns="91425">
+          <a:bodyPr spcFirstLastPara="1" wrap="square" lIns="91425" tIns="91425" rIns="91425" bIns="91425" anchor="ctr" anchorCtr="0">
             <a:normAutofit/>
           </a:bodyPr>
           <a:lstStyle>
@@ -2676,7 +2757,7 @@
             </a:lvl9pPr>
           </a:lstStyle>
           <a:p>
-            <a:pPr indent="0" lvl="0" marL="0" rtl="0" algn="r">
+            <a:pPr marL="0" lvl="0" indent="0" algn="r" rtl="0">
               <a:spcBef>
                 <a:spcPts val="0"/>
               </a:spcBef>
@@ -2702,11 +2783,11 @@
 </file>
 
 <file path=ppt/slideLayouts/slideLayout4.xml><?xml version="1.0" encoding="utf-8"?>
-<p:sldLayout xmlns:a="http://schemas.openxmlformats.org/drawingml/2006/main" xmlns:r="http://schemas.openxmlformats.org/officeDocument/2006/relationships" xmlns:mc="http://schemas.openxmlformats.org/markup-compatibility/2006" xmlns:mv="urn:schemas-microsoft-com:mac:vml" xmlns:p="http://schemas.openxmlformats.org/presentationml/2006/main" xmlns:c="http://schemas.openxmlformats.org/drawingml/2006/chart" xmlns:dgm="http://schemas.openxmlformats.org/drawingml/2006/diagram" xmlns:o="urn:schemas-microsoft-com:office:office" xmlns:v="urn:schemas-microsoft-com:vml" xmlns:pvml="urn:schemas-microsoft-com:office:powerpoint" xmlns:com="http://schemas.openxmlformats.org/drawingml/2006/compatibility" xmlns:p14="http://schemas.microsoft.com/office/powerpoint/2010/main" xmlns:p15="http://schemas.microsoft.com/office/powerpoint/2012/main" xmlns:ahyp="http://schemas.microsoft.com/office/drawing/2018/hyperlinkcolor" matchingName="Title and two columns" type="twoColTx">
+<p:sldLayout xmlns:a="http://schemas.openxmlformats.org/drawingml/2006/main" xmlns:r="http://schemas.openxmlformats.org/officeDocument/2006/relationships" xmlns:p="http://schemas.openxmlformats.org/presentationml/2006/main" matchingName="Title and two columns" type="twoColTx">
   <p:cSld name="TITLE_AND_TWO_COLUMNS">
     <p:spTree>
       <p:nvGrpSpPr>
-        <p:cNvPr id="20" name="Shape 20"/>
+        <p:cNvPr id="1" name="Shape 20"/>
         <p:cNvGrpSpPr/>
         <p:nvPr/>
       </p:nvGrpSpPr>
@@ -2721,7 +2802,9 @@
       <p:sp>
         <p:nvSpPr>
           <p:cNvPr id="21" name="Google Shape;21;p5"/>
-          <p:cNvSpPr txBox="1"/>
+          <p:cNvSpPr txBox="1">
+            <a:spLocks noGrp="1"/>
+          </p:cNvSpPr>
           <p:nvPr>
             <p:ph type="title"/>
           </p:nvPr>
@@ -2736,7 +2819,7 @@
           </a:prstGeom>
         </p:spPr>
         <p:txBody>
-          <a:bodyPr anchorCtr="0" anchor="t" bIns="91425" lIns="91425" spcFirstLastPara="1" rIns="91425" wrap="square" tIns="91425">
+          <a:bodyPr spcFirstLastPara="1" wrap="square" lIns="91425" tIns="91425" rIns="91425" bIns="91425" anchor="t" anchorCtr="0">
             <a:normAutofit/>
           </a:bodyPr>
           <a:lstStyle>
@@ -2840,15 +2923,19 @@
               <a:defRPr/>
             </a:lvl9pPr>
           </a:lstStyle>
-          <a:p/>
+          <a:p>
+            <a:endParaRPr/>
+          </a:p>
         </p:txBody>
       </p:sp>
       <p:sp>
         <p:nvSpPr>
           <p:cNvPr id="22" name="Google Shape;22;p5"/>
-          <p:cNvSpPr txBox="1"/>
+          <p:cNvSpPr txBox="1">
+            <a:spLocks noGrp="1"/>
+          </p:cNvSpPr>
           <p:nvPr>
-            <p:ph idx="1" type="body"/>
+            <p:ph type="body" idx="1"/>
           </p:nvPr>
         </p:nvSpPr>
         <p:spPr>
@@ -2861,11 +2948,11 @@
           </a:prstGeom>
         </p:spPr>
         <p:txBody>
-          <a:bodyPr anchorCtr="0" anchor="t" bIns="91425" lIns="91425" spcFirstLastPara="1" rIns="91425" wrap="square" tIns="91425">
+          <a:bodyPr spcFirstLastPara="1" wrap="square" lIns="91425" tIns="91425" rIns="91425" bIns="91425" anchor="t" anchorCtr="0">
             <a:normAutofit/>
           </a:bodyPr>
           <a:lstStyle>
-            <a:lvl1pPr indent="-317500" lvl="0" marL="457200">
+            <a:lvl1pPr marL="457200" lvl="0" indent="-317500">
               <a:spcBef>
                 <a:spcPts val="0"/>
               </a:spcBef>
@@ -2876,7 +2963,7 @@
               <a:buChar char="●"/>
               <a:defRPr sz="1400"/>
             </a:lvl1pPr>
-            <a:lvl2pPr indent="-304800" lvl="1" marL="914400">
+            <a:lvl2pPr marL="914400" lvl="1" indent="-304800">
               <a:spcBef>
                 <a:spcPts val="0"/>
               </a:spcBef>
@@ -2887,7 +2974,7 @@
               <a:buChar char="○"/>
               <a:defRPr sz="1200"/>
             </a:lvl2pPr>
-            <a:lvl3pPr indent="-304800" lvl="2" marL="1371600">
+            <a:lvl3pPr marL="1371600" lvl="2" indent="-304800">
               <a:spcBef>
                 <a:spcPts val="0"/>
               </a:spcBef>
@@ -2898,7 +2985,7 @@
               <a:buChar char="■"/>
               <a:defRPr sz="1200"/>
             </a:lvl3pPr>
-            <a:lvl4pPr indent="-304800" lvl="3" marL="1828800">
+            <a:lvl4pPr marL="1828800" lvl="3" indent="-304800">
               <a:spcBef>
                 <a:spcPts val="0"/>
               </a:spcBef>
@@ -2909,7 +2996,7 @@
               <a:buChar char="●"/>
               <a:defRPr sz="1200"/>
             </a:lvl4pPr>
-            <a:lvl5pPr indent="-304800" lvl="4" marL="2286000">
+            <a:lvl5pPr marL="2286000" lvl="4" indent="-304800">
               <a:spcBef>
                 <a:spcPts val="0"/>
               </a:spcBef>
@@ -2920,7 +3007,7 @@
               <a:buChar char="○"/>
               <a:defRPr sz="1200"/>
             </a:lvl5pPr>
-            <a:lvl6pPr indent="-304800" lvl="5" marL="2743200">
+            <a:lvl6pPr marL="2743200" lvl="5" indent="-304800">
               <a:spcBef>
                 <a:spcPts val="0"/>
               </a:spcBef>
@@ -2931,7 +3018,7 @@
               <a:buChar char="■"/>
               <a:defRPr sz="1200"/>
             </a:lvl6pPr>
-            <a:lvl7pPr indent="-304800" lvl="6" marL="3200400">
+            <a:lvl7pPr marL="3200400" lvl="6" indent="-304800">
               <a:spcBef>
                 <a:spcPts val="0"/>
               </a:spcBef>
@@ -2942,7 +3029,7 @@
               <a:buChar char="●"/>
               <a:defRPr sz="1200"/>
             </a:lvl7pPr>
-            <a:lvl8pPr indent="-304800" lvl="7" marL="3657600">
+            <a:lvl8pPr marL="3657600" lvl="7" indent="-304800">
               <a:spcBef>
                 <a:spcPts val="0"/>
               </a:spcBef>
@@ -2953,7 +3040,7 @@
               <a:buChar char="○"/>
               <a:defRPr sz="1200"/>
             </a:lvl8pPr>
-            <a:lvl9pPr indent="-304800" lvl="8" marL="4114800">
+            <a:lvl9pPr marL="4114800" lvl="8" indent="-304800">
               <a:spcBef>
                 <a:spcPts val="0"/>
               </a:spcBef>
@@ -2965,15 +3052,19 @@
               <a:defRPr sz="1200"/>
             </a:lvl9pPr>
           </a:lstStyle>
-          <a:p/>
+          <a:p>
+            <a:endParaRPr/>
+          </a:p>
         </p:txBody>
       </p:sp>
       <p:sp>
         <p:nvSpPr>
           <p:cNvPr id="23" name="Google Shape;23;p5"/>
-          <p:cNvSpPr txBox="1"/>
+          <p:cNvSpPr txBox="1">
+            <a:spLocks noGrp="1"/>
+          </p:cNvSpPr>
           <p:nvPr>
-            <p:ph idx="2" type="body"/>
+            <p:ph type="body" idx="2"/>
           </p:nvPr>
         </p:nvSpPr>
         <p:spPr>
@@ -2986,11 +3077,11 @@
           </a:prstGeom>
         </p:spPr>
         <p:txBody>
-          <a:bodyPr anchorCtr="0" anchor="t" bIns="91425" lIns="91425" spcFirstLastPara="1" rIns="91425" wrap="square" tIns="91425">
+          <a:bodyPr spcFirstLastPara="1" wrap="square" lIns="91425" tIns="91425" rIns="91425" bIns="91425" anchor="t" anchorCtr="0">
             <a:normAutofit/>
           </a:bodyPr>
           <a:lstStyle>
-            <a:lvl1pPr indent="-317500" lvl="0" marL="457200">
+            <a:lvl1pPr marL="457200" lvl="0" indent="-317500">
               <a:spcBef>
                 <a:spcPts val="0"/>
               </a:spcBef>
@@ -3001,7 +3092,7 @@
               <a:buChar char="●"/>
               <a:defRPr sz="1400"/>
             </a:lvl1pPr>
-            <a:lvl2pPr indent="-304800" lvl="1" marL="914400">
+            <a:lvl2pPr marL="914400" lvl="1" indent="-304800">
               <a:spcBef>
                 <a:spcPts val="0"/>
               </a:spcBef>
@@ -3012,7 +3103,7 @@
               <a:buChar char="○"/>
               <a:defRPr sz="1200"/>
             </a:lvl2pPr>
-            <a:lvl3pPr indent="-304800" lvl="2" marL="1371600">
+            <a:lvl3pPr marL="1371600" lvl="2" indent="-304800">
               <a:spcBef>
                 <a:spcPts val="0"/>
               </a:spcBef>
@@ -3023,7 +3114,7 @@
               <a:buChar char="■"/>
               <a:defRPr sz="1200"/>
             </a:lvl3pPr>
-            <a:lvl4pPr indent="-304800" lvl="3" marL="1828800">
+            <a:lvl4pPr marL="1828800" lvl="3" indent="-304800">
               <a:spcBef>
                 <a:spcPts val="0"/>
               </a:spcBef>
@@ -3034,7 +3125,7 @@
               <a:buChar char="●"/>
               <a:defRPr sz="1200"/>
             </a:lvl4pPr>
-            <a:lvl5pPr indent="-304800" lvl="4" marL="2286000">
+            <a:lvl5pPr marL="2286000" lvl="4" indent="-304800">
               <a:spcBef>
                 <a:spcPts val="0"/>
               </a:spcBef>
@@ -3045,7 +3136,7 @@
               <a:buChar char="○"/>
               <a:defRPr sz="1200"/>
             </a:lvl5pPr>
-            <a:lvl6pPr indent="-304800" lvl="5" marL="2743200">
+            <a:lvl6pPr marL="2743200" lvl="5" indent="-304800">
               <a:spcBef>
                 <a:spcPts val="0"/>
               </a:spcBef>
@@ -3056,7 +3147,7 @@
               <a:buChar char="■"/>
               <a:defRPr sz="1200"/>
             </a:lvl6pPr>
-            <a:lvl7pPr indent="-304800" lvl="6" marL="3200400">
+            <a:lvl7pPr marL="3200400" lvl="6" indent="-304800">
               <a:spcBef>
                 <a:spcPts val="0"/>
               </a:spcBef>
@@ -3067,7 +3158,7 @@
               <a:buChar char="●"/>
               <a:defRPr sz="1200"/>
             </a:lvl7pPr>
-            <a:lvl8pPr indent="-304800" lvl="7" marL="3657600">
+            <a:lvl8pPr marL="3657600" lvl="7" indent="-304800">
               <a:spcBef>
                 <a:spcPts val="0"/>
               </a:spcBef>
@@ -3078,7 +3169,7 @@
               <a:buChar char="○"/>
               <a:defRPr sz="1200"/>
             </a:lvl8pPr>
-            <a:lvl9pPr indent="-304800" lvl="8" marL="4114800">
+            <a:lvl9pPr marL="4114800" lvl="8" indent="-304800">
               <a:spcBef>
                 <a:spcPts val="0"/>
               </a:spcBef>
@@ -3090,15 +3181,19 @@
               <a:defRPr sz="1200"/>
             </a:lvl9pPr>
           </a:lstStyle>
-          <a:p/>
+          <a:p>
+            <a:endParaRPr/>
+          </a:p>
         </p:txBody>
       </p:sp>
       <p:sp>
         <p:nvSpPr>
           <p:cNvPr id="24" name="Google Shape;24;p5"/>
-          <p:cNvSpPr txBox="1"/>
+          <p:cNvSpPr txBox="1">
+            <a:spLocks noGrp="1"/>
+          </p:cNvSpPr>
           <p:nvPr>
-            <p:ph idx="12" type="sldNum"/>
+            <p:ph type="sldNum" idx="12"/>
           </p:nvPr>
         </p:nvSpPr>
         <p:spPr>
@@ -3111,7 +3206,7 @@
           </a:prstGeom>
         </p:spPr>
         <p:txBody>
-          <a:bodyPr anchorCtr="0" anchor="ctr" bIns="91425" lIns="91425" spcFirstLastPara="1" rIns="91425" wrap="square" tIns="91425">
+          <a:bodyPr spcFirstLastPara="1" wrap="square" lIns="91425" tIns="91425" rIns="91425" bIns="91425" anchor="ctr" anchorCtr="0">
             <a:normAutofit/>
           </a:bodyPr>
           <a:lstStyle>
@@ -3153,7 +3248,7 @@
             </a:lvl9pPr>
           </a:lstStyle>
           <a:p>
-            <a:pPr indent="0" lvl="0" marL="0" rtl="0" algn="r">
+            <a:pPr marL="0" lvl="0" indent="0" algn="r" rtl="0">
               <a:spcBef>
                 <a:spcPts val="0"/>
               </a:spcBef>
@@ -3179,11 +3274,11 @@
 </file>
 
 <file path=ppt/slideLayouts/slideLayout5.xml><?xml version="1.0" encoding="utf-8"?>
-<p:sldLayout xmlns:a="http://schemas.openxmlformats.org/drawingml/2006/main" xmlns:r="http://schemas.openxmlformats.org/officeDocument/2006/relationships" xmlns:mc="http://schemas.openxmlformats.org/markup-compatibility/2006" xmlns:mv="urn:schemas-microsoft-com:mac:vml" xmlns:p="http://schemas.openxmlformats.org/presentationml/2006/main" xmlns:c="http://schemas.openxmlformats.org/drawingml/2006/chart" xmlns:dgm="http://schemas.openxmlformats.org/drawingml/2006/diagram" xmlns:o="urn:schemas-microsoft-com:office:office" xmlns:v="urn:schemas-microsoft-com:vml" xmlns:pvml="urn:schemas-microsoft-com:office:powerpoint" xmlns:com="http://schemas.openxmlformats.org/drawingml/2006/compatibility" xmlns:p14="http://schemas.microsoft.com/office/powerpoint/2010/main" xmlns:p15="http://schemas.microsoft.com/office/powerpoint/2012/main" xmlns:ahyp="http://schemas.microsoft.com/office/drawing/2018/hyperlinkcolor" matchingName="Title only" type="titleOnly">
+<p:sldLayout xmlns:a="http://schemas.openxmlformats.org/drawingml/2006/main" xmlns:r="http://schemas.openxmlformats.org/officeDocument/2006/relationships" xmlns:p="http://schemas.openxmlformats.org/presentationml/2006/main" matchingName="Title only" type="titleOnly">
   <p:cSld name="TITLE_ONLY">
     <p:spTree>
       <p:nvGrpSpPr>
-        <p:cNvPr id="25" name="Shape 25"/>
+        <p:cNvPr id="1" name="Shape 25"/>
         <p:cNvGrpSpPr/>
         <p:nvPr/>
       </p:nvGrpSpPr>
@@ -3198,7 +3293,9 @@
       <p:sp>
         <p:nvSpPr>
           <p:cNvPr id="26" name="Google Shape;26;p6"/>
-          <p:cNvSpPr txBox="1"/>
+          <p:cNvSpPr txBox="1">
+            <a:spLocks noGrp="1"/>
+          </p:cNvSpPr>
           <p:nvPr>
             <p:ph type="title"/>
           </p:nvPr>
@@ -3213,7 +3310,7 @@
           </a:prstGeom>
         </p:spPr>
         <p:txBody>
-          <a:bodyPr anchorCtr="0" anchor="t" bIns="91425" lIns="91425" spcFirstLastPara="1" rIns="91425" wrap="square" tIns="91425">
+          <a:bodyPr spcFirstLastPara="1" wrap="square" lIns="91425" tIns="91425" rIns="91425" bIns="91425" anchor="t" anchorCtr="0">
             <a:normAutofit/>
           </a:bodyPr>
           <a:lstStyle>
@@ -3317,15 +3414,19 @@
               <a:defRPr/>
             </a:lvl9pPr>
           </a:lstStyle>
-          <a:p/>
+          <a:p>
+            <a:endParaRPr/>
+          </a:p>
         </p:txBody>
       </p:sp>
       <p:sp>
         <p:nvSpPr>
           <p:cNvPr id="27" name="Google Shape;27;p6"/>
-          <p:cNvSpPr txBox="1"/>
+          <p:cNvSpPr txBox="1">
+            <a:spLocks noGrp="1"/>
+          </p:cNvSpPr>
           <p:nvPr>
-            <p:ph idx="12" type="sldNum"/>
+            <p:ph type="sldNum" idx="12"/>
           </p:nvPr>
         </p:nvSpPr>
         <p:spPr>
@@ -3338,7 +3439,7 @@
           </a:prstGeom>
         </p:spPr>
         <p:txBody>
-          <a:bodyPr anchorCtr="0" anchor="ctr" bIns="91425" lIns="91425" spcFirstLastPara="1" rIns="91425" wrap="square" tIns="91425">
+          <a:bodyPr spcFirstLastPara="1" wrap="square" lIns="91425" tIns="91425" rIns="91425" bIns="91425" anchor="ctr" anchorCtr="0">
             <a:normAutofit/>
           </a:bodyPr>
           <a:lstStyle>
@@ -3380,7 +3481,7 @@
             </a:lvl9pPr>
           </a:lstStyle>
           <a:p>
-            <a:pPr indent="0" lvl="0" marL="0" rtl="0" algn="r">
+            <a:pPr marL="0" lvl="0" indent="0" algn="r" rtl="0">
               <a:spcBef>
                 <a:spcPts val="0"/>
               </a:spcBef>
@@ -3406,11 +3507,11 @@
 </file>
 
 <file path=ppt/slideLayouts/slideLayout6.xml><?xml version="1.0" encoding="utf-8"?>
-<p:sldLayout xmlns:a="http://schemas.openxmlformats.org/drawingml/2006/main" xmlns:r="http://schemas.openxmlformats.org/officeDocument/2006/relationships" xmlns:mc="http://schemas.openxmlformats.org/markup-compatibility/2006" xmlns:mv="urn:schemas-microsoft-com:mac:vml" xmlns:p="http://schemas.openxmlformats.org/presentationml/2006/main" xmlns:c="http://schemas.openxmlformats.org/drawingml/2006/chart" xmlns:dgm="http://schemas.openxmlformats.org/drawingml/2006/diagram" xmlns:o="urn:schemas-microsoft-com:office:office" xmlns:v="urn:schemas-microsoft-com:vml" xmlns:pvml="urn:schemas-microsoft-com:office:powerpoint" xmlns:com="http://schemas.openxmlformats.org/drawingml/2006/compatibility" xmlns:p14="http://schemas.microsoft.com/office/powerpoint/2010/main" xmlns:p15="http://schemas.microsoft.com/office/powerpoint/2012/main" xmlns:ahyp="http://schemas.microsoft.com/office/drawing/2018/hyperlinkcolor" matchingName="One column text">
+<p:sldLayout xmlns:a="http://schemas.openxmlformats.org/drawingml/2006/main" xmlns:r="http://schemas.openxmlformats.org/officeDocument/2006/relationships" xmlns:p="http://schemas.openxmlformats.org/presentationml/2006/main" matchingName="One column text">
   <p:cSld name="ONE_COLUMN_TEXT">
     <p:spTree>
       <p:nvGrpSpPr>
-        <p:cNvPr id="28" name="Shape 28"/>
+        <p:cNvPr id="1" name="Shape 28"/>
         <p:cNvGrpSpPr/>
         <p:nvPr/>
       </p:nvGrpSpPr>
@@ -3425,7 +3526,9 @@
       <p:sp>
         <p:nvSpPr>
           <p:cNvPr id="29" name="Google Shape;29;p7"/>
-          <p:cNvSpPr txBox="1"/>
+          <p:cNvSpPr txBox="1">
+            <a:spLocks noGrp="1"/>
+          </p:cNvSpPr>
           <p:nvPr>
             <p:ph type="title"/>
           </p:nvPr>
@@ -3440,7 +3543,7 @@
           </a:prstGeom>
         </p:spPr>
         <p:txBody>
-          <a:bodyPr anchorCtr="0" anchor="b" bIns="91425" lIns="91425" spcFirstLastPara="1" rIns="91425" wrap="square" tIns="91425">
+          <a:bodyPr spcFirstLastPara="1" wrap="square" lIns="91425" tIns="91425" rIns="91425" bIns="91425" anchor="b" anchorCtr="0">
             <a:normAutofit/>
           </a:bodyPr>
           <a:lstStyle>
@@ -3544,15 +3647,19 @@
               <a:defRPr sz="2400"/>
             </a:lvl9pPr>
           </a:lstStyle>
-          <a:p/>
+          <a:p>
+            <a:endParaRPr/>
+          </a:p>
         </p:txBody>
       </p:sp>
       <p:sp>
         <p:nvSpPr>
           <p:cNvPr id="30" name="Google Shape;30;p7"/>
-          <p:cNvSpPr txBox="1"/>
+          <p:cNvSpPr txBox="1">
+            <a:spLocks noGrp="1"/>
+          </p:cNvSpPr>
           <p:nvPr>
-            <p:ph idx="1" type="body"/>
+            <p:ph type="body" idx="1"/>
           </p:nvPr>
         </p:nvSpPr>
         <p:spPr>
@@ -3565,11 +3672,11 @@
           </a:prstGeom>
         </p:spPr>
         <p:txBody>
-          <a:bodyPr anchorCtr="0" anchor="t" bIns="91425" lIns="91425" spcFirstLastPara="1" rIns="91425" wrap="square" tIns="91425">
+          <a:bodyPr spcFirstLastPara="1" wrap="square" lIns="91425" tIns="91425" rIns="91425" bIns="91425" anchor="t" anchorCtr="0">
             <a:normAutofit/>
           </a:bodyPr>
           <a:lstStyle>
-            <a:lvl1pPr indent="-304800" lvl="0" marL="457200">
+            <a:lvl1pPr marL="457200" lvl="0" indent="-304800">
               <a:spcBef>
                 <a:spcPts val="0"/>
               </a:spcBef>
@@ -3580,7 +3687,7 @@
               <a:buChar char="●"/>
               <a:defRPr sz="1200"/>
             </a:lvl1pPr>
-            <a:lvl2pPr indent="-304800" lvl="1" marL="914400">
+            <a:lvl2pPr marL="914400" lvl="1" indent="-304800">
               <a:spcBef>
                 <a:spcPts val="0"/>
               </a:spcBef>
@@ -3591,7 +3698,7 @@
               <a:buChar char="○"/>
               <a:defRPr sz="1200"/>
             </a:lvl2pPr>
-            <a:lvl3pPr indent="-304800" lvl="2" marL="1371600">
+            <a:lvl3pPr marL="1371600" lvl="2" indent="-304800">
               <a:spcBef>
                 <a:spcPts val="0"/>
               </a:spcBef>
@@ -3602,7 +3709,7 @@
               <a:buChar char="■"/>
               <a:defRPr sz="1200"/>
             </a:lvl3pPr>
-            <a:lvl4pPr indent="-304800" lvl="3" marL="1828800">
+            <a:lvl4pPr marL="1828800" lvl="3" indent="-304800">
               <a:spcBef>
                 <a:spcPts val="0"/>
               </a:spcBef>
@@ -3613,7 +3720,7 @@
               <a:buChar char="●"/>
               <a:defRPr sz="1200"/>
             </a:lvl4pPr>
-            <a:lvl5pPr indent="-304800" lvl="4" marL="2286000">
+            <a:lvl5pPr marL="2286000" lvl="4" indent="-304800">
               <a:spcBef>
                 <a:spcPts val="0"/>
               </a:spcBef>
@@ -3624,7 +3731,7 @@
               <a:buChar char="○"/>
               <a:defRPr sz="1200"/>
             </a:lvl5pPr>
-            <a:lvl6pPr indent="-304800" lvl="5" marL="2743200">
+            <a:lvl6pPr marL="2743200" lvl="5" indent="-304800">
               <a:spcBef>
                 <a:spcPts val="0"/>
               </a:spcBef>
@@ -3635,7 +3742,7 @@
               <a:buChar char="■"/>
               <a:defRPr sz="1200"/>
             </a:lvl6pPr>
-            <a:lvl7pPr indent="-304800" lvl="6" marL="3200400">
+            <a:lvl7pPr marL="3200400" lvl="6" indent="-304800">
               <a:spcBef>
                 <a:spcPts val="0"/>
               </a:spcBef>
@@ -3646,7 +3753,7 @@
               <a:buChar char="●"/>
               <a:defRPr sz="1200"/>
             </a:lvl7pPr>
-            <a:lvl8pPr indent="-304800" lvl="7" marL="3657600">
+            <a:lvl8pPr marL="3657600" lvl="7" indent="-304800">
               <a:spcBef>
                 <a:spcPts val="0"/>
               </a:spcBef>
@@ -3657,7 +3764,7 @@
               <a:buChar char="○"/>
               <a:defRPr sz="1200"/>
             </a:lvl8pPr>
-            <a:lvl9pPr indent="-304800" lvl="8" marL="4114800">
+            <a:lvl9pPr marL="4114800" lvl="8" indent="-304800">
               <a:spcBef>
                 <a:spcPts val="0"/>
               </a:spcBef>
@@ -3669,15 +3776,19 @@
               <a:defRPr sz="1200"/>
             </a:lvl9pPr>
           </a:lstStyle>
-          <a:p/>
+          <a:p>
+            <a:endParaRPr/>
+          </a:p>
         </p:txBody>
       </p:sp>
       <p:sp>
         <p:nvSpPr>
           <p:cNvPr id="31" name="Google Shape;31;p7"/>
-          <p:cNvSpPr txBox="1"/>
+          <p:cNvSpPr txBox="1">
+            <a:spLocks noGrp="1"/>
+          </p:cNvSpPr>
           <p:nvPr>
-            <p:ph idx="12" type="sldNum"/>
+            <p:ph type="sldNum" idx="12"/>
           </p:nvPr>
         </p:nvSpPr>
         <p:spPr>
@@ -3690,7 +3801,7 @@
           </a:prstGeom>
         </p:spPr>
         <p:txBody>
-          <a:bodyPr anchorCtr="0" anchor="ctr" bIns="91425" lIns="91425" spcFirstLastPara="1" rIns="91425" wrap="square" tIns="91425">
+          <a:bodyPr spcFirstLastPara="1" wrap="square" lIns="91425" tIns="91425" rIns="91425" bIns="91425" anchor="ctr" anchorCtr="0">
             <a:normAutofit/>
           </a:bodyPr>
           <a:lstStyle>
@@ -3732,7 +3843,7 @@
             </a:lvl9pPr>
           </a:lstStyle>
           <a:p>
-            <a:pPr indent="0" lvl="0" marL="0" rtl="0" algn="r">
+            <a:pPr marL="0" lvl="0" indent="0" algn="r" rtl="0">
               <a:spcBef>
                 <a:spcPts val="0"/>
               </a:spcBef>
@@ -3758,11 +3869,11 @@
 </file>
 
 <file path=ppt/slideLayouts/slideLayout7.xml><?xml version="1.0" encoding="utf-8"?>
-<p:sldLayout xmlns:a="http://schemas.openxmlformats.org/drawingml/2006/main" xmlns:r="http://schemas.openxmlformats.org/officeDocument/2006/relationships" xmlns:mc="http://schemas.openxmlformats.org/markup-compatibility/2006" xmlns:mv="urn:schemas-microsoft-com:mac:vml" xmlns:p="http://schemas.openxmlformats.org/presentationml/2006/main" xmlns:c="http://schemas.openxmlformats.org/drawingml/2006/chart" xmlns:dgm="http://schemas.openxmlformats.org/drawingml/2006/diagram" xmlns:o="urn:schemas-microsoft-com:office:office" xmlns:v="urn:schemas-microsoft-com:vml" xmlns:pvml="urn:schemas-microsoft-com:office:powerpoint" xmlns:com="http://schemas.openxmlformats.org/drawingml/2006/compatibility" xmlns:p14="http://schemas.microsoft.com/office/powerpoint/2010/main" xmlns:p15="http://schemas.microsoft.com/office/powerpoint/2012/main" xmlns:ahyp="http://schemas.microsoft.com/office/drawing/2018/hyperlinkcolor" matchingName="Main point">
+<p:sldLayout xmlns:a="http://schemas.openxmlformats.org/drawingml/2006/main" xmlns:r="http://schemas.openxmlformats.org/officeDocument/2006/relationships" xmlns:p="http://schemas.openxmlformats.org/presentationml/2006/main" matchingName="Main point">
   <p:cSld name="MAIN_POINT">
     <p:spTree>
       <p:nvGrpSpPr>
-        <p:cNvPr id="32" name="Shape 32"/>
+        <p:cNvPr id="1" name="Shape 32"/>
         <p:cNvGrpSpPr/>
         <p:nvPr/>
       </p:nvGrpSpPr>
@@ -3777,7 +3888,9 @@
       <p:sp>
         <p:nvSpPr>
           <p:cNvPr id="33" name="Google Shape;33;p8"/>
-          <p:cNvSpPr txBox="1"/>
+          <p:cNvSpPr txBox="1">
+            <a:spLocks noGrp="1"/>
+          </p:cNvSpPr>
           <p:nvPr>
             <p:ph type="title"/>
           </p:nvPr>
@@ -3792,7 +3905,7 @@
           </a:prstGeom>
         </p:spPr>
         <p:txBody>
-          <a:bodyPr anchorCtr="0" anchor="ctr" bIns="91425" lIns="91425" spcFirstLastPara="1" rIns="91425" wrap="square" tIns="91425">
+          <a:bodyPr spcFirstLastPara="1" wrap="square" lIns="91425" tIns="91425" rIns="91425" bIns="91425" anchor="ctr" anchorCtr="0">
             <a:normAutofit/>
           </a:bodyPr>
           <a:lstStyle>
@@ -3896,15 +4009,19 @@
               <a:defRPr sz="4800"/>
             </a:lvl9pPr>
           </a:lstStyle>
-          <a:p/>
+          <a:p>
+            <a:endParaRPr/>
+          </a:p>
         </p:txBody>
       </p:sp>
       <p:sp>
         <p:nvSpPr>
           <p:cNvPr id="34" name="Google Shape;34;p8"/>
-          <p:cNvSpPr txBox="1"/>
+          <p:cNvSpPr txBox="1">
+            <a:spLocks noGrp="1"/>
+          </p:cNvSpPr>
           <p:nvPr>
-            <p:ph idx="12" type="sldNum"/>
+            <p:ph type="sldNum" idx="12"/>
           </p:nvPr>
         </p:nvSpPr>
         <p:spPr>
@@ -3917,7 +4034,7 @@
           </a:prstGeom>
         </p:spPr>
         <p:txBody>
-          <a:bodyPr anchorCtr="0" anchor="ctr" bIns="91425" lIns="91425" spcFirstLastPara="1" rIns="91425" wrap="square" tIns="91425">
+          <a:bodyPr spcFirstLastPara="1" wrap="square" lIns="91425" tIns="91425" rIns="91425" bIns="91425" anchor="ctr" anchorCtr="0">
             <a:normAutofit/>
           </a:bodyPr>
           <a:lstStyle>
@@ -3959,7 +4076,7 @@
             </a:lvl9pPr>
           </a:lstStyle>
           <a:p>
-            <a:pPr indent="0" lvl="0" marL="0" rtl="0" algn="r">
+            <a:pPr marL="0" lvl="0" indent="0" algn="r" rtl="0">
               <a:spcBef>
                 <a:spcPts val="0"/>
               </a:spcBef>
@@ -3985,11 +4102,11 @@
 </file>
 
 <file path=ppt/slideLayouts/slideLayout8.xml><?xml version="1.0" encoding="utf-8"?>
-<p:sldLayout xmlns:a="http://schemas.openxmlformats.org/drawingml/2006/main" xmlns:r="http://schemas.openxmlformats.org/officeDocument/2006/relationships" xmlns:mc="http://schemas.openxmlformats.org/markup-compatibility/2006" xmlns:mv="urn:schemas-microsoft-com:mac:vml" xmlns:p="http://schemas.openxmlformats.org/presentationml/2006/main" xmlns:c="http://schemas.openxmlformats.org/drawingml/2006/chart" xmlns:dgm="http://schemas.openxmlformats.org/drawingml/2006/diagram" xmlns:o="urn:schemas-microsoft-com:office:office" xmlns:v="urn:schemas-microsoft-com:vml" xmlns:pvml="urn:schemas-microsoft-com:office:powerpoint" xmlns:com="http://schemas.openxmlformats.org/drawingml/2006/compatibility" xmlns:p14="http://schemas.microsoft.com/office/powerpoint/2010/main" xmlns:p15="http://schemas.microsoft.com/office/powerpoint/2012/main" xmlns:ahyp="http://schemas.microsoft.com/office/drawing/2018/hyperlinkcolor" matchingName="Section title and description">
+<p:sldLayout xmlns:a="http://schemas.openxmlformats.org/drawingml/2006/main" xmlns:r="http://schemas.openxmlformats.org/officeDocument/2006/relationships" xmlns:p="http://schemas.openxmlformats.org/presentationml/2006/main" matchingName="Section title and description">
   <p:cSld name="SECTION_TITLE_AND_DESCRIPTION">
     <p:spTree>
       <p:nvGrpSpPr>
-        <p:cNvPr id="35" name="Shape 35"/>
+        <p:cNvPr id="1" name="Shape 35"/>
         <p:cNvGrpSpPr/>
         <p:nvPr/>
       </p:nvGrpSpPr>
@@ -4023,12 +4140,12 @@
           </a:ln>
         </p:spPr>
         <p:txBody>
-          <a:bodyPr anchorCtr="0" anchor="ctr" bIns="91425" lIns="91425" spcFirstLastPara="1" rIns="91425" wrap="square" tIns="91425">
+          <a:bodyPr spcFirstLastPara="1" wrap="square" lIns="91425" tIns="91425" rIns="91425" bIns="91425" anchor="ctr" anchorCtr="0">
             <a:noAutofit/>
           </a:bodyPr>
           <a:lstStyle/>
           <a:p>
-            <a:pPr indent="0" lvl="0" marL="0" rtl="0" algn="l">
+            <a:pPr marL="0" lvl="0" indent="0" algn="l" rtl="0">
               <a:spcBef>
                 <a:spcPts val="0"/>
               </a:spcBef>
@@ -4037,9 +4154,6 @@
               </a:spcAft>
               <a:buNone/>
             </a:pPr>
-            <a:r>
-              <a:t/>
-            </a:r>
             <a:endParaRPr/>
           </a:p>
         </p:txBody>
@@ -4047,7 +4161,9 @@
       <p:sp>
         <p:nvSpPr>
           <p:cNvPr id="37" name="Google Shape;37;p9"/>
-          <p:cNvSpPr txBox="1"/>
+          <p:cNvSpPr txBox="1">
+            <a:spLocks noGrp="1"/>
+          </p:cNvSpPr>
           <p:nvPr>
             <p:ph type="title"/>
           </p:nvPr>
@@ -4062,7 +4178,7 @@
           </a:prstGeom>
         </p:spPr>
         <p:txBody>
-          <a:bodyPr anchorCtr="0" anchor="b" bIns="91425" lIns="91425" spcFirstLastPara="1" rIns="91425" wrap="square" tIns="91425">
+          <a:bodyPr spcFirstLastPara="1" wrap="square" lIns="91425" tIns="91425" rIns="91425" bIns="91425" anchor="b" anchorCtr="0">
             <a:normAutofit/>
           </a:bodyPr>
           <a:lstStyle>
@@ -4166,15 +4282,19 @@
               <a:defRPr sz="4200"/>
             </a:lvl9pPr>
           </a:lstStyle>
-          <a:p/>
+          <a:p>
+            <a:endParaRPr/>
+          </a:p>
         </p:txBody>
       </p:sp>
       <p:sp>
         <p:nvSpPr>
           <p:cNvPr id="38" name="Google Shape;38;p9"/>
-          <p:cNvSpPr txBox="1"/>
+          <p:cNvSpPr txBox="1">
+            <a:spLocks noGrp="1"/>
+          </p:cNvSpPr>
           <p:nvPr>
-            <p:ph idx="1" type="subTitle"/>
+            <p:ph type="subTitle" idx="1"/>
           </p:nvPr>
         </p:nvSpPr>
         <p:spPr>
@@ -4187,7 +4307,7 @@
           </a:prstGeom>
         </p:spPr>
         <p:txBody>
-          <a:bodyPr anchorCtr="0" anchor="t" bIns="91425" lIns="91425" spcFirstLastPara="1" rIns="91425" wrap="square" tIns="91425">
+          <a:bodyPr spcFirstLastPara="1" wrap="square" lIns="91425" tIns="91425" rIns="91425" bIns="91425" anchor="t" anchorCtr="0">
             <a:normAutofit/>
           </a:bodyPr>
           <a:lstStyle>
@@ -4318,15 +4438,19 @@
               <a:defRPr sz="2100"/>
             </a:lvl9pPr>
           </a:lstStyle>
-          <a:p/>
+          <a:p>
+            <a:endParaRPr/>
+          </a:p>
         </p:txBody>
       </p:sp>
       <p:sp>
         <p:nvSpPr>
           <p:cNvPr id="39" name="Google Shape;39;p9"/>
-          <p:cNvSpPr txBox="1"/>
+          <p:cNvSpPr txBox="1">
+            <a:spLocks noGrp="1"/>
+          </p:cNvSpPr>
           <p:nvPr>
-            <p:ph idx="2" type="body"/>
+            <p:ph type="body" idx="2"/>
           </p:nvPr>
         </p:nvSpPr>
         <p:spPr>
@@ -4339,11 +4463,11 @@
           </a:prstGeom>
         </p:spPr>
         <p:txBody>
-          <a:bodyPr anchorCtr="0" anchor="ctr" bIns="91425" lIns="91425" spcFirstLastPara="1" rIns="91425" wrap="square" tIns="91425">
+          <a:bodyPr spcFirstLastPara="1" wrap="square" lIns="91425" tIns="91425" rIns="91425" bIns="91425" anchor="ctr" anchorCtr="0">
             <a:normAutofit/>
           </a:bodyPr>
           <a:lstStyle>
-            <a:lvl1pPr indent="-342900" lvl="0" marL="457200">
+            <a:lvl1pPr marL="457200" lvl="0" indent="-342900">
               <a:spcBef>
                 <a:spcPts val="0"/>
               </a:spcBef>
@@ -4354,7 +4478,7 @@
               <a:buChar char="●"/>
               <a:defRPr/>
             </a:lvl1pPr>
-            <a:lvl2pPr indent="-317500" lvl="1" marL="914400">
+            <a:lvl2pPr marL="914400" lvl="1" indent="-317500">
               <a:spcBef>
                 <a:spcPts val="0"/>
               </a:spcBef>
@@ -4365,7 +4489,7 @@
               <a:buChar char="○"/>
               <a:defRPr/>
             </a:lvl2pPr>
-            <a:lvl3pPr indent="-317500" lvl="2" marL="1371600">
+            <a:lvl3pPr marL="1371600" lvl="2" indent="-317500">
               <a:spcBef>
                 <a:spcPts val="0"/>
               </a:spcBef>
@@ -4376,7 +4500,7 @@
               <a:buChar char="■"/>
               <a:defRPr/>
             </a:lvl3pPr>
-            <a:lvl4pPr indent="-317500" lvl="3" marL="1828800">
+            <a:lvl4pPr marL="1828800" lvl="3" indent="-317500">
               <a:spcBef>
                 <a:spcPts val="0"/>
               </a:spcBef>
@@ -4387,7 +4511,7 @@
               <a:buChar char="●"/>
               <a:defRPr/>
             </a:lvl4pPr>
-            <a:lvl5pPr indent="-317500" lvl="4" marL="2286000">
+            <a:lvl5pPr marL="2286000" lvl="4" indent="-317500">
               <a:spcBef>
                 <a:spcPts val="0"/>
               </a:spcBef>
@@ -4398,7 +4522,7 @@
               <a:buChar char="○"/>
               <a:defRPr/>
             </a:lvl5pPr>
-            <a:lvl6pPr indent="-317500" lvl="5" marL="2743200">
+            <a:lvl6pPr marL="2743200" lvl="5" indent="-317500">
               <a:spcBef>
                 <a:spcPts val="0"/>
               </a:spcBef>
@@ -4409,7 +4533,7 @@
               <a:buChar char="■"/>
               <a:defRPr/>
             </a:lvl6pPr>
-            <a:lvl7pPr indent="-317500" lvl="6" marL="3200400">
+            <a:lvl7pPr marL="3200400" lvl="6" indent="-317500">
               <a:spcBef>
                 <a:spcPts val="0"/>
               </a:spcBef>
@@ -4420,7 +4544,7 @@
               <a:buChar char="●"/>
               <a:defRPr/>
             </a:lvl7pPr>
-            <a:lvl8pPr indent="-317500" lvl="7" marL="3657600">
+            <a:lvl8pPr marL="3657600" lvl="7" indent="-317500">
               <a:spcBef>
                 <a:spcPts val="0"/>
               </a:spcBef>
@@ -4431,7 +4555,7 @@
               <a:buChar char="○"/>
               <a:defRPr/>
             </a:lvl8pPr>
-            <a:lvl9pPr indent="-317500" lvl="8" marL="4114800">
+            <a:lvl9pPr marL="4114800" lvl="8" indent="-317500">
               <a:spcBef>
                 <a:spcPts val="0"/>
               </a:spcBef>
@@ -4443,15 +4567,19 @@
               <a:defRPr/>
             </a:lvl9pPr>
           </a:lstStyle>
-          <a:p/>
+          <a:p>
+            <a:endParaRPr/>
+          </a:p>
         </p:txBody>
       </p:sp>
       <p:sp>
         <p:nvSpPr>
           <p:cNvPr id="40" name="Google Shape;40;p9"/>
-          <p:cNvSpPr txBox="1"/>
+          <p:cNvSpPr txBox="1">
+            <a:spLocks noGrp="1"/>
+          </p:cNvSpPr>
           <p:nvPr>
-            <p:ph idx="12" type="sldNum"/>
+            <p:ph type="sldNum" idx="12"/>
           </p:nvPr>
         </p:nvSpPr>
         <p:spPr>
@@ -4464,7 +4592,7 @@
           </a:prstGeom>
         </p:spPr>
         <p:txBody>
-          <a:bodyPr anchorCtr="0" anchor="ctr" bIns="91425" lIns="91425" spcFirstLastPara="1" rIns="91425" wrap="square" tIns="91425">
+          <a:bodyPr spcFirstLastPara="1" wrap="square" lIns="91425" tIns="91425" rIns="91425" bIns="91425" anchor="ctr" anchorCtr="0">
             <a:normAutofit/>
           </a:bodyPr>
           <a:lstStyle>
@@ -4506,7 +4634,7 @@
             </a:lvl9pPr>
           </a:lstStyle>
           <a:p>
-            <a:pPr indent="0" lvl="0" marL="0" rtl="0" algn="r">
+            <a:pPr marL="0" lvl="0" indent="0" algn="r" rtl="0">
               <a:spcBef>
                 <a:spcPts val="0"/>
               </a:spcBef>
@@ -4532,11 +4660,11 @@
 </file>
 
 <file path=ppt/slideLayouts/slideLayout9.xml><?xml version="1.0" encoding="utf-8"?>
-<p:sldLayout xmlns:a="http://schemas.openxmlformats.org/drawingml/2006/main" xmlns:r="http://schemas.openxmlformats.org/officeDocument/2006/relationships" xmlns:mc="http://schemas.openxmlformats.org/markup-compatibility/2006" xmlns:mv="urn:schemas-microsoft-com:mac:vml" xmlns:p="http://schemas.openxmlformats.org/presentationml/2006/main" xmlns:c="http://schemas.openxmlformats.org/drawingml/2006/chart" xmlns:dgm="http://schemas.openxmlformats.org/drawingml/2006/diagram" xmlns:o="urn:schemas-microsoft-com:office:office" xmlns:v="urn:schemas-microsoft-com:vml" xmlns:pvml="urn:schemas-microsoft-com:office:powerpoint" xmlns:com="http://schemas.openxmlformats.org/drawingml/2006/compatibility" xmlns:p14="http://schemas.microsoft.com/office/powerpoint/2010/main" xmlns:p15="http://schemas.microsoft.com/office/powerpoint/2012/main" xmlns:ahyp="http://schemas.microsoft.com/office/drawing/2018/hyperlinkcolor" matchingName="Caption">
+<p:sldLayout xmlns:a="http://schemas.openxmlformats.org/drawingml/2006/main" xmlns:r="http://schemas.openxmlformats.org/officeDocument/2006/relationships" xmlns:p="http://schemas.openxmlformats.org/presentationml/2006/main" matchingName="Caption">
   <p:cSld name="CAPTION_ONLY">
     <p:spTree>
       <p:nvGrpSpPr>
-        <p:cNvPr id="41" name="Shape 41"/>
+        <p:cNvPr id="1" name="Shape 41"/>
         <p:cNvGrpSpPr/>
         <p:nvPr/>
       </p:nvGrpSpPr>
@@ -4551,9 +4679,11 @@
       <p:sp>
         <p:nvSpPr>
           <p:cNvPr id="42" name="Google Shape;42;p10"/>
-          <p:cNvSpPr txBox="1"/>
+          <p:cNvSpPr txBox="1">
+            <a:spLocks noGrp="1"/>
+          </p:cNvSpPr>
           <p:nvPr>
-            <p:ph idx="1" type="body"/>
+            <p:ph type="body" idx="1"/>
           </p:nvPr>
         </p:nvSpPr>
         <p:spPr>
@@ -4566,11 +4696,11 @@
           </a:prstGeom>
         </p:spPr>
         <p:txBody>
-          <a:bodyPr anchorCtr="0" anchor="ctr" bIns="91425" lIns="91425" spcFirstLastPara="1" rIns="91425" wrap="square" tIns="91425">
+          <a:bodyPr spcFirstLastPara="1" wrap="square" lIns="91425" tIns="91425" rIns="91425" bIns="91425" anchor="ctr" anchorCtr="0">
             <a:normAutofit/>
           </a:bodyPr>
           <a:lstStyle>
-            <a:lvl1pPr indent="-228600" lvl="0" marL="457200">
+            <a:lvl1pPr marL="457200" lvl="0" indent="-228600">
               <a:lnSpc>
                 <a:spcPct val="100000"/>
               </a:lnSpc>
@@ -4585,15 +4715,19 @@
               <a:defRPr/>
             </a:lvl1pPr>
           </a:lstStyle>
-          <a:p/>
+          <a:p>
+            <a:endParaRPr/>
+          </a:p>
         </p:txBody>
       </p:sp>
       <p:sp>
         <p:nvSpPr>
           <p:cNvPr id="43" name="Google Shape;43;p10"/>
-          <p:cNvSpPr txBox="1"/>
+          <p:cNvSpPr txBox="1">
+            <a:spLocks noGrp="1"/>
+          </p:cNvSpPr>
           <p:nvPr>
-            <p:ph idx="12" type="sldNum"/>
+            <p:ph type="sldNum" idx="12"/>
           </p:nvPr>
         </p:nvSpPr>
         <p:spPr>
@@ -4606,7 +4740,7 @@
           </a:prstGeom>
         </p:spPr>
         <p:txBody>
-          <a:bodyPr anchorCtr="0" anchor="ctr" bIns="91425" lIns="91425" spcFirstLastPara="1" rIns="91425" wrap="square" tIns="91425">
+          <a:bodyPr spcFirstLastPara="1" wrap="square" lIns="91425" tIns="91425" rIns="91425" bIns="91425" anchor="ctr" anchorCtr="0">
             <a:normAutofit/>
           </a:bodyPr>
           <a:lstStyle>
@@ -4648,7 +4782,7 @@
             </a:lvl9pPr>
           </a:lstStyle>
           <a:p>
-            <a:pPr indent="0" lvl="0" marL="0" rtl="0" algn="r">
+            <a:pPr marL="0" lvl="0" indent="0" algn="r" rtl="0">
               <a:spcBef>
                 <a:spcPts val="0"/>
               </a:spcBef>
@@ -4674,18 +4808,19 @@
 </file>
 
 <file path=ppt/slideMasters/slideMaster1.xml><?xml version="1.0" encoding="utf-8"?>
-<p:sldMaster xmlns:a="http://schemas.openxmlformats.org/drawingml/2006/main" xmlns:r="http://schemas.openxmlformats.org/officeDocument/2006/relationships" xmlns:mc="http://schemas.openxmlformats.org/markup-compatibility/2006" xmlns:mv="urn:schemas-microsoft-com:mac:vml" xmlns:p="http://schemas.openxmlformats.org/presentationml/2006/main" xmlns:c="http://schemas.openxmlformats.org/drawingml/2006/chart" xmlns:dgm="http://schemas.openxmlformats.org/drawingml/2006/diagram" xmlns:o="urn:schemas-microsoft-com:office:office" xmlns:v="urn:schemas-microsoft-com:vml" xmlns:pvml="urn:schemas-microsoft-com:office:powerpoint" xmlns:com="http://schemas.openxmlformats.org/drawingml/2006/compatibility" xmlns:p14="http://schemas.microsoft.com/office/powerpoint/2010/main" xmlns:p15="http://schemas.microsoft.com/office/powerpoint/2012/main" xmlns:ahyp="http://schemas.microsoft.com/office/drawing/2018/hyperlinkcolor">
+<p:sldMaster xmlns:a="http://schemas.openxmlformats.org/drawingml/2006/main" xmlns:r="http://schemas.openxmlformats.org/officeDocument/2006/relationships" xmlns:p="http://schemas.openxmlformats.org/presentationml/2006/main">
   <p:cSld name="simple-light-2">
     <p:bg>
       <p:bgPr>
         <a:solidFill>
           <a:schemeClr val="lt1"/>
         </a:solidFill>
+        <a:effectLst/>
       </p:bgPr>
     </p:bg>
     <p:spTree>
       <p:nvGrpSpPr>
-        <p:cNvPr id="5" name="Shape 5"/>
+        <p:cNvPr id="1" name="Shape 5"/>
         <p:cNvGrpSpPr/>
         <p:nvPr/>
       </p:nvGrpSpPr>
@@ -4700,7 +4835,9 @@
       <p:sp>
         <p:nvSpPr>
           <p:cNvPr id="6" name="Google Shape;6;p1"/>
-          <p:cNvSpPr txBox="1"/>
+          <p:cNvSpPr txBox="1">
+            <a:spLocks noGrp="1"/>
+          </p:cNvSpPr>
           <p:nvPr>
             <p:ph type="title"/>
           </p:nvPr>
@@ -4719,7 +4856,7 @@
           </a:ln>
         </p:spPr>
         <p:txBody>
-          <a:bodyPr anchorCtr="0" anchor="t" bIns="91425" lIns="91425" spcFirstLastPara="1" rIns="91425" wrap="square" tIns="91425">
+          <a:bodyPr spcFirstLastPara="1" wrap="square" lIns="91425" tIns="91425" rIns="91425" bIns="91425" anchor="t" anchorCtr="0">
             <a:normAutofit/>
           </a:bodyPr>
           <a:lstStyle>
@@ -4886,15 +5023,19 @@
               </a:defRPr>
             </a:lvl9pPr>
           </a:lstStyle>
-          <a:p/>
+          <a:p>
+            <a:endParaRPr/>
+          </a:p>
         </p:txBody>
       </p:sp>
       <p:sp>
         <p:nvSpPr>
           <p:cNvPr id="7" name="Google Shape;7;p1"/>
-          <p:cNvSpPr txBox="1"/>
+          <p:cNvSpPr txBox="1">
+            <a:spLocks noGrp="1"/>
+          </p:cNvSpPr>
           <p:nvPr>
-            <p:ph idx="1" type="body"/>
+            <p:ph type="body" idx="1"/>
           </p:nvPr>
         </p:nvSpPr>
         <p:spPr>
@@ -4911,11 +5052,11 @@
           </a:ln>
         </p:spPr>
         <p:txBody>
-          <a:bodyPr anchorCtr="0" anchor="t" bIns="91425" lIns="91425" spcFirstLastPara="1" rIns="91425" wrap="square" tIns="91425">
+          <a:bodyPr spcFirstLastPara="1" wrap="square" lIns="91425" tIns="91425" rIns="91425" bIns="91425" anchor="t" anchorCtr="0">
             <a:normAutofit/>
           </a:bodyPr>
           <a:lstStyle>
-            <a:lvl1pPr indent="-342900" lvl="0" marL="457200">
+            <a:lvl1pPr marL="457200" lvl="0" indent="-342900">
               <a:lnSpc>
                 <a:spcPct val="115000"/>
               </a:lnSpc>
@@ -4936,7 +5077,7 @@
                 </a:solidFill>
               </a:defRPr>
             </a:lvl1pPr>
-            <a:lvl2pPr indent="-317500" lvl="1" marL="914400">
+            <a:lvl2pPr marL="914400" lvl="1" indent="-317500">
               <a:lnSpc>
                 <a:spcPct val="115000"/>
               </a:lnSpc>
@@ -4957,7 +5098,7 @@
                 </a:solidFill>
               </a:defRPr>
             </a:lvl2pPr>
-            <a:lvl3pPr indent="-317500" lvl="2" marL="1371600">
+            <a:lvl3pPr marL="1371600" lvl="2" indent="-317500">
               <a:lnSpc>
                 <a:spcPct val="115000"/>
               </a:lnSpc>
@@ -4978,7 +5119,7 @@
                 </a:solidFill>
               </a:defRPr>
             </a:lvl3pPr>
-            <a:lvl4pPr indent="-317500" lvl="3" marL="1828800">
+            <a:lvl4pPr marL="1828800" lvl="3" indent="-317500">
               <a:lnSpc>
                 <a:spcPct val="115000"/>
               </a:lnSpc>
@@ -4999,7 +5140,7 @@
                 </a:solidFill>
               </a:defRPr>
             </a:lvl4pPr>
-            <a:lvl5pPr indent="-317500" lvl="4" marL="2286000">
+            <a:lvl5pPr marL="2286000" lvl="4" indent="-317500">
               <a:lnSpc>
                 <a:spcPct val="115000"/>
               </a:lnSpc>
@@ -5020,7 +5161,7 @@
                 </a:solidFill>
               </a:defRPr>
             </a:lvl5pPr>
-            <a:lvl6pPr indent="-317500" lvl="5" marL="2743200">
+            <a:lvl6pPr marL="2743200" lvl="5" indent="-317500">
               <a:lnSpc>
                 <a:spcPct val="115000"/>
               </a:lnSpc>
@@ -5041,7 +5182,7 @@
                 </a:solidFill>
               </a:defRPr>
             </a:lvl6pPr>
-            <a:lvl7pPr indent="-317500" lvl="6" marL="3200400">
+            <a:lvl7pPr marL="3200400" lvl="6" indent="-317500">
               <a:lnSpc>
                 <a:spcPct val="115000"/>
               </a:lnSpc>
@@ -5062,7 +5203,7 @@
                 </a:solidFill>
               </a:defRPr>
             </a:lvl7pPr>
-            <a:lvl8pPr indent="-317500" lvl="7" marL="3657600">
+            <a:lvl8pPr marL="3657600" lvl="7" indent="-317500">
               <a:lnSpc>
                 <a:spcPct val="115000"/>
               </a:lnSpc>
@@ -5083,7 +5224,7 @@
                 </a:solidFill>
               </a:defRPr>
             </a:lvl8pPr>
-            <a:lvl9pPr indent="-317500" lvl="8" marL="4114800">
+            <a:lvl9pPr marL="4114800" lvl="8" indent="-317500">
               <a:lnSpc>
                 <a:spcPct val="115000"/>
               </a:lnSpc>
@@ -5105,15 +5246,19 @@
               </a:defRPr>
             </a:lvl9pPr>
           </a:lstStyle>
-          <a:p/>
+          <a:p>
+            <a:endParaRPr/>
+          </a:p>
         </p:txBody>
       </p:sp>
       <p:sp>
         <p:nvSpPr>
           <p:cNvPr id="8" name="Google Shape;8;p1"/>
-          <p:cNvSpPr txBox="1"/>
+          <p:cNvSpPr txBox="1">
+            <a:spLocks noGrp="1"/>
+          </p:cNvSpPr>
           <p:nvPr>
-            <p:ph idx="12" type="sldNum"/>
+            <p:ph type="sldNum" idx="12"/>
           </p:nvPr>
         </p:nvSpPr>
         <p:spPr>
@@ -5130,7 +5275,7 @@
           </a:ln>
         </p:spPr>
         <p:txBody>
-          <a:bodyPr anchorCtr="0" anchor="ctr" bIns="91425" lIns="91425" spcFirstLastPara="1" rIns="91425" wrap="square" tIns="91425">
+          <a:bodyPr spcFirstLastPara="1" wrap="square" lIns="91425" tIns="91425" rIns="91425" bIns="91425" anchor="ctr" anchorCtr="0">
             <a:normAutofit/>
           </a:bodyPr>
           <a:lstStyle>
@@ -5208,7 +5353,7 @@
             </a:lvl9pPr>
           </a:lstStyle>
           <a:p>
-            <a:pPr indent="0" lvl="0" marL="0" rtl="0" algn="r">
+            <a:pPr marL="0" lvl="0" indent="0" algn="r" rtl="0">
               <a:spcBef>
                 <a:spcPts val="0"/>
               </a:spcBef>
@@ -5227,7 +5372,7 @@
       </p:sp>
     </p:spTree>
   </p:cSld>
-  <p:clrMap accent1="accent1" accent2="accent2" accent3="accent3" accent4="accent4" accent5="accent5" accent6="accent6" bg1="lt1" bg2="dk2" tx1="dk1" tx2="lt2" folHlink="folHlink" hlink="hlink"/>
+  <p:clrMap bg1="lt1" tx1="dk1" bg2="dk2" tx2="lt2" accent1="accent1" accent2="accent2" accent3="accent3" accent4="accent4" accent5="accent5" accent6="accent6" hlink="hlink" folHlink="folHlink"/>
   <p:sldLayoutIdLst>
     <p:sldLayoutId id="2147483648" r:id="rId1"/>
     <p:sldLayoutId id="2147483649" r:id="rId2"/>
@@ -5241,10 +5386,10 @@
     <p:sldLayoutId id="2147483657" r:id="rId10"/>
     <p:sldLayoutId id="2147483658" r:id="rId11"/>
   </p:sldLayoutIdLst>
-  <p:hf dt="0" ftr="0" hdr="0" sldNum="0"/>
+  <p:hf sldNum="0" hdr="0" ftr="0" dt="0"/>
   <p:txStyles>
     <p:titleStyle>
-      <a:defPPr lvl="0" marR="0" rtl="0" algn="l">
+      <a:defPPr marR="0" lvl="0" algn="l" rtl="0">
         <a:lnSpc>
           <a:spcPct val="100000"/>
         </a:lnSpc>
@@ -5255,7 +5400,7 @@
           <a:spcPts val="0"/>
         </a:spcAft>
       </a:defPPr>
-      <a:lvl1pPr lvl="0" marR="0" rtl="0" algn="l">
+      <a:lvl1pPr marR="0" lvl="0" algn="l" rtl="0">
         <a:lnSpc>
           <a:spcPct val="100000"/>
         </a:lnSpc>
@@ -5269,7 +5414,7 @@
           <a:srgbClr val="000000"/>
         </a:buClr>
         <a:buFont typeface="Arial"/>
-        <a:defRPr b="0" i="0" sz="1400" u="none" cap="none" strike="noStrike">
+        <a:defRPr sz="1400" b="0" i="0" u="none" strike="noStrike" cap="none">
           <a:solidFill>
             <a:srgbClr val="000000"/>
           </a:solidFill>
@@ -5279,7 +5424,7 @@
           <a:sym typeface="Arial"/>
         </a:defRPr>
       </a:lvl1pPr>
-      <a:lvl2pPr lvl="1" marR="0" rtl="0" algn="l">
+      <a:lvl2pPr marR="0" lvl="1" algn="l" rtl="0">
         <a:lnSpc>
           <a:spcPct val="100000"/>
         </a:lnSpc>
@@ -5293,7 +5438,7 @@
           <a:srgbClr val="000000"/>
         </a:buClr>
         <a:buFont typeface="Arial"/>
-        <a:defRPr b="0" i="0" sz="1400" u="none" cap="none" strike="noStrike">
+        <a:defRPr sz="1400" b="0" i="0" u="none" strike="noStrike" cap="none">
           <a:solidFill>
             <a:srgbClr val="000000"/>
           </a:solidFill>
@@ -5303,7 +5448,7 @@
           <a:sym typeface="Arial"/>
         </a:defRPr>
       </a:lvl2pPr>
-      <a:lvl3pPr lvl="2" marR="0" rtl="0" algn="l">
+      <a:lvl3pPr marR="0" lvl="2" algn="l" rtl="0">
         <a:lnSpc>
           <a:spcPct val="100000"/>
         </a:lnSpc>
@@ -5317,7 +5462,7 @@
           <a:srgbClr val="000000"/>
         </a:buClr>
         <a:buFont typeface="Arial"/>
-        <a:defRPr b="0" i="0" sz="1400" u="none" cap="none" strike="noStrike">
+        <a:defRPr sz="1400" b="0" i="0" u="none" strike="noStrike" cap="none">
           <a:solidFill>
             <a:srgbClr val="000000"/>
           </a:solidFill>
@@ -5327,7 +5472,7 @@
           <a:sym typeface="Arial"/>
         </a:defRPr>
       </a:lvl3pPr>
-      <a:lvl4pPr lvl="3" marR="0" rtl="0" algn="l">
+      <a:lvl4pPr marR="0" lvl="3" algn="l" rtl="0">
         <a:lnSpc>
           <a:spcPct val="100000"/>
         </a:lnSpc>
@@ -5341,7 +5486,7 @@
           <a:srgbClr val="000000"/>
         </a:buClr>
         <a:buFont typeface="Arial"/>
-        <a:defRPr b="0" i="0" sz="1400" u="none" cap="none" strike="noStrike">
+        <a:defRPr sz="1400" b="0" i="0" u="none" strike="noStrike" cap="none">
           <a:solidFill>
             <a:srgbClr val="000000"/>
           </a:solidFill>
@@ -5351,7 +5496,7 @@
           <a:sym typeface="Arial"/>
         </a:defRPr>
       </a:lvl4pPr>
-      <a:lvl5pPr lvl="4" marR="0" rtl="0" algn="l">
+      <a:lvl5pPr marR="0" lvl="4" algn="l" rtl="0">
         <a:lnSpc>
           <a:spcPct val="100000"/>
         </a:lnSpc>
@@ -5365,7 +5510,7 @@
           <a:srgbClr val="000000"/>
         </a:buClr>
         <a:buFont typeface="Arial"/>
-        <a:defRPr b="0" i="0" sz="1400" u="none" cap="none" strike="noStrike">
+        <a:defRPr sz="1400" b="0" i="0" u="none" strike="noStrike" cap="none">
           <a:solidFill>
             <a:srgbClr val="000000"/>
           </a:solidFill>
@@ -5375,7 +5520,7 @@
           <a:sym typeface="Arial"/>
         </a:defRPr>
       </a:lvl5pPr>
-      <a:lvl6pPr lvl="5" marR="0" rtl="0" algn="l">
+      <a:lvl6pPr marR="0" lvl="5" algn="l" rtl="0">
         <a:lnSpc>
           <a:spcPct val="100000"/>
         </a:lnSpc>
@@ -5389,7 +5534,7 @@
           <a:srgbClr val="000000"/>
         </a:buClr>
         <a:buFont typeface="Arial"/>
-        <a:defRPr b="0" i="0" sz="1400" u="none" cap="none" strike="noStrike">
+        <a:defRPr sz="1400" b="0" i="0" u="none" strike="noStrike" cap="none">
           <a:solidFill>
             <a:srgbClr val="000000"/>
           </a:solidFill>
@@ -5399,7 +5544,7 @@
           <a:sym typeface="Arial"/>
         </a:defRPr>
       </a:lvl6pPr>
-      <a:lvl7pPr lvl="6" marR="0" rtl="0" algn="l">
+      <a:lvl7pPr marR="0" lvl="6" algn="l" rtl="0">
         <a:lnSpc>
           <a:spcPct val="100000"/>
         </a:lnSpc>
@@ -5413,7 +5558,7 @@
           <a:srgbClr val="000000"/>
         </a:buClr>
         <a:buFont typeface="Arial"/>
-        <a:defRPr b="0" i="0" sz="1400" u="none" cap="none" strike="noStrike">
+        <a:defRPr sz="1400" b="0" i="0" u="none" strike="noStrike" cap="none">
           <a:solidFill>
             <a:srgbClr val="000000"/>
           </a:solidFill>
@@ -5423,7 +5568,7 @@
           <a:sym typeface="Arial"/>
         </a:defRPr>
       </a:lvl7pPr>
-      <a:lvl8pPr lvl="7" marR="0" rtl="0" algn="l">
+      <a:lvl8pPr marR="0" lvl="7" algn="l" rtl="0">
         <a:lnSpc>
           <a:spcPct val="100000"/>
         </a:lnSpc>
@@ -5437,7 +5582,7 @@
           <a:srgbClr val="000000"/>
         </a:buClr>
         <a:buFont typeface="Arial"/>
-        <a:defRPr b="0" i="0" sz="1400" u="none" cap="none" strike="noStrike">
+        <a:defRPr sz="1400" b="0" i="0" u="none" strike="noStrike" cap="none">
           <a:solidFill>
             <a:srgbClr val="000000"/>
           </a:solidFill>
@@ -5447,7 +5592,7 @@
           <a:sym typeface="Arial"/>
         </a:defRPr>
       </a:lvl8pPr>
-      <a:lvl9pPr lvl="8" marR="0" rtl="0" algn="l">
+      <a:lvl9pPr marR="0" lvl="8" algn="l" rtl="0">
         <a:lnSpc>
           <a:spcPct val="100000"/>
         </a:lnSpc>
@@ -5461,7 +5606,7 @@
           <a:srgbClr val="000000"/>
         </a:buClr>
         <a:buFont typeface="Arial"/>
-        <a:defRPr b="0" i="0" sz="1400" u="none" cap="none" strike="noStrike">
+        <a:defRPr sz="1400" b="0" i="0" u="none" strike="noStrike" cap="none">
           <a:solidFill>
             <a:srgbClr val="000000"/>
           </a:solidFill>
@@ -5473,7 +5618,7 @@
       </a:lvl9pPr>
     </p:titleStyle>
     <p:bodyStyle>
-      <a:defPPr lvl="0" marR="0" rtl="0" algn="l">
+      <a:defPPr marR="0" lvl="0" algn="l" rtl="0">
         <a:lnSpc>
           <a:spcPct val="100000"/>
         </a:lnSpc>
@@ -5484,7 +5629,7 @@
           <a:spcPts val="0"/>
         </a:spcAft>
       </a:defPPr>
-      <a:lvl1pPr lvl="0" marR="0" rtl="0" algn="l">
+      <a:lvl1pPr marR="0" lvl="0" algn="l" rtl="0">
         <a:lnSpc>
           <a:spcPct val="100000"/>
         </a:lnSpc>
@@ -5498,7 +5643,7 @@
           <a:srgbClr val="000000"/>
         </a:buClr>
         <a:buFont typeface="Arial"/>
-        <a:defRPr b="0" i="0" sz="1400" u="none" cap="none" strike="noStrike">
+        <a:defRPr sz="1400" b="0" i="0" u="none" strike="noStrike" cap="none">
           <a:solidFill>
             <a:srgbClr val="000000"/>
           </a:solidFill>
@@ -5508,7 +5653,7 @@
           <a:sym typeface="Arial"/>
         </a:defRPr>
       </a:lvl1pPr>
-      <a:lvl2pPr lvl="1" marR="0" rtl="0" algn="l">
+      <a:lvl2pPr marR="0" lvl="1" algn="l" rtl="0">
         <a:lnSpc>
           <a:spcPct val="100000"/>
         </a:lnSpc>
@@ -5522,7 +5667,7 @@
           <a:srgbClr val="000000"/>
         </a:buClr>
         <a:buFont typeface="Arial"/>
-        <a:defRPr b="0" i="0" sz="1400" u="none" cap="none" strike="noStrike">
+        <a:defRPr sz="1400" b="0" i="0" u="none" strike="noStrike" cap="none">
           <a:solidFill>
             <a:srgbClr val="000000"/>
           </a:solidFill>
@@ -5532,7 +5677,7 @@
           <a:sym typeface="Arial"/>
         </a:defRPr>
       </a:lvl2pPr>
-      <a:lvl3pPr lvl="2" marR="0" rtl="0" algn="l">
+      <a:lvl3pPr marR="0" lvl="2" algn="l" rtl="0">
         <a:lnSpc>
           <a:spcPct val="100000"/>
         </a:lnSpc>
@@ -5546,7 +5691,7 @@
           <a:srgbClr val="000000"/>
         </a:buClr>
         <a:buFont typeface="Arial"/>
-        <a:defRPr b="0" i="0" sz="1400" u="none" cap="none" strike="noStrike">
+        <a:defRPr sz="1400" b="0" i="0" u="none" strike="noStrike" cap="none">
           <a:solidFill>
             <a:srgbClr val="000000"/>
           </a:solidFill>
@@ -5556,7 +5701,7 @@
           <a:sym typeface="Arial"/>
         </a:defRPr>
       </a:lvl3pPr>
-      <a:lvl4pPr lvl="3" marR="0" rtl="0" algn="l">
+      <a:lvl4pPr marR="0" lvl="3" algn="l" rtl="0">
         <a:lnSpc>
           <a:spcPct val="100000"/>
         </a:lnSpc>
@@ -5570,7 +5715,7 @@
           <a:srgbClr val="000000"/>
         </a:buClr>
         <a:buFont typeface="Arial"/>
-        <a:defRPr b="0" i="0" sz="1400" u="none" cap="none" strike="noStrike">
+        <a:defRPr sz="1400" b="0" i="0" u="none" strike="noStrike" cap="none">
           <a:solidFill>
             <a:srgbClr val="000000"/>
           </a:solidFill>
@@ -5580,7 +5725,7 @@
           <a:sym typeface="Arial"/>
         </a:defRPr>
       </a:lvl4pPr>
-      <a:lvl5pPr lvl="4" marR="0" rtl="0" algn="l">
+      <a:lvl5pPr marR="0" lvl="4" algn="l" rtl="0">
         <a:lnSpc>
           <a:spcPct val="100000"/>
         </a:lnSpc>
@@ -5594,7 +5739,7 @@
           <a:srgbClr val="000000"/>
         </a:buClr>
         <a:buFont typeface="Arial"/>
-        <a:defRPr b="0" i="0" sz="1400" u="none" cap="none" strike="noStrike">
+        <a:defRPr sz="1400" b="0" i="0" u="none" strike="noStrike" cap="none">
           <a:solidFill>
             <a:srgbClr val="000000"/>
           </a:solidFill>
@@ -5604,7 +5749,7 @@
           <a:sym typeface="Arial"/>
         </a:defRPr>
       </a:lvl5pPr>
-      <a:lvl6pPr lvl="5" marR="0" rtl="0" algn="l">
+      <a:lvl6pPr marR="0" lvl="5" algn="l" rtl="0">
         <a:lnSpc>
           <a:spcPct val="100000"/>
         </a:lnSpc>
@@ -5618,7 +5763,7 @@
           <a:srgbClr val="000000"/>
         </a:buClr>
         <a:buFont typeface="Arial"/>
-        <a:defRPr b="0" i="0" sz="1400" u="none" cap="none" strike="noStrike">
+        <a:defRPr sz="1400" b="0" i="0" u="none" strike="noStrike" cap="none">
           <a:solidFill>
             <a:srgbClr val="000000"/>
           </a:solidFill>
@@ -5628,7 +5773,7 @@
           <a:sym typeface="Arial"/>
         </a:defRPr>
       </a:lvl6pPr>
-      <a:lvl7pPr lvl="6" marR="0" rtl="0" algn="l">
+      <a:lvl7pPr marR="0" lvl="6" algn="l" rtl="0">
         <a:lnSpc>
           <a:spcPct val="100000"/>
         </a:lnSpc>
@@ -5642,7 +5787,7 @@
           <a:srgbClr val="000000"/>
         </a:buClr>
         <a:buFont typeface="Arial"/>
-        <a:defRPr b="0" i="0" sz="1400" u="none" cap="none" strike="noStrike">
+        <a:defRPr sz="1400" b="0" i="0" u="none" strike="noStrike" cap="none">
           <a:solidFill>
             <a:srgbClr val="000000"/>
           </a:solidFill>
@@ -5652,7 +5797,7 @@
           <a:sym typeface="Arial"/>
         </a:defRPr>
       </a:lvl7pPr>
-      <a:lvl8pPr lvl="7" marR="0" rtl="0" algn="l">
+      <a:lvl8pPr marR="0" lvl="7" algn="l" rtl="0">
         <a:lnSpc>
           <a:spcPct val="100000"/>
         </a:lnSpc>
@@ -5666,7 +5811,7 @@
           <a:srgbClr val="000000"/>
         </a:buClr>
         <a:buFont typeface="Arial"/>
-        <a:defRPr b="0" i="0" sz="1400" u="none" cap="none" strike="noStrike">
+        <a:defRPr sz="1400" b="0" i="0" u="none" strike="noStrike" cap="none">
           <a:solidFill>
             <a:srgbClr val="000000"/>
           </a:solidFill>
@@ -5676,7 +5821,7 @@
           <a:sym typeface="Arial"/>
         </a:defRPr>
       </a:lvl8pPr>
-      <a:lvl9pPr lvl="8" marR="0" rtl="0" algn="l">
+      <a:lvl9pPr marR="0" lvl="8" algn="l" rtl="0">
         <a:lnSpc>
           <a:spcPct val="100000"/>
         </a:lnSpc>
@@ -5690,7 +5835,7 @@
           <a:srgbClr val="000000"/>
         </a:buClr>
         <a:buFont typeface="Arial"/>
-        <a:defRPr b="0" i="0" sz="1400" u="none" cap="none" strike="noStrike">
+        <a:defRPr sz="1400" b="0" i="0" u="none" strike="noStrike" cap="none">
           <a:solidFill>
             <a:srgbClr val="000000"/>
           </a:solidFill>
@@ -5702,7 +5847,7 @@
       </a:lvl9pPr>
     </p:bodyStyle>
     <p:otherStyle>
-      <a:defPPr lvl="0" marR="0" rtl="0" algn="l">
+      <a:defPPr marR="0" lvl="0" algn="l" rtl="0">
         <a:lnSpc>
           <a:spcPct val="100000"/>
         </a:lnSpc>
@@ -5713,7 +5858,7 @@
           <a:spcPts val="0"/>
         </a:spcAft>
       </a:defPPr>
-      <a:lvl1pPr lvl="0" marR="0" rtl="0" algn="l">
+      <a:lvl1pPr marR="0" lvl="0" algn="l" rtl="0">
         <a:lnSpc>
           <a:spcPct val="100000"/>
         </a:lnSpc>
@@ -5727,7 +5872,7 @@
           <a:srgbClr val="000000"/>
         </a:buClr>
         <a:buFont typeface="Arial"/>
-        <a:defRPr b="0" i="0" sz="1400" u="none" cap="none" strike="noStrike">
+        <a:defRPr sz="1400" b="0" i="0" u="none" strike="noStrike" cap="none">
           <a:solidFill>
             <a:srgbClr val="000000"/>
           </a:solidFill>
@@ -5737,7 +5882,7 @@
           <a:sym typeface="Arial"/>
         </a:defRPr>
       </a:lvl1pPr>
-      <a:lvl2pPr lvl="1" marR="0" rtl="0" algn="l">
+      <a:lvl2pPr marR="0" lvl="1" algn="l" rtl="0">
         <a:lnSpc>
           <a:spcPct val="100000"/>
         </a:lnSpc>
@@ -5751,7 +5896,7 @@
           <a:srgbClr val="000000"/>
         </a:buClr>
         <a:buFont typeface="Arial"/>
-        <a:defRPr b="0" i="0" sz="1400" u="none" cap="none" strike="noStrike">
+        <a:defRPr sz="1400" b="0" i="0" u="none" strike="noStrike" cap="none">
           <a:solidFill>
             <a:srgbClr val="000000"/>
           </a:solidFill>
@@ -5761,7 +5906,7 @@
           <a:sym typeface="Arial"/>
         </a:defRPr>
       </a:lvl2pPr>
-      <a:lvl3pPr lvl="2" marR="0" rtl="0" algn="l">
+      <a:lvl3pPr marR="0" lvl="2" algn="l" rtl="0">
         <a:lnSpc>
           <a:spcPct val="100000"/>
         </a:lnSpc>
@@ -5775,7 +5920,7 @@
           <a:srgbClr val="000000"/>
         </a:buClr>
         <a:buFont typeface="Arial"/>
-        <a:defRPr b="0" i="0" sz="1400" u="none" cap="none" strike="noStrike">
+        <a:defRPr sz="1400" b="0" i="0" u="none" strike="noStrike" cap="none">
           <a:solidFill>
             <a:srgbClr val="000000"/>
           </a:solidFill>
@@ -5785,7 +5930,7 @@
           <a:sym typeface="Arial"/>
         </a:defRPr>
       </a:lvl3pPr>
-      <a:lvl4pPr lvl="3" marR="0" rtl="0" algn="l">
+      <a:lvl4pPr marR="0" lvl="3" algn="l" rtl="0">
         <a:lnSpc>
           <a:spcPct val="100000"/>
         </a:lnSpc>
@@ -5799,7 +5944,7 @@
           <a:srgbClr val="000000"/>
         </a:buClr>
         <a:buFont typeface="Arial"/>
-        <a:defRPr b="0" i="0" sz="1400" u="none" cap="none" strike="noStrike">
+        <a:defRPr sz="1400" b="0" i="0" u="none" strike="noStrike" cap="none">
           <a:solidFill>
             <a:srgbClr val="000000"/>
           </a:solidFill>
@@ -5809,7 +5954,7 @@
           <a:sym typeface="Arial"/>
         </a:defRPr>
       </a:lvl4pPr>
-      <a:lvl5pPr lvl="4" marR="0" rtl="0" algn="l">
+      <a:lvl5pPr marR="0" lvl="4" algn="l" rtl="0">
         <a:lnSpc>
           <a:spcPct val="100000"/>
         </a:lnSpc>
@@ -5823,7 +5968,7 @@
           <a:srgbClr val="000000"/>
         </a:buClr>
         <a:buFont typeface="Arial"/>
-        <a:defRPr b="0" i="0" sz="1400" u="none" cap="none" strike="noStrike">
+        <a:defRPr sz="1400" b="0" i="0" u="none" strike="noStrike" cap="none">
           <a:solidFill>
             <a:srgbClr val="000000"/>
           </a:solidFill>
@@ -5833,7 +5978,7 @@
           <a:sym typeface="Arial"/>
         </a:defRPr>
       </a:lvl5pPr>
-      <a:lvl6pPr lvl="5" marR="0" rtl="0" algn="l">
+      <a:lvl6pPr marR="0" lvl="5" algn="l" rtl="0">
         <a:lnSpc>
           <a:spcPct val="100000"/>
         </a:lnSpc>
@@ -5847,7 +5992,7 @@
           <a:srgbClr val="000000"/>
         </a:buClr>
         <a:buFont typeface="Arial"/>
-        <a:defRPr b="0" i="0" sz="1400" u="none" cap="none" strike="noStrike">
+        <a:defRPr sz="1400" b="0" i="0" u="none" strike="noStrike" cap="none">
           <a:solidFill>
             <a:srgbClr val="000000"/>
           </a:solidFill>
@@ -5857,7 +6002,7 @@
           <a:sym typeface="Arial"/>
         </a:defRPr>
       </a:lvl6pPr>
-      <a:lvl7pPr lvl="6" marR="0" rtl="0" algn="l">
+      <a:lvl7pPr marR="0" lvl="6" algn="l" rtl="0">
         <a:lnSpc>
           <a:spcPct val="100000"/>
         </a:lnSpc>
@@ -5871,7 +6016,7 @@
           <a:srgbClr val="000000"/>
         </a:buClr>
         <a:buFont typeface="Arial"/>
-        <a:defRPr b="0" i="0" sz="1400" u="none" cap="none" strike="noStrike">
+        <a:defRPr sz="1400" b="0" i="0" u="none" strike="noStrike" cap="none">
           <a:solidFill>
             <a:srgbClr val="000000"/>
           </a:solidFill>
@@ -5881,7 +6026,7 @@
           <a:sym typeface="Arial"/>
         </a:defRPr>
       </a:lvl7pPr>
-      <a:lvl8pPr lvl="7" marR="0" rtl="0" algn="l">
+      <a:lvl8pPr marR="0" lvl="7" algn="l" rtl="0">
         <a:lnSpc>
           <a:spcPct val="100000"/>
         </a:lnSpc>
@@ -5895,7 +6040,7 @@
           <a:srgbClr val="000000"/>
         </a:buClr>
         <a:buFont typeface="Arial"/>
-        <a:defRPr b="0" i="0" sz="1400" u="none" cap="none" strike="noStrike">
+        <a:defRPr sz="1400" b="0" i="0" u="none" strike="noStrike" cap="none">
           <a:solidFill>
             <a:srgbClr val="000000"/>
           </a:solidFill>
@@ -5905,7 +6050,7 @@
           <a:sym typeface="Arial"/>
         </a:defRPr>
       </a:lvl8pPr>
-      <a:lvl9pPr lvl="8" marR="0" rtl="0" algn="l">
+      <a:lvl9pPr marR="0" lvl="8" algn="l" rtl="0">
         <a:lnSpc>
           <a:spcPct val="100000"/>
         </a:lnSpc>
@@ -5919,7 +6064,7 @@
           <a:srgbClr val="000000"/>
         </a:buClr>
         <a:buFont typeface="Arial"/>
-        <a:defRPr b="0" i="0" sz="1400" u="none" cap="none" strike="noStrike">
+        <a:defRPr sz="1400" b="0" i="0" u="none" strike="noStrike" cap="none">
           <a:solidFill>
             <a:srgbClr val="000000"/>
           </a:solidFill>
@@ -5935,18 +6080,19 @@
 </file>
 
 <file path=ppt/slides/slide1.xml><?xml version="1.0" encoding="utf-8"?>
-<p:sld xmlns:a="http://schemas.openxmlformats.org/drawingml/2006/main" xmlns:r="http://schemas.openxmlformats.org/officeDocument/2006/relationships" xmlns:mc="http://schemas.openxmlformats.org/markup-compatibility/2006" xmlns:mv="urn:schemas-microsoft-com:mac:vml" xmlns:p="http://schemas.openxmlformats.org/presentationml/2006/main" xmlns:c="http://schemas.openxmlformats.org/drawingml/2006/chart" xmlns:dgm="http://schemas.openxmlformats.org/drawingml/2006/diagram" xmlns:o="urn:schemas-microsoft-com:office:office" xmlns:v="urn:schemas-microsoft-com:vml" xmlns:pvml="urn:schemas-microsoft-com:office:powerpoint" xmlns:com="http://schemas.openxmlformats.org/drawingml/2006/compatibility" xmlns:p14="http://schemas.microsoft.com/office/powerpoint/2010/main" xmlns:p15="http://schemas.microsoft.com/office/powerpoint/2012/main" xmlns:ahyp="http://schemas.microsoft.com/office/drawing/2018/hyperlinkcolor">
+<p:sld xmlns:a="http://schemas.openxmlformats.org/drawingml/2006/main" xmlns:r="http://schemas.openxmlformats.org/officeDocument/2006/relationships" xmlns:p="http://schemas.openxmlformats.org/presentationml/2006/main">
   <p:cSld>
     <p:bg>
       <p:bgPr>
         <a:solidFill>
           <a:srgbClr val="073763"/>
         </a:solidFill>
+        <a:effectLst/>
       </p:bgPr>
     </p:bg>
     <p:spTree>
       <p:nvGrpSpPr>
-        <p:cNvPr id="53" name="Shape 53"/>
+        <p:cNvPr id="1" name="Shape 53"/>
         <p:cNvGrpSpPr/>
         <p:nvPr/>
       </p:nvGrpSpPr>
@@ -5961,7 +6107,9 @@
       <p:sp>
         <p:nvSpPr>
           <p:cNvPr id="54" name="Google Shape;54;p13"/>
-          <p:cNvSpPr txBox="1"/>
+          <p:cNvSpPr txBox="1">
+            <a:spLocks noGrp="1"/>
+          </p:cNvSpPr>
           <p:nvPr>
             <p:ph type="ctrTitle"/>
           </p:nvPr>
@@ -5975,7 +6123,7 @@
             <a:avLst/>
           </a:prstGeom>
           <a:effectLst>
-            <a:outerShdw blurRad="57150" rotWithShape="0" algn="bl" dir="5400000" dist="19050">
+            <a:outerShdw blurRad="57150" dist="19050" dir="5400000" algn="bl" rotWithShape="0">
               <a:srgbClr val="FFFFFF">
                 <a:alpha val="50000"/>
               </a:srgbClr>
@@ -5983,12 +6131,12 @@
           </a:effectLst>
         </p:spPr>
         <p:txBody>
-          <a:bodyPr anchorCtr="0" anchor="b" bIns="91425" lIns="91425" spcFirstLastPara="1" rIns="91425" wrap="square" tIns="91425">
+          <a:bodyPr spcFirstLastPara="1" wrap="square" lIns="91425" tIns="91425" rIns="91425" bIns="91425" anchor="b" anchorCtr="0">
             <a:normAutofit/>
           </a:bodyPr>
           <a:lstStyle/>
           <a:p>
-            <a:pPr indent="0" lvl="0" marL="0" rtl="0" algn="ctr">
+            <a:pPr marL="0" lvl="0" indent="0" algn="ctr" rtl="0">
               <a:spcBef>
                 <a:spcPts val="0"/>
               </a:spcBef>
@@ -6012,7 +6160,7 @@
             </a:endParaRPr>
           </a:p>
           <a:p>
-            <a:pPr indent="0" lvl="0" marL="0" rtl="0" algn="ctr">
+            <a:pPr marL="0" lvl="0" indent="0" algn="ctr" rtl="0">
               <a:spcBef>
                 <a:spcPts val="0"/>
               </a:spcBef>
@@ -6057,12 +6205,12 @@
           </a:ln>
         </p:spPr>
         <p:txBody>
-          <a:bodyPr anchorCtr="0" anchor="t" bIns="91425" lIns="91425" spcFirstLastPara="1" rIns="91425" wrap="square" tIns="91425">
+          <a:bodyPr spcFirstLastPara="1" wrap="square" lIns="91425" tIns="91425" rIns="91425" bIns="91425" anchor="t" anchorCtr="0">
             <a:spAutoFit/>
           </a:bodyPr>
           <a:lstStyle/>
           <a:p>
-            <a:pPr indent="0" lvl="0" marL="0" rtl="0" algn="ctr">
+            <a:pPr marL="0" lvl="0" indent="0" algn="ctr" rtl="0">
               <a:lnSpc>
                 <a:spcPct val="80000"/>
               </a:lnSpc>
@@ -6100,18 +6248,19 @@
 </file>
 
 <file path=ppt/slides/slide2.xml><?xml version="1.0" encoding="utf-8"?>
-<p:sld xmlns:a="http://schemas.openxmlformats.org/drawingml/2006/main" xmlns:r="http://schemas.openxmlformats.org/officeDocument/2006/relationships" xmlns:mc="http://schemas.openxmlformats.org/markup-compatibility/2006" xmlns:mv="urn:schemas-microsoft-com:mac:vml" xmlns:p="http://schemas.openxmlformats.org/presentationml/2006/main" xmlns:c="http://schemas.openxmlformats.org/drawingml/2006/chart" xmlns:dgm="http://schemas.openxmlformats.org/drawingml/2006/diagram" xmlns:o="urn:schemas-microsoft-com:office:office" xmlns:v="urn:schemas-microsoft-com:vml" xmlns:pvml="urn:schemas-microsoft-com:office:powerpoint" xmlns:com="http://schemas.openxmlformats.org/drawingml/2006/compatibility" xmlns:p14="http://schemas.microsoft.com/office/powerpoint/2010/main" xmlns:p15="http://schemas.microsoft.com/office/powerpoint/2012/main" xmlns:ahyp="http://schemas.microsoft.com/office/drawing/2018/hyperlinkcolor">
+<p:sld xmlns:a="http://schemas.openxmlformats.org/drawingml/2006/main" xmlns:r="http://schemas.openxmlformats.org/officeDocument/2006/relationships" xmlns:p="http://schemas.openxmlformats.org/presentationml/2006/main">
   <p:cSld>
     <p:bg>
       <p:bgPr>
         <a:solidFill>
           <a:srgbClr val="073763"/>
         </a:solidFill>
+        <a:effectLst/>
       </p:bgPr>
     </p:bg>
     <p:spTree>
       <p:nvGrpSpPr>
-        <p:cNvPr id="59" name="Shape 59"/>
+        <p:cNvPr id="1" name="Shape 59"/>
         <p:cNvGrpSpPr/>
         <p:nvPr/>
       </p:nvGrpSpPr>
@@ -6142,7 +6291,7 @@
             <a:noFill/>
           </a:ln>
           <a:effectLst>
-            <a:outerShdw blurRad="57150" rotWithShape="0" algn="bl" dir="5400000" dist="19050">
+            <a:outerShdw blurRad="57150" dist="19050" dir="5400000" algn="bl" rotWithShape="0">
               <a:srgbClr val="FFFFFF">
                 <a:alpha val="50000"/>
               </a:srgbClr>
@@ -6150,12 +6299,12 @@
           </a:effectLst>
         </p:spPr>
         <p:txBody>
-          <a:bodyPr anchorCtr="0" anchor="t" bIns="91425" lIns="91425" spcFirstLastPara="1" rIns="91425" wrap="square" tIns="91425">
+          <a:bodyPr spcFirstLastPara="1" wrap="square" lIns="91425" tIns="91425" rIns="91425" bIns="91425" anchor="t" anchorCtr="0">
             <a:spAutoFit/>
           </a:bodyPr>
           <a:lstStyle/>
           <a:p>
-            <a:pPr indent="0" lvl="0" marL="0" rtl="0" algn="ctr">
+            <a:pPr marL="0" lvl="0" indent="0" algn="ctr" rtl="0">
               <a:spcBef>
                 <a:spcPts val="0"/>
               </a:spcBef>
@@ -6164,9 +6313,6 @@
               </a:spcAft>
               <a:buNone/>
             </a:pPr>
-            <a:r>
-              <a:t/>
-            </a:r>
             <a:endParaRPr sz="2400">
               <a:solidFill>
                 <a:srgbClr val="0B5394"/>
@@ -6178,9 +6324,11 @@
       <p:sp>
         <p:nvSpPr>
           <p:cNvPr id="61" name="Google Shape;61;p14"/>
-          <p:cNvSpPr txBox="1"/>
+          <p:cNvSpPr txBox="1">
+            <a:spLocks noGrp="1"/>
+          </p:cNvSpPr>
           <p:nvPr>
-            <p:ph idx="1" type="subTitle"/>
+            <p:ph type="subTitle" idx="1"/>
           </p:nvPr>
         </p:nvSpPr>
         <p:spPr>
@@ -6192,7 +6340,7 @@
             <a:avLst/>
           </a:prstGeom>
           <a:effectLst>
-            <a:outerShdw blurRad="57150" rotWithShape="0" algn="bl" dir="5400000" dist="19050">
+            <a:outerShdw blurRad="57150" dist="19050" dir="5400000" algn="bl" rotWithShape="0">
               <a:srgbClr val="FFFFFF">
                 <a:alpha val="50000"/>
               </a:srgbClr>
@@ -6200,12 +6348,12 @@
           </a:effectLst>
         </p:spPr>
         <p:txBody>
-          <a:bodyPr anchorCtr="0" anchor="t" bIns="91425" lIns="91425" spcFirstLastPara="1" rIns="91425" wrap="square" tIns="91425">
+          <a:bodyPr spcFirstLastPara="1" wrap="square" lIns="91425" tIns="91425" rIns="91425" bIns="91425" anchor="t" anchorCtr="0">
             <a:noAutofit/>
           </a:bodyPr>
           <a:lstStyle/>
           <a:p>
-            <a:pPr indent="0" lvl="0" marL="0" rtl="0" algn="ctr">
+            <a:pPr marL="0" lvl="0" indent="0" algn="ctr" rtl="0">
               <a:lnSpc>
                 <a:spcPct val="80000"/>
               </a:lnSpc>
@@ -6254,12 +6402,12 @@
           </a:ln>
         </p:spPr>
         <p:txBody>
-          <a:bodyPr anchorCtr="0" anchor="t" bIns="91425" lIns="91425" spcFirstLastPara="1" rIns="91425" wrap="square" tIns="91425">
+          <a:bodyPr spcFirstLastPara="1" wrap="square" lIns="91425" tIns="91425" rIns="91425" bIns="91425" anchor="t" anchorCtr="0">
             <a:spAutoFit/>
           </a:bodyPr>
           <a:lstStyle/>
           <a:p>
-            <a:pPr indent="0" lvl="0" marL="0" rtl="0" algn="ctr">
+            <a:pPr marL="0" lvl="0" indent="0" algn="ctr" rtl="0">
               <a:lnSpc>
                 <a:spcPct val="80000"/>
               </a:lnSpc>
@@ -6282,15 +6430,7 @@
                   <a:srgbClr val="E69138"/>
                 </a:solidFill>
               </a:rPr>
-              <a:t>A “Younger” Personal Finance</a:t>
-            </a:r>
-            <a:r>
-              <a:rPr lang="en" sz="1979">
-                <a:solidFill>
-                  <a:srgbClr val="E69138"/>
-                </a:solidFill>
-              </a:rPr>
-              <a:t> Application</a:t>
+              <a:t>A “Younger” Personal Finance Application</a:t>
             </a:r>
             <a:endParaRPr/>
           </a:p>
@@ -6316,12 +6456,12 @@
           </a:ln>
         </p:spPr>
         <p:txBody>
-          <a:bodyPr anchorCtr="0" anchor="t" bIns="91425" lIns="91425" spcFirstLastPara="1" rIns="91425" wrap="square" tIns="91425">
+          <a:bodyPr spcFirstLastPara="1" wrap="square" lIns="91425" tIns="91425" rIns="91425" bIns="91425" anchor="t" anchorCtr="0">
             <a:spAutoFit/>
           </a:bodyPr>
           <a:lstStyle/>
           <a:p>
-            <a:pPr indent="0" lvl="0" marL="0" rtl="0" algn="l">
+            <a:pPr marL="0" lvl="0" indent="0" algn="l" rtl="0">
               <a:lnSpc>
                 <a:spcPct val="115000"/>
               </a:lnSpc>
@@ -6351,7 +6491,7 @@
               <a:t>       </a:t>
             </a:r>
             <a:r>
-              <a:rPr b="1" lang="en" sz="1900">
+              <a:rPr lang="en" sz="1900" b="1">
                 <a:solidFill>
                   <a:srgbClr val="6AA84F"/>
                 </a:solidFill>
@@ -6375,18 +6515,19 @@
 </file>
 
 <file path=ppt/slides/slide3.xml><?xml version="1.0" encoding="utf-8"?>
-<p:sld xmlns:a="http://schemas.openxmlformats.org/drawingml/2006/main" xmlns:r="http://schemas.openxmlformats.org/officeDocument/2006/relationships" xmlns:mc="http://schemas.openxmlformats.org/markup-compatibility/2006" xmlns:mv="urn:schemas-microsoft-com:mac:vml" xmlns:p="http://schemas.openxmlformats.org/presentationml/2006/main" xmlns:c="http://schemas.openxmlformats.org/drawingml/2006/chart" xmlns:dgm="http://schemas.openxmlformats.org/drawingml/2006/diagram" xmlns:o="urn:schemas-microsoft-com:office:office" xmlns:v="urn:schemas-microsoft-com:vml" xmlns:pvml="urn:schemas-microsoft-com:office:powerpoint" xmlns:com="http://schemas.openxmlformats.org/drawingml/2006/compatibility" xmlns:p14="http://schemas.microsoft.com/office/powerpoint/2010/main" xmlns:p15="http://schemas.microsoft.com/office/powerpoint/2012/main" xmlns:ahyp="http://schemas.microsoft.com/office/drawing/2018/hyperlinkcolor">
+<p:sld xmlns:a="http://schemas.openxmlformats.org/drawingml/2006/main" xmlns:r="http://schemas.openxmlformats.org/officeDocument/2006/relationships" xmlns:p="http://schemas.openxmlformats.org/presentationml/2006/main">
   <p:cSld>
     <p:bg>
       <p:bgPr>
         <a:solidFill>
           <a:srgbClr val="073763"/>
         </a:solidFill>
+        <a:effectLst/>
       </p:bgPr>
     </p:bg>
     <p:spTree>
       <p:nvGrpSpPr>
-        <p:cNvPr id="67" name="Shape 67"/>
+        <p:cNvPr id="1" name="Shape 67"/>
         <p:cNvGrpSpPr/>
         <p:nvPr/>
       </p:nvGrpSpPr>
@@ -6417,7 +6558,7 @@
             <a:noFill/>
           </a:ln>
           <a:effectLst>
-            <a:outerShdw blurRad="57150" rotWithShape="0" algn="bl" dir="5400000" dist="19050">
+            <a:outerShdw blurRad="57150" dist="19050" dir="5400000" algn="bl" rotWithShape="0">
               <a:srgbClr val="FFFFFF">
                 <a:alpha val="50000"/>
               </a:srgbClr>
@@ -6425,12 +6566,12 @@
           </a:effectLst>
         </p:spPr>
         <p:txBody>
-          <a:bodyPr anchorCtr="0" anchor="t" bIns="91425" lIns="91425" spcFirstLastPara="1" rIns="91425" wrap="square" tIns="91425">
+          <a:bodyPr spcFirstLastPara="1" wrap="square" lIns="91425" tIns="91425" rIns="91425" bIns="91425" anchor="t" anchorCtr="0">
             <a:spAutoFit/>
           </a:bodyPr>
           <a:lstStyle/>
           <a:p>
-            <a:pPr indent="0" lvl="0" marL="0" rtl="0" algn="ctr">
+            <a:pPr marL="0" lvl="0" indent="0" algn="ctr" rtl="0">
               <a:spcBef>
                 <a:spcPts val="0"/>
               </a:spcBef>
@@ -6439,9 +6580,6 @@
               </a:spcAft>
               <a:buNone/>
             </a:pPr>
-            <a:r>
-              <a:t/>
-            </a:r>
             <a:endParaRPr sz="2400">
               <a:solidFill>
                 <a:srgbClr val="0B5394"/>
@@ -6453,9 +6591,11 @@
       <p:sp>
         <p:nvSpPr>
           <p:cNvPr id="69" name="Google Shape;69;p15"/>
-          <p:cNvSpPr txBox="1"/>
+          <p:cNvSpPr txBox="1">
+            <a:spLocks noGrp="1"/>
+          </p:cNvSpPr>
           <p:nvPr>
-            <p:ph idx="1" type="subTitle"/>
+            <p:ph type="subTitle" idx="1"/>
           </p:nvPr>
         </p:nvSpPr>
         <p:spPr>
@@ -6467,7 +6607,7 @@
             <a:avLst/>
           </a:prstGeom>
           <a:effectLst>
-            <a:outerShdw blurRad="57150" rotWithShape="0" algn="bl" dir="5400000" dist="19050">
+            <a:outerShdw blurRad="57150" dist="19050" dir="5400000" algn="bl" rotWithShape="0">
               <a:srgbClr val="FFFFFF">
                 <a:alpha val="50000"/>
               </a:srgbClr>
@@ -6475,12 +6615,12 @@
           </a:effectLst>
         </p:spPr>
         <p:txBody>
-          <a:bodyPr anchorCtr="0" anchor="t" bIns="91425" lIns="91425" spcFirstLastPara="1" rIns="91425" wrap="square" tIns="91425">
+          <a:bodyPr spcFirstLastPara="1" wrap="square" lIns="91425" tIns="91425" rIns="91425" bIns="91425" anchor="t" anchorCtr="0">
             <a:noAutofit/>
           </a:bodyPr>
           <a:lstStyle/>
           <a:p>
-            <a:pPr indent="0" lvl="0" marL="0" rtl="0" algn="ctr">
+            <a:pPr marL="0" lvl="0" indent="0" algn="ctr" rtl="0">
               <a:lnSpc>
                 <a:spcPct val="80000"/>
               </a:lnSpc>
@@ -6529,12 +6669,12 @@
           </a:ln>
         </p:spPr>
         <p:txBody>
-          <a:bodyPr anchorCtr="0" anchor="t" bIns="91425" lIns="91425" spcFirstLastPara="1" rIns="91425" wrap="square" tIns="91425">
+          <a:bodyPr spcFirstLastPara="1" wrap="square" lIns="91425" tIns="91425" rIns="91425" bIns="91425" anchor="t" anchorCtr="0">
             <a:spAutoFit/>
           </a:bodyPr>
           <a:lstStyle/>
           <a:p>
-            <a:pPr indent="0" lvl="0" marL="0" rtl="0" algn="ctr">
+            <a:pPr marL="0" lvl="0" indent="0" algn="ctr" rtl="0">
               <a:lnSpc>
                 <a:spcPct val="80000"/>
               </a:lnSpc>
@@ -6583,12 +6723,12 @@
           </a:ln>
         </p:spPr>
         <p:txBody>
-          <a:bodyPr anchorCtr="0" anchor="t" bIns="91425" lIns="91425" spcFirstLastPara="1" rIns="91425" wrap="square" tIns="91425">
+          <a:bodyPr spcFirstLastPara="1" wrap="square" lIns="91425" tIns="91425" rIns="91425" bIns="91425" anchor="t" anchorCtr="0">
             <a:spAutoFit/>
           </a:bodyPr>
           <a:lstStyle/>
           <a:p>
-            <a:pPr indent="0" lvl="0" marL="0" rtl="0" algn="l">
+            <a:pPr marL="0" lvl="0" indent="0" algn="l" rtl="0">
               <a:lnSpc>
                 <a:spcPct val="115000"/>
               </a:lnSpc>
@@ -6618,21 +6758,21 @@
               <a:t>       </a:t>
             </a:r>
             <a:r>
-              <a:rPr b="1" lang="en" sz="1900">
+              <a:rPr lang="en" sz="1900" b="1">
                 <a:solidFill>
                   <a:srgbClr val="6AA84F"/>
                 </a:solidFill>
               </a:rPr>
               <a:t>How-to Guide</a:t>
             </a:r>
-            <a:endParaRPr b="1" sz="1900">
+            <a:endParaRPr sz="1900" b="1">
               <a:solidFill>
                 <a:srgbClr val="6AA84F"/>
               </a:solidFill>
             </a:endParaRPr>
           </a:p>
           <a:p>
-            <a:pPr indent="0" lvl="0" marL="457200" rtl="0" algn="l">
+            <a:pPr marL="457200" lvl="0" indent="0" algn="l" rtl="0">
               <a:lnSpc>
                 <a:spcPct val="115000"/>
               </a:lnSpc>
@@ -6688,7 +6828,7 @@
             </a:endParaRPr>
           </a:p>
           <a:p>
-            <a:pPr indent="0" lvl="0" marL="457200" rtl="0" algn="l">
+            <a:pPr marL="457200" lvl="0" indent="0" algn="l" rtl="0">
               <a:lnSpc>
                 <a:spcPct val="115000"/>
               </a:lnSpc>
@@ -6744,7 +6884,7 @@
             </a:endParaRPr>
           </a:p>
           <a:p>
-            <a:pPr indent="0" lvl="0" marL="457200" rtl="0" algn="l">
+            <a:pPr marL="457200" lvl="0" indent="0" algn="l" rtl="0">
               <a:lnSpc>
                 <a:spcPct val="115000"/>
               </a:lnSpc>
@@ -6800,7 +6940,7 @@
             </a:endParaRPr>
           </a:p>
           <a:p>
-            <a:pPr indent="0" lvl="0" marL="457200" rtl="0" algn="l">
+            <a:pPr marL="457200" lvl="0" indent="0" algn="l" rtl="0">
               <a:lnSpc>
                 <a:spcPct val="115000"/>
               </a:lnSpc>
@@ -6856,7 +6996,7 @@
             </a:endParaRPr>
           </a:p>
           <a:p>
-            <a:pPr indent="0" lvl="0" marL="457200" rtl="0" algn="l">
+            <a:pPr marL="457200" lvl="0" indent="0" algn="l" rtl="0">
               <a:lnSpc>
                 <a:spcPct val="115000"/>
               </a:lnSpc>
@@ -6922,18 +7062,19 @@
 </file>
 
 <file path=ppt/slides/slide4.xml><?xml version="1.0" encoding="utf-8"?>
-<p:sld xmlns:a="http://schemas.openxmlformats.org/drawingml/2006/main" xmlns:r="http://schemas.openxmlformats.org/officeDocument/2006/relationships" xmlns:mc="http://schemas.openxmlformats.org/markup-compatibility/2006" xmlns:mv="urn:schemas-microsoft-com:mac:vml" xmlns:p="http://schemas.openxmlformats.org/presentationml/2006/main" xmlns:c="http://schemas.openxmlformats.org/drawingml/2006/chart" xmlns:dgm="http://schemas.openxmlformats.org/drawingml/2006/diagram" xmlns:o="urn:schemas-microsoft-com:office:office" xmlns:v="urn:schemas-microsoft-com:vml" xmlns:pvml="urn:schemas-microsoft-com:office:powerpoint" xmlns:com="http://schemas.openxmlformats.org/drawingml/2006/compatibility" xmlns:p14="http://schemas.microsoft.com/office/powerpoint/2010/main" xmlns:p15="http://schemas.microsoft.com/office/powerpoint/2012/main" xmlns:ahyp="http://schemas.microsoft.com/office/drawing/2018/hyperlinkcolor">
+<p:sld xmlns:a="http://schemas.openxmlformats.org/drawingml/2006/main" xmlns:r="http://schemas.openxmlformats.org/officeDocument/2006/relationships" xmlns:p="http://schemas.openxmlformats.org/presentationml/2006/main">
   <p:cSld>
     <p:bg>
       <p:bgPr>
         <a:solidFill>
           <a:srgbClr val="073763"/>
         </a:solidFill>
+        <a:effectLst/>
       </p:bgPr>
     </p:bg>
     <p:spTree>
       <p:nvGrpSpPr>
-        <p:cNvPr id="75" name="Shape 75"/>
+        <p:cNvPr id="1" name="Shape 75"/>
         <p:cNvGrpSpPr/>
         <p:nvPr/>
       </p:nvGrpSpPr>
@@ -6964,7 +7105,7 @@
             <a:noFill/>
           </a:ln>
           <a:effectLst>
-            <a:outerShdw blurRad="57150" rotWithShape="0" algn="bl" dir="5400000" dist="19050">
+            <a:outerShdw blurRad="57150" dist="19050" dir="5400000" algn="bl" rotWithShape="0">
               <a:srgbClr val="FFFFFF">
                 <a:alpha val="50000"/>
               </a:srgbClr>
@@ -6972,12 +7113,12 @@
           </a:effectLst>
         </p:spPr>
         <p:txBody>
-          <a:bodyPr anchorCtr="0" anchor="t" bIns="91425" lIns="91425" spcFirstLastPara="1" rIns="91425" wrap="square" tIns="91425">
+          <a:bodyPr spcFirstLastPara="1" wrap="square" lIns="91425" tIns="91425" rIns="91425" bIns="91425" anchor="t" anchorCtr="0">
             <a:spAutoFit/>
           </a:bodyPr>
           <a:lstStyle/>
           <a:p>
-            <a:pPr indent="0" lvl="0" marL="0" rtl="0" algn="ctr">
+            <a:pPr marL="0" lvl="0" indent="0" algn="ctr" rtl="0">
               <a:spcBef>
                 <a:spcPts val="0"/>
               </a:spcBef>
@@ -6986,9 +7127,6 @@
               </a:spcAft>
               <a:buNone/>
             </a:pPr>
-            <a:r>
-              <a:t/>
-            </a:r>
             <a:endParaRPr sz="2400">
               <a:solidFill>
                 <a:srgbClr val="0B5394"/>
@@ -7000,9 +7138,11 @@
       <p:sp>
         <p:nvSpPr>
           <p:cNvPr id="77" name="Google Shape;77;p16"/>
-          <p:cNvSpPr txBox="1"/>
+          <p:cNvSpPr txBox="1">
+            <a:spLocks noGrp="1"/>
+          </p:cNvSpPr>
           <p:nvPr>
-            <p:ph idx="1" type="subTitle"/>
+            <p:ph type="subTitle" idx="1"/>
           </p:nvPr>
         </p:nvSpPr>
         <p:spPr>
@@ -7014,7 +7154,7 @@
             <a:avLst/>
           </a:prstGeom>
           <a:effectLst>
-            <a:outerShdw blurRad="57150" rotWithShape="0" algn="bl" dir="5400000" dist="19050">
+            <a:outerShdw blurRad="57150" dist="19050" dir="5400000" algn="bl" rotWithShape="0">
               <a:srgbClr val="FFFFFF">
                 <a:alpha val="50000"/>
               </a:srgbClr>
@@ -7022,12 +7162,12 @@
           </a:effectLst>
         </p:spPr>
         <p:txBody>
-          <a:bodyPr anchorCtr="0" anchor="t" bIns="91425" lIns="91425" spcFirstLastPara="1" rIns="91425" wrap="square" tIns="91425">
+          <a:bodyPr spcFirstLastPara="1" wrap="square" lIns="91425" tIns="91425" rIns="91425" bIns="91425" anchor="t" anchorCtr="0">
             <a:noAutofit/>
           </a:bodyPr>
           <a:lstStyle/>
           <a:p>
-            <a:pPr indent="0" lvl="0" marL="0" rtl="0" algn="ctr">
+            <a:pPr marL="0" lvl="0" indent="0" algn="ctr" rtl="0">
               <a:lnSpc>
                 <a:spcPct val="80000"/>
               </a:lnSpc>
@@ -7076,12 +7216,12 @@
           </a:ln>
         </p:spPr>
         <p:txBody>
-          <a:bodyPr anchorCtr="0" anchor="t" bIns="91425" lIns="91425" spcFirstLastPara="1" rIns="91425" wrap="square" tIns="91425">
+          <a:bodyPr spcFirstLastPara="1" wrap="square" lIns="91425" tIns="91425" rIns="91425" bIns="91425" anchor="t" anchorCtr="0">
             <a:spAutoFit/>
           </a:bodyPr>
           <a:lstStyle/>
           <a:p>
-            <a:pPr indent="0" lvl="0" marL="0" rtl="0" algn="ctr">
+            <a:pPr marL="0" lvl="0" indent="0" algn="ctr" rtl="0">
               <a:lnSpc>
                 <a:spcPct val="80000"/>
               </a:lnSpc>
@@ -7118,7 +7258,7 @@
         </p:nvSpPr>
         <p:spPr>
           <a:xfrm>
-            <a:off x="2120375" y="1303200"/>
+            <a:off x="2120375" y="1231275"/>
             <a:ext cx="5376600" cy="3840300"/>
           </a:xfrm>
           <a:prstGeom prst="rect">
@@ -7130,12 +7270,12 @@
           </a:ln>
         </p:spPr>
         <p:txBody>
-          <a:bodyPr anchorCtr="0" anchor="t" bIns="91425" lIns="91425" spcFirstLastPara="1" rIns="91425" wrap="square" tIns="91425">
+          <a:bodyPr spcFirstLastPara="1" wrap="square" lIns="91425" tIns="91425" rIns="91425" bIns="91425" anchor="t" anchorCtr="0">
             <a:spAutoFit/>
           </a:bodyPr>
           <a:lstStyle/>
           <a:p>
-            <a:pPr indent="-349250" lvl="0" marL="457200" rtl="0" algn="l">
+            <a:pPr marL="457200" lvl="0" indent="-349250" algn="l" rtl="0">
               <a:lnSpc>
                 <a:spcPct val="115000"/>
               </a:lnSpc>
@@ -7152,21 +7292,21 @@
               <a:buChar char="●"/>
             </a:pPr>
             <a:r>
-              <a:rPr lang="en" sz="1900">
+              <a:rPr lang="en" sz="1900" dirty="0">
                 <a:solidFill>
                   <a:srgbClr val="6AA84F"/>
                 </a:solidFill>
               </a:rPr>
               <a:t>Target toward young, college age individuals </a:t>
             </a:r>
-            <a:endParaRPr sz="1900">
+            <a:endParaRPr sz="1900" dirty="0">
               <a:solidFill>
                 <a:srgbClr val="6AA84F"/>
               </a:solidFill>
             </a:endParaRPr>
           </a:p>
           <a:p>
-            <a:pPr indent="-349250" lvl="0" marL="457200" rtl="0" algn="l">
+            <a:pPr marL="457200" lvl="0" indent="-349250" algn="l" rtl="0">
               <a:lnSpc>
                 <a:spcPct val="115000"/>
               </a:lnSpc>
@@ -7183,21 +7323,21 @@
               <a:buChar char="●"/>
             </a:pPr>
             <a:r>
-              <a:rPr lang="en" sz="1900">
+              <a:rPr lang="en" sz="1900" dirty="0">
                 <a:solidFill>
                   <a:srgbClr val="6AA84F"/>
                 </a:solidFill>
               </a:rPr>
               <a:t>Get started tracking money without too much complication or confusing financial numbers</a:t>
             </a:r>
-            <a:endParaRPr sz="1900">
+            <a:endParaRPr sz="1900" dirty="0">
               <a:solidFill>
                 <a:srgbClr val="6AA84F"/>
               </a:solidFill>
             </a:endParaRPr>
           </a:p>
           <a:p>
-            <a:pPr indent="-349250" lvl="0" marL="457200" rtl="0" algn="l">
+            <a:pPr marL="457200" lvl="0" indent="-349250" algn="l" rtl="0">
               <a:lnSpc>
                 <a:spcPct val="115000"/>
               </a:lnSpc>
@@ -7214,21 +7354,21 @@
               <a:buChar char="●"/>
             </a:pPr>
             <a:r>
-              <a:rPr lang="en" sz="1900">
+              <a:rPr lang="en" sz="1900" dirty="0">
                 <a:solidFill>
                   <a:srgbClr val="6AA84F"/>
                 </a:solidFill>
               </a:rPr>
               <a:t>Enable teenagers to gain financial literacy</a:t>
             </a:r>
-            <a:endParaRPr sz="1900">
+            <a:endParaRPr sz="1900" dirty="0">
               <a:solidFill>
                 <a:srgbClr val="6AA84F"/>
               </a:solidFill>
             </a:endParaRPr>
           </a:p>
           <a:p>
-            <a:pPr indent="-349250" lvl="0" marL="457200" rtl="0" algn="l">
+            <a:pPr marL="457200" lvl="0" indent="-349250" algn="l" rtl="0">
               <a:lnSpc>
                 <a:spcPct val="115000"/>
               </a:lnSpc>
@@ -7245,21 +7385,21 @@
               <a:buChar char="●"/>
             </a:pPr>
             <a:r>
-              <a:rPr lang="en" sz="1900">
+              <a:rPr lang="en" sz="1900" dirty="0">
                 <a:solidFill>
                   <a:srgbClr val="6AA84F"/>
                 </a:solidFill>
               </a:rPr>
               <a:t>Understand the arithmetic of incoming money and outflowing expenditures</a:t>
             </a:r>
-            <a:endParaRPr sz="1900">
+            <a:endParaRPr sz="1900" dirty="0">
               <a:solidFill>
                 <a:srgbClr val="6AA84F"/>
               </a:solidFill>
             </a:endParaRPr>
           </a:p>
           <a:p>
-            <a:pPr indent="-349250" lvl="0" marL="457200" rtl="0" algn="l">
+            <a:pPr marL="457200" lvl="0" indent="-349250" algn="l" rtl="0">
               <a:lnSpc>
                 <a:spcPct val="115000"/>
               </a:lnSpc>
@@ -7276,14 +7416,14 @@
               <a:buChar char="●"/>
             </a:pPr>
             <a:r>
-              <a:rPr lang="en" sz="1900">
+              <a:rPr lang="en" sz="1900" dirty="0">
                 <a:solidFill>
                   <a:srgbClr val="6AA84F"/>
                 </a:solidFill>
               </a:rPr>
               <a:t> Prepare for getting on their own, before their personal “checkbooks” and financial statements become too complicated.</a:t>
             </a:r>
-            <a:endParaRPr sz="1900">
+            <a:endParaRPr sz="1900" dirty="0">
               <a:solidFill>
                 <a:srgbClr val="6AA84F"/>
               </a:solidFill>
@@ -7300,18 +7440,19 @@
 </file>
 
 <file path=ppt/slides/slide5.xml><?xml version="1.0" encoding="utf-8"?>
-<p:sld xmlns:a="http://schemas.openxmlformats.org/drawingml/2006/main" xmlns:r="http://schemas.openxmlformats.org/officeDocument/2006/relationships" xmlns:mc="http://schemas.openxmlformats.org/markup-compatibility/2006" xmlns:mv="urn:schemas-microsoft-com:mac:vml" xmlns:p="http://schemas.openxmlformats.org/presentationml/2006/main" xmlns:c="http://schemas.openxmlformats.org/drawingml/2006/chart" xmlns:dgm="http://schemas.openxmlformats.org/drawingml/2006/diagram" xmlns:o="urn:schemas-microsoft-com:office:office" xmlns:v="urn:schemas-microsoft-com:vml" xmlns:pvml="urn:schemas-microsoft-com:office:powerpoint" xmlns:com="http://schemas.openxmlformats.org/drawingml/2006/compatibility" xmlns:p14="http://schemas.microsoft.com/office/powerpoint/2010/main" xmlns:p15="http://schemas.microsoft.com/office/powerpoint/2012/main" xmlns:ahyp="http://schemas.microsoft.com/office/drawing/2018/hyperlinkcolor">
+<p:sld xmlns:a="http://schemas.openxmlformats.org/drawingml/2006/main" xmlns:r="http://schemas.openxmlformats.org/officeDocument/2006/relationships" xmlns:p="http://schemas.openxmlformats.org/presentationml/2006/main">
   <p:cSld>
     <p:bg>
       <p:bgPr>
         <a:solidFill>
           <a:srgbClr val="073763"/>
         </a:solidFill>
+        <a:effectLst/>
       </p:bgPr>
     </p:bg>
     <p:spTree>
       <p:nvGrpSpPr>
-        <p:cNvPr id="83" name="Shape 83"/>
+        <p:cNvPr id="1" name="Shape 83"/>
         <p:cNvGrpSpPr/>
         <p:nvPr/>
       </p:nvGrpSpPr>
@@ -7342,7 +7483,7 @@
             <a:noFill/>
           </a:ln>
           <a:effectLst>
-            <a:outerShdw blurRad="57150" rotWithShape="0" algn="bl" dir="5400000" dist="19050">
+            <a:outerShdw blurRad="57150" dist="19050" dir="5400000" algn="bl" rotWithShape="0">
               <a:srgbClr val="FFFFFF">
                 <a:alpha val="50000"/>
               </a:srgbClr>
@@ -7350,12 +7491,12 @@
           </a:effectLst>
         </p:spPr>
         <p:txBody>
-          <a:bodyPr anchorCtr="0" anchor="t" bIns="91425" lIns="91425" spcFirstLastPara="1" rIns="91425" wrap="square" tIns="91425">
+          <a:bodyPr spcFirstLastPara="1" wrap="square" lIns="91425" tIns="91425" rIns="91425" bIns="91425" anchor="t" anchorCtr="0">
             <a:spAutoFit/>
           </a:bodyPr>
           <a:lstStyle/>
           <a:p>
-            <a:pPr indent="0" lvl="0" marL="0" rtl="0" algn="ctr">
+            <a:pPr marL="0" lvl="0" indent="0" algn="ctr" rtl="0">
               <a:spcBef>
                 <a:spcPts val="0"/>
               </a:spcBef>
@@ -7364,9 +7505,6 @@
               </a:spcAft>
               <a:buNone/>
             </a:pPr>
-            <a:r>
-              <a:t/>
-            </a:r>
             <a:endParaRPr sz="2400">
               <a:solidFill>
                 <a:srgbClr val="0B5394"/>
@@ -7378,9 +7516,11 @@
       <p:sp>
         <p:nvSpPr>
           <p:cNvPr id="85" name="Google Shape;85;p17"/>
-          <p:cNvSpPr txBox="1"/>
+          <p:cNvSpPr txBox="1">
+            <a:spLocks noGrp="1"/>
+          </p:cNvSpPr>
           <p:nvPr>
-            <p:ph idx="1" type="subTitle"/>
+            <p:ph type="subTitle" idx="1"/>
           </p:nvPr>
         </p:nvSpPr>
         <p:spPr>
@@ -7392,7 +7532,7 @@
             <a:avLst/>
           </a:prstGeom>
           <a:effectLst>
-            <a:outerShdw blurRad="57150" rotWithShape="0" algn="bl" dir="5400000" dist="19050">
+            <a:outerShdw blurRad="57150" dist="19050" dir="5400000" algn="bl" rotWithShape="0">
               <a:srgbClr val="FFFFFF">
                 <a:alpha val="50000"/>
               </a:srgbClr>
@@ -7400,12 +7540,12 @@
           </a:effectLst>
         </p:spPr>
         <p:txBody>
-          <a:bodyPr anchorCtr="0" anchor="t" bIns="91425" lIns="91425" spcFirstLastPara="1" rIns="91425" wrap="square" tIns="91425">
+          <a:bodyPr spcFirstLastPara="1" wrap="square" lIns="91425" tIns="91425" rIns="91425" bIns="91425" anchor="t" anchorCtr="0">
             <a:noAutofit/>
           </a:bodyPr>
           <a:lstStyle/>
           <a:p>
-            <a:pPr indent="0" lvl="0" marL="0" rtl="0" algn="ctr">
+            <a:pPr marL="0" lvl="0" indent="0" algn="ctr" rtl="0">
               <a:lnSpc>
                 <a:spcPct val="80000"/>
               </a:lnSpc>
@@ -7424,15 +7564,7 @@
                   <a:srgbClr val="E69138"/>
                 </a:solidFill>
               </a:rPr>
-              <a:t>Quick Start Finance - </a:t>
-            </a:r>
-            <a:r>
-              <a:rPr lang="en" sz="3080">
-                <a:solidFill>
-                  <a:srgbClr val="E69138"/>
-                </a:solidFill>
-              </a:rPr>
-              <a:t>Notes &amp; Restrictions</a:t>
+              <a:t>Quick Start Finance - Notes &amp; Restrictions</a:t>
             </a:r>
             <a:endParaRPr sz="1979">
               <a:solidFill>
@@ -7462,12 +7594,12 @@
           </a:ln>
         </p:spPr>
         <p:txBody>
-          <a:bodyPr anchorCtr="0" anchor="t" bIns="91425" lIns="91425" spcFirstLastPara="1" rIns="91425" wrap="square" tIns="91425">
+          <a:bodyPr spcFirstLastPara="1" wrap="square" lIns="91425" tIns="91425" rIns="91425" bIns="91425" anchor="t" anchorCtr="0">
             <a:spAutoFit/>
           </a:bodyPr>
           <a:lstStyle/>
           <a:p>
-            <a:pPr indent="0" lvl="0" marL="0" rtl="0" algn="ctr">
+            <a:pPr marL="0" lvl="0" indent="0" algn="ctr" rtl="0">
               <a:lnSpc>
                 <a:spcPct val="80000"/>
               </a:lnSpc>
@@ -7504,7 +7636,7 @@
         </p:nvSpPr>
         <p:spPr>
           <a:xfrm>
-            <a:off x="2120375" y="1303200"/>
+            <a:off x="2113652" y="1231275"/>
             <a:ext cx="5376600" cy="3840300"/>
           </a:xfrm>
           <a:prstGeom prst="rect">
@@ -7516,12 +7648,12 @@
           </a:ln>
         </p:spPr>
         <p:txBody>
-          <a:bodyPr anchorCtr="0" anchor="t" bIns="91425" lIns="91425" spcFirstLastPara="1" rIns="91425" wrap="square" tIns="91425">
+          <a:bodyPr spcFirstLastPara="1" wrap="square" lIns="91425" tIns="91425" rIns="91425" bIns="91425" anchor="t" anchorCtr="0">
             <a:spAutoFit/>
           </a:bodyPr>
           <a:lstStyle/>
           <a:p>
-            <a:pPr indent="-349250" lvl="0" marL="457200" rtl="0" algn="l">
+            <a:pPr marL="457200" lvl="0" indent="-349250" algn="l" rtl="0">
               <a:lnSpc>
                 <a:spcPct val="115000"/>
               </a:lnSpc>
@@ -7538,21 +7670,21 @@
               <a:buChar char="●"/>
             </a:pPr>
             <a:r>
-              <a:rPr lang="en" sz="1900">
+              <a:rPr lang="en" sz="1900" dirty="0">
                 <a:solidFill>
                   <a:srgbClr val="6AA84F"/>
                 </a:solidFill>
               </a:rPr>
               <a:t>May be of use to older users for the simple transactions mentioned above</a:t>
             </a:r>
-            <a:endParaRPr sz="1900">
+            <a:endParaRPr sz="1900" dirty="0">
               <a:solidFill>
                 <a:srgbClr val="6AA84F"/>
               </a:solidFill>
             </a:endParaRPr>
           </a:p>
           <a:p>
-            <a:pPr indent="-349250" lvl="0" marL="457200" rtl="0" algn="l">
+            <a:pPr marL="457200" lvl="0" indent="-349250" algn="l" rtl="0">
               <a:lnSpc>
                 <a:spcPct val="115000"/>
               </a:lnSpc>
@@ -7569,21 +7701,21 @@
               <a:buChar char="●"/>
             </a:pPr>
             <a:r>
-              <a:rPr lang="en" sz="1900">
+              <a:rPr lang="en" sz="1900" dirty="0">
                 <a:solidFill>
                   <a:srgbClr val="6AA84F"/>
                 </a:solidFill>
               </a:rPr>
               <a:t>Limited application</a:t>
             </a:r>
-            <a:endParaRPr sz="1900">
+            <a:endParaRPr sz="1900" dirty="0">
               <a:solidFill>
                 <a:srgbClr val="6AA84F"/>
               </a:solidFill>
             </a:endParaRPr>
           </a:p>
           <a:p>
-            <a:pPr indent="-349250" lvl="0" marL="457200" rtl="0" algn="l">
+            <a:pPr marL="457200" lvl="0" indent="-349250" algn="l" rtl="0">
               <a:lnSpc>
                 <a:spcPct val="115000"/>
               </a:lnSpc>
@@ -7600,21 +7732,21 @@
               <a:buChar char="●"/>
             </a:pPr>
             <a:r>
-              <a:rPr lang="en" sz="1900">
+              <a:rPr lang="en" sz="1900" dirty="0">
                 <a:solidFill>
                   <a:srgbClr val="6AA84F"/>
                 </a:solidFill>
               </a:rPr>
               <a:t>Not a good fit for someone with complex needs, such as investments, retirement, taxes or mortgages</a:t>
             </a:r>
-            <a:endParaRPr sz="1900">
+            <a:endParaRPr sz="1900" dirty="0">
               <a:solidFill>
                 <a:srgbClr val="6AA84F"/>
               </a:solidFill>
             </a:endParaRPr>
           </a:p>
           <a:p>
-            <a:pPr indent="-349250" lvl="0" marL="457200" rtl="0" algn="l">
+            <a:pPr marL="457200" lvl="0" indent="-349250" algn="l" rtl="0">
               <a:lnSpc>
                 <a:spcPct val="115000"/>
               </a:lnSpc>
@@ -7631,21 +7763,21 @@
               <a:buChar char="●"/>
             </a:pPr>
             <a:r>
-              <a:rPr lang="en" sz="1900">
+              <a:rPr lang="en" sz="1900" dirty="0">
                 <a:solidFill>
                   <a:srgbClr val="6AA84F"/>
                 </a:solidFill>
               </a:rPr>
               <a:t>Not income statements or balance sheets</a:t>
             </a:r>
-            <a:endParaRPr sz="1900">
+            <a:endParaRPr sz="1900" dirty="0">
               <a:solidFill>
                 <a:srgbClr val="6AA84F"/>
               </a:solidFill>
             </a:endParaRPr>
           </a:p>
           <a:p>
-            <a:pPr indent="-349250" lvl="0" marL="457200" rtl="0" algn="l">
+            <a:pPr marL="457200" lvl="0" indent="-349250" algn="l" rtl="0">
               <a:lnSpc>
                 <a:spcPct val="115000"/>
               </a:lnSpc>
@@ -7662,21 +7794,21 @@
               <a:buChar char="●"/>
             </a:pPr>
             <a:r>
-              <a:rPr lang="en" sz="1900">
+              <a:rPr lang="en" sz="1900" dirty="0">
                 <a:solidFill>
                   <a:srgbClr val="6AA84F"/>
                 </a:solidFill>
               </a:rPr>
               <a:t>More mature users may find the interface childish or naïve.  </a:t>
             </a:r>
-            <a:endParaRPr sz="1900">
+            <a:endParaRPr sz="1900" dirty="0">
               <a:solidFill>
                 <a:srgbClr val="6AA84F"/>
               </a:solidFill>
             </a:endParaRPr>
           </a:p>
           <a:p>
-            <a:pPr indent="-349250" lvl="0" marL="457200" rtl="0" algn="l">
+            <a:pPr marL="457200" lvl="0" indent="-349250" algn="l" rtl="0">
               <a:lnSpc>
                 <a:spcPct val="115000"/>
               </a:lnSpc>
@@ -7693,14 +7825,14 @@
               <a:buChar char="●"/>
             </a:pPr>
             <a:r>
-              <a:rPr lang="en" sz="1900">
+              <a:rPr lang="en" sz="1900" dirty="0">
                 <a:solidFill>
                   <a:srgbClr val="6AA84F"/>
                 </a:solidFill>
               </a:rPr>
               <a:t>Again, we are specifically targeting the youth.</a:t>
             </a:r>
-            <a:endParaRPr sz="1900">
+            <a:endParaRPr sz="1900" dirty="0">
               <a:solidFill>
                 <a:srgbClr val="6AA84F"/>
               </a:solidFill>
@@ -7717,18 +7849,19 @@
 </file>
 
 <file path=ppt/slides/slide6.xml><?xml version="1.0" encoding="utf-8"?>
-<p:sld xmlns:a="http://schemas.openxmlformats.org/drawingml/2006/main" xmlns:r="http://schemas.openxmlformats.org/officeDocument/2006/relationships" xmlns:mc="http://schemas.openxmlformats.org/markup-compatibility/2006" xmlns:mv="urn:schemas-microsoft-com:mac:vml" xmlns:p="http://schemas.openxmlformats.org/presentationml/2006/main" xmlns:c="http://schemas.openxmlformats.org/drawingml/2006/chart" xmlns:dgm="http://schemas.openxmlformats.org/drawingml/2006/diagram" xmlns:o="urn:schemas-microsoft-com:office:office" xmlns:v="urn:schemas-microsoft-com:vml" xmlns:pvml="urn:schemas-microsoft-com:office:powerpoint" xmlns:com="http://schemas.openxmlformats.org/drawingml/2006/compatibility" xmlns:p14="http://schemas.microsoft.com/office/powerpoint/2010/main" xmlns:p15="http://schemas.microsoft.com/office/powerpoint/2012/main" xmlns:ahyp="http://schemas.microsoft.com/office/drawing/2018/hyperlinkcolor">
+<p:sld xmlns:a="http://schemas.openxmlformats.org/drawingml/2006/main" xmlns:r="http://schemas.openxmlformats.org/officeDocument/2006/relationships" xmlns:p="http://schemas.openxmlformats.org/presentationml/2006/main">
   <p:cSld>
     <p:bg>
       <p:bgPr>
         <a:solidFill>
           <a:srgbClr val="073763"/>
         </a:solidFill>
+        <a:effectLst/>
       </p:bgPr>
     </p:bg>
     <p:spTree>
       <p:nvGrpSpPr>
-        <p:cNvPr id="91" name="Shape 91"/>
+        <p:cNvPr id="1" name="Shape 91"/>
         <p:cNvGrpSpPr/>
         <p:nvPr/>
       </p:nvGrpSpPr>
@@ -7759,7 +7892,7 @@
             <a:noFill/>
           </a:ln>
           <a:effectLst>
-            <a:outerShdw blurRad="57150" rotWithShape="0" algn="bl" dir="5400000" dist="19050">
+            <a:outerShdw blurRad="57150" dist="19050" dir="5400000" algn="bl" rotWithShape="0">
               <a:srgbClr val="FFFFFF">
                 <a:alpha val="50000"/>
               </a:srgbClr>
@@ -7767,12 +7900,12 @@
           </a:effectLst>
         </p:spPr>
         <p:txBody>
-          <a:bodyPr anchorCtr="0" anchor="t" bIns="91425" lIns="91425" spcFirstLastPara="1" rIns="91425" wrap="square" tIns="91425">
+          <a:bodyPr spcFirstLastPara="1" wrap="square" lIns="91425" tIns="91425" rIns="91425" bIns="91425" anchor="t" anchorCtr="0">
             <a:spAutoFit/>
           </a:bodyPr>
           <a:lstStyle/>
           <a:p>
-            <a:pPr indent="0" lvl="0" marL="0" rtl="0" algn="ctr">
+            <a:pPr marL="0" lvl="0" indent="0" algn="ctr" rtl="0">
               <a:spcBef>
                 <a:spcPts val="0"/>
               </a:spcBef>
@@ -7781,9 +7914,6 @@
               </a:spcAft>
               <a:buNone/>
             </a:pPr>
-            <a:r>
-              <a:t/>
-            </a:r>
             <a:endParaRPr sz="2400">
               <a:solidFill>
                 <a:srgbClr val="0B5394"/>
@@ -7795,9 +7925,11 @@
       <p:sp>
         <p:nvSpPr>
           <p:cNvPr id="93" name="Google Shape;93;p18"/>
-          <p:cNvSpPr txBox="1"/>
+          <p:cNvSpPr txBox="1">
+            <a:spLocks noGrp="1"/>
+          </p:cNvSpPr>
           <p:nvPr>
-            <p:ph idx="1" type="subTitle"/>
+            <p:ph type="subTitle" idx="1"/>
           </p:nvPr>
         </p:nvSpPr>
         <p:spPr>
@@ -7809,7 +7941,7 @@
             <a:avLst/>
           </a:prstGeom>
           <a:effectLst>
-            <a:outerShdw blurRad="57150" rotWithShape="0" algn="bl" dir="5400000" dist="19050">
+            <a:outerShdw blurRad="57150" dist="19050" dir="5400000" algn="bl" rotWithShape="0">
               <a:srgbClr val="FFFFFF">
                 <a:alpha val="50000"/>
               </a:srgbClr>
@@ -7817,12 +7949,12 @@
           </a:effectLst>
         </p:spPr>
         <p:txBody>
-          <a:bodyPr anchorCtr="0" anchor="t" bIns="91425" lIns="91425" spcFirstLastPara="1" rIns="91425" wrap="square" tIns="91425">
+          <a:bodyPr spcFirstLastPara="1" wrap="square" lIns="91425" tIns="91425" rIns="91425" bIns="91425" anchor="t" anchorCtr="0">
             <a:noAutofit/>
           </a:bodyPr>
           <a:lstStyle/>
           <a:p>
-            <a:pPr indent="0" lvl="0" marL="0" rtl="0" algn="ctr">
+            <a:pPr marL="0" lvl="0" indent="0" algn="ctr" rtl="0">
               <a:lnSpc>
                 <a:spcPct val="80000"/>
               </a:lnSpc>
@@ -7871,12 +8003,12 @@
           </a:ln>
         </p:spPr>
         <p:txBody>
-          <a:bodyPr anchorCtr="0" anchor="t" bIns="91425" lIns="91425" spcFirstLastPara="1" rIns="91425" wrap="square" tIns="91425">
+          <a:bodyPr spcFirstLastPara="1" wrap="square" lIns="91425" tIns="91425" rIns="91425" bIns="91425" anchor="t" anchorCtr="0">
             <a:spAutoFit/>
           </a:bodyPr>
           <a:lstStyle/>
           <a:p>
-            <a:pPr indent="0" lvl="0" marL="0" rtl="0" algn="ctr">
+            <a:pPr marL="0" lvl="0" indent="0" algn="ctr" rtl="0">
               <a:lnSpc>
                 <a:spcPct val="80000"/>
               </a:lnSpc>
@@ -7925,12 +8057,12 @@
           </a:ln>
         </p:spPr>
         <p:txBody>
-          <a:bodyPr anchorCtr="0" anchor="t" bIns="91425" lIns="91425" spcFirstLastPara="1" rIns="91425" wrap="square" tIns="91425">
+          <a:bodyPr spcFirstLastPara="1" wrap="square" lIns="91425" tIns="91425" rIns="91425" bIns="91425" anchor="t" anchorCtr="0">
             <a:spAutoFit/>
           </a:bodyPr>
           <a:lstStyle/>
           <a:p>
-            <a:pPr indent="0" lvl="0" marL="457200" rtl="0" algn="l">
+            <a:pPr marL="457200" lvl="0" indent="0" algn="l" rtl="0">
               <a:lnSpc>
                 <a:spcPct val="115000"/>
               </a:lnSpc>
@@ -7967,7 +8099,288 @@
 </file>
 
 <file path=ppt/theme/theme1.xml><?xml version="1.0" encoding="utf-8"?>
-<a:theme xmlns:a="http://schemas.openxmlformats.org/drawingml/2006/main" xmlns:r="http://schemas.openxmlformats.org/officeDocument/2006/relationships">
+<a:theme xmlns:a="http://schemas.openxmlformats.org/drawingml/2006/main" name="Simple Light">
+  <a:themeElements>
+    <a:clrScheme name="Simple Light">
+      <a:dk1>
+        <a:srgbClr val="000000"/>
+      </a:dk1>
+      <a:lt1>
+        <a:srgbClr val="FFFFFF"/>
+      </a:lt1>
+      <a:dk2>
+        <a:srgbClr val="595959"/>
+      </a:dk2>
+      <a:lt2>
+        <a:srgbClr val="EEEEEE"/>
+      </a:lt2>
+      <a:accent1>
+        <a:srgbClr val="4285F4"/>
+      </a:accent1>
+      <a:accent2>
+        <a:srgbClr val="212121"/>
+      </a:accent2>
+      <a:accent3>
+        <a:srgbClr val="78909C"/>
+      </a:accent3>
+      <a:accent4>
+        <a:srgbClr val="FFAB40"/>
+      </a:accent4>
+      <a:accent5>
+        <a:srgbClr val="0097A7"/>
+      </a:accent5>
+      <a:accent6>
+        <a:srgbClr val="EEFF41"/>
+      </a:accent6>
+      <a:hlink>
+        <a:srgbClr val="0097A7"/>
+      </a:hlink>
+      <a:folHlink>
+        <a:srgbClr val="0097A7"/>
+      </a:folHlink>
+    </a:clrScheme>
+    <a:fontScheme name="Office">
+      <a:majorFont>
+        <a:latin typeface="Arial"/>
+        <a:ea typeface=""/>
+        <a:cs typeface=""/>
+        <a:font script="Jpan" typeface="ＭＳ Ｐゴシック"/>
+        <a:font script="Hang" typeface="맑은 고딕"/>
+        <a:font script="Hans" typeface="宋体"/>
+        <a:font script="Hant" typeface="新細明體"/>
+        <a:font script="Arab" typeface="Times New Roman"/>
+        <a:font script="Hebr" typeface="Times New Roman"/>
+        <a:font script="Thai" typeface="Angsana New"/>
+        <a:font script="Ethi" typeface="Nyala"/>
+        <a:font script="Beng" typeface="Vrinda"/>
+        <a:font script="Gujr" typeface="Shruti"/>
+        <a:font script="Khmr" typeface="MoolBoran"/>
+        <a:font script="Knda" typeface="Tunga"/>
+        <a:font script="Guru" typeface="Raavi"/>
+        <a:font script="Cans" typeface="Euphemia"/>
+        <a:font script="Cher" typeface="Plantagenet Cherokee"/>
+        <a:font script="Yiii" typeface="Microsoft Yi Baiti"/>
+        <a:font script="Tibt" typeface="Microsoft Himalaya"/>
+        <a:font script="Thaa" typeface="MV Boli"/>
+        <a:font script="Deva" typeface="Mangal"/>
+        <a:font script="Telu" typeface="Gautami"/>
+        <a:font script="Taml" typeface="Latha"/>
+        <a:font script="Syrc" typeface="Estrangelo Edessa"/>
+        <a:font script="Orya" typeface="Kalinga"/>
+        <a:font script="Mlym" typeface="Kartika"/>
+        <a:font script="Laoo" typeface="DokChampa"/>
+        <a:font script="Sinh" typeface="Iskoola Pota"/>
+        <a:font script="Mong" typeface="Mongolian Baiti"/>
+        <a:font script="Viet" typeface="Times New Roman"/>
+        <a:font script="Uigh" typeface="Microsoft Uighur"/>
+        <a:font script="Geor" typeface="Sylfaen"/>
+      </a:majorFont>
+      <a:minorFont>
+        <a:latin typeface="Arial"/>
+        <a:ea typeface=""/>
+        <a:cs typeface=""/>
+        <a:font script="Jpan" typeface="ＭＳ Ｐゴシック"/>
+        <a:font script="Hang" typeface="맑은 고딕"/>
+        <a:font script="Hans" typeface="宋体"/>
+        <a:font script="Hant" typeface="新細明體"/>
+        <a:font script="Arab" typeface="Arial"/>
+        <a:font script="Hebr" typeface="Arial"/>
+        <a:font script="Thai" typeface="Cordia New"/>
+        <a:font script="Ethi" typeface="Nyala"/>
+        <a:font script="Beng" typeface="Vrinda"/>
+        <a:font script="Gujr" typeface="Shruti"/>
+        <a:font script="Khmr" typeface="DaunPenh"/>
+        <a:font script="Knda" typeface="Tunga"/>
+        <a:font script="Guru" typeface="Raavi"/>
+        <a:font script="Cans" typeface="Euphemia"/>
+        <a:font script="Cher" typeface="Plantagenet Cherokee"/>
+        <a:font script="Yiii" typeface="Microsoft Yi Baiti"/>
+        <a:font script="Tibt" typeface="Microsoft Himalaya"/>
+        <a:font script="Thaa" typeface="MV Boli"/>
+        <a:font script="Deva" typeface="Mangal"/>
+        <a:font script="Telu" typeface="Gautami"/>
+        <a:font script="Taml" typeface="Latha"/>
+        <a:font script="Syrc" typeface="Estrangelo Edessa"/>
+        <a:font script="Orya" typeface="Kalinga"/>
+        <a:font script="Mlym" typeface="Kartika"/>
+        <a:font script="Laoo" typeface="DokChampa"/>
+        <a:font script="Sinh" typeface="Iskoola Pota"/>
+        <a:font script="Mong" typeface="Mongolian Baiti"/>
+        <a:font script="Viet" typeface="Arial"/>
+        <a:font script="Uigh" typeface="Microsoft Uighur"/>
+        <a:font script="Geor" typeface="Sylfaen"/>
+      </a:minorFont>
+    </a:fontScheme>
+    <a:fmtScheme name="Office">
+      <a:fillStyleLst>
+        <a:solidFill>
+          <a:schemeClr val="phClr"/>
+        </a:solidFill>
+        <a:gradFill rotWithShape="1">
+          <a:gsLst>
+            <a:gs pos="0">
+              <a:schemeClr val="phClr">
+                <a:tint val="50000"/>
+                <a:satMod val="300000"/>
+              </a:schemeClr>
+            </a:gs>
+            <a:gs pos="35000">
+              <a:schemeClr val="phClr">
+                <a:tint val="37000"/>
+                <a:satMod val="300000"/>
+              </a:schemeClr>
+            </a:gs>
+            <a:gs pos="100000">
+              <a:schemeClr val="phClr">
+                <a:tint val="15000"/>
+                <a:satMod val="350000"/>
+              </a:schemeClr>
+            </a:gs>
+          </a:gsLst>
+          <a:lin ang="16200000" scaled="1"/>
+        </a:gradFill>
+        <a:gradFill rotWithShape="1">
+          <a:gsLst>
+            <a:gs pos="0">
+              <a:schemeClr val="phClr">
+                <a:tint val="100000"/>
+                <a:shade val="100000"/>
+                <a:satMod val="130000"/>
+              </a:schemeClr>
+            </a:gs>
+            <a:gs pos="100000">
+              <a:schemeClr val="phClr">
+                <a:tint val="50000"/>
+                <a:shade val="100000"/>
+                <a:satMod val="350000"/>
+              </a:schemeClr>
+            </a:gs>
+          </a:gsLst>
+          <a:lin ang="16200000" scaled="0"/>
+        </a:gradFill>
+      </a:fillStyleLst>
+      <a:lnStyleLst>
+        <a:ln w="9525" cap="flat" cmpd="sng" algn="ctr">
+          <a:solidFill>
+            <a:schemeClr val="phClr">
+              <a:shade val="95000"/>
+              <a:satMod val="105000"/>
+            </a:schemeClr>
+          </a:solidFill>
+          <a:prstDash val="solid"/>
+        </a:ln>
+        <a:ln w="25400" cap="flat" cmpd="sng" algn="ctr">
+          <a:solidFill>
+            <a:schemeClr val="phClr"/>
+          </a:solidFill>
+          <a:prstDash val="solid"/>
+        </a:ln>
+        <a:ln w="38100" cap="flat" cmpd="sng" algn="ctr">
+          <a:solidFill>
+            <a:schemeClr val="phClr"/>
+          </a:solidFill>
+          <a:prstDash val="solid"/>
+        </a:ln>
+      </a:lnStyleLst>
+      <a:effectStyleLst>
+        <a:effectStyle>
+          <a:effectLst>
+            <a:outerShdw blurRad="40000" dist="20000" dir="5400000" rotWithShape="0">
+              <a:srgbClr val="000000">
+                <a:alpha val="38000"/>
+              </a:srgbClr>
+            </a:outerShdw>
+          </a:effectLst>
+        </a:effectStyle>
+        <a:effectStyle>
+          <a:effectLst>
+            <a:outerShdw blurRad="40000" dist="23000" dir="5400000" rotWithShape="0">
+              <a:srgbClr val="000000">
+                <a:alpha val="35000"/>
+              </a:srgbClr>
+            </a:outerShdw>
+          </a:effectLst>
+        </a:effectStyle>
+        <a:effectStyle>
+          <a:effectLst>
+            <a:outerShdw blurRad="40000" dist="23000" dir="5400000" rotWithShape="0">
+              <a:srgbClr val="000000">
+                <a:alpha val="35000"/>
+              </a:srgbClr>
+            </a:outerShdw>
+          </a:effectLst>
+          <a:scene3d>
+            <a:camera prst="orthographicFront">
+              <a:rot lat="0" lon="0" rev="0"/>
+            </a:camera>
+            <a:lightRig rig="threePt" dir="t">
+              <a:rot lat="0" lon="0" rev="1200000"/>
+            </a:lightRig>
+          </a:scene3d>
+          <a:sp3d>
+            <a:bevelT w="63500" h="25400"/>
+          </a:sp3d>
+        </a:effectStyle>
+      </a:effectStyleLst>
+      <a:bgFillStyleLst>
+        <a:solidFill>
+          <a:schemeClr val="phClr"/>
+        </a:solidFill>
+        <a:gradFill rotWithShape="1">
+          <a:gsLst>
+            <a:gs pos="0">
+              <a:schemeClr val="phClr">
+                <a:tint val="40000"/>
+                <a:satMod val="350000"/>
+              </a:schemeClr>
+            </a:gs>
+            <a:gs pos="40000">
+              <a:schemeClr val="phClr">
+                <a:tint val="45000"/>
+                <a:shade val="99000"/>
+                <a:satMod val="350000"/>
+              </a:schemeClr>
+            </a:gs>
+            <a:gs pos="100000">
+              <a:schemeClr val="phClr">
+                <a:shade val="20000"/>
+                <a:satMod val="255000"/>
+              </a:schemeClr>
+            </a:gs>
+          </a:gsLst>
+          <a:path path="circle">
+            <a:fillToRect l="50000" t="-80000" r="50000" b="180000"/>
+          </a:path>
+        </a:gradFill>
+        <a:gradFill rotWithShape="1">
+          <a:gsLst>
+            <a:gs pos="0">
+              <a:schemeClr val="phClr">
+                <a:tint val="80000"/>
+                <a:satMod val="300000"/>
+              </a:schemeClr>
+            </a:gs>
+            <a:gs pos="100000">
+              <a:schemeClr val="phClr">
+                <a:shade val="30000"/>
+                <a:satMod val="200000"/>
+              </a:schemeClr>
+            </a:gs>
+          </a:gsLst>
+          <a:path path="circle">
+            <a:fillToRect l="50000" t="50000" r="50000" b="50000"/>
+          </a:path>
+        </a:gradFill>
+      </a:bgFillStyleLst>
+    </a:fmtScheme>
+  </a:themeElements>
+  <a:objectDefaults/>
+  <a:extraClrSchemeLst/>
+</a:theme>
+</file>
+
+<file path=ppt/theme/theme2.xml><?xml version="1.0" encoding="utf-8"?>
+<a:theme xmlns:a="http://schemas.openxmlformats.org/drawingml/2006/main">
   <a:themeElements>
     <a:clrScheme name="Default">
       <a:dk1>
@@ -8242,284 +8655,7 @@
       </a:bgFillStyleLst>
     </a:fmtScheme>
   </a:themeElements>
-</a:theme>
-</file>
-
-<file path=ppt/theme/theme2.xml><?xml version="1.0" encoding="utf-8"?>
-<a:theme xmlns:a="http://schemas.openxmlformats.org/drawingml/2006/main" xmlns:r="http://schemas.openxmlformats.org/officeDocument/2006/relationships" name="Simple Light">
-  <a:themeElements>
-    <a:clrScheme name="Simple Light">
-      <a:dk1>
-        <a:srgbClr val="000000"/>
-      </a:dk1>
-      <a:lt1>
-        <a:srgbClr val="FFFFFF"/>
-      </a:lt1>
-      <a:dk2>
-        <a:srgbClr val="595959"/>
-      </a:dk2>
-      <a:lt2>
-        <a:srgbClr val="EEEEEE"/>
-      </a:lt2>
-      <a:accent1>
-        <a:srgbClr val="4285F4"/>
-      </a:accent1>
-      <a:accent2>
-        <a:srgbClr val="212121"/>
-      </a:accent2>
-      <a:accent3>
-        <a:srgbClr val="78909C"/>
-      </a:accent3>
-      <a:accent4>
-        <a:srgbClr val="FFAB40"/>
-      </a:accent4>
-      <a:accent5>
-        <a:srgbClr val="0097A7"/>
-      </a:accent5>
-      <a:accent6>
-        <a:srgbClr val="EEFF41"/>
-      </a:accent6>
-      <a:hlink>
-        <a:srgbClr val="0097A7"/>
-      </a:hlink>
-      <a:folHlink>
-        <a:srgbClr val="0097A7"/>
-      </a:folHlink>
-    </a:clrScheme>
-    <a:fontScheme name="Office">
-      <a:majorFont>
-        <a:latin typeface="Arial"/>
-        <a:ea typeface=""/>
-        <a:cs typeface=""/>
-        <a:font script="Jpan" typeface="ＭＳ Ｐゴシック"/>
-        <a:font script="Hang" typeface="맑은 고딕"/>
-        <a:font script="Hans" typeface="宋体"/>
-        <a:font script="Hant" typeface="新細明體"/>
-        <a:font script="Arab" typeface="Times New Roman"/>
-        <a:font script="Hebr" typeface="Times New Roman"/>
-        <a:font script="Thai" typeface="Angsana New"/>
-        <a:font script="Ethi" typeface="Nyala"/>
-        <a:font script="Beng" typeface="Vrinda"/>
-        <a:font script="Gujr" typeface="Shruti"/>
-        <a:font script="Khmr" typeface="MoolBoran"/>
-        <a:font script="Knda" typeface="Tunga"/>
-        <a:font script="Guru" typeface="Raavi"/>
-        <a:font script="Cans" typeface="Euphemia"/>
-        <a:font script="Cher" typeface="Plantagenet Cherokee"/>
-        <a:font script="Yiii" typeface="Microsoft Yi Baiti"/>
-        <a:font script="Tibt" typeface="Microsoft Himalaya"/>
-        <a:font script="Thaa" typeface="MV Boli"/>
-        <a:font script="Deva" typeface="Mangal"/>
-        <a:font script="Telu" typeface="Gautami"/>
-        <a:font script="Taml" typeface="Latha"/>
-        <a:font script="Syrc" typeface="Estrangelo Edessa"/>
-        <a:font script="Orya" typeface="Kalinga"/>
-        <a:font script="Mlym" typeface="Kartika"/>
-        <a:font script="Laoo" typeface="DokChampa"/>
-        <a:font script="Sinh" typeface="Iskoola Pota"/>
-        <a:font script="Mong" typeface="Mongolian Baiti"/>
-        <a:font script="Viet" typeface="Times New Roman"/>
-        <a:font script="Uigh" typeface="Microsoft Uighur"/>
-        <a:font script="Geor" typeface="Sylfaen"/>
-      </a:majorFont>
-      <a:minorFont>
-        <a:latin typeface="Arial"/>
-        <a:ea typeface=""/>
-        <a:cs typeface=""/>
-        <a:font script="Jpan" typeface="ＭＳ Ｐゴシック"/>
-        <a:font script="Hang" typeface="맑은 고딕"/>
-        <a:font script="Hans" typeface="宋体"/>
-        <a:font script="Hant" typeface="新細明體"/>
-        <a:font script="Arab" typeface="Arial"/>
-        <a:font script="Hebr" typeface="Arial"/>
-        <a:font script="Thai" typeface="Cordia New"/>
-        <a:font script="Ethi" typeface="Nyala"/>
-        <a:font script="Beng" typeface="Vrinda"/>
-        <a:font script="Gujr" typeface="Shruti"/>
-        <a:font script="Khmr" typeface="DaunPenh"/>
-        <a:font script="Knda" typeface="Tunga"/>
-        <a:font script="Guru" typeface="Raavi"/>
-        <a:font script="Cans" typeface="Euphemia"/>
-        <a:font script="Cher" typeface="Plantagenet Cherokee"/>
-        <a:font script="Yiii" typeface="Microsoft Yi Baiti"/>
-        <a:font script="Tibt" typeface="Microsoft Himalaya"/>
-        <a:font script="Thaa" typeface="MV Boli"/>
-        <a:font script="Deva" typeface="Mangal"/>
-        <a:font script="Telu" typeface="Gautami"/>
-        <a:font script="Taml" typeface="Latha"/>
-        <a:font script="Syrc" typeface="Estrangelo Edessa"/>
-        <a:font script="Orya" typeface="Kalinga"/>
-        <a:font script="Mlym" typeface="Kartika"/>
-        <a:font script="Laoo" typeface="DokChampa"/>
-        <a:font script="Sinh" typeface="Iskoola Pota"/>
-        <a:font script="Mong" typeface="Mongolian Baiti"/>
-        <a:font script="Viet" typeface="Arial"/>
-        <a:font script="Uigh" typeface="Microsoft Uighur"/>
-        <a:font script="Geor" typeface="Sylfaen"/>
-      </a:minorFont>
-    </a:fontScheme>
-    <a:fmtScheme name="Office">
-      <a:fillStyleLst>
-        <a:solidFill>
-          <a:schemeClr val="phClr"/>
-        </a:solidFill>
-        <a:gradFill rotWithShape="1">
-          <a:gsLst>
-            <a:gs pos="0">
-              <a:schemeClr val="phClr">
-                <a:tint val="50000"/>
-                <a:satMod val="300000"/>
-              </a:schemeClr>
-            </a:gs>
-            <a:gs pos="35000">
-              <a:schemeClr val="phClr">
-                <a:tint val="37000"/>
-                <a:satMod val="300000"/>
-              </a:schemeClr>
-            </a:gs>
-            <a:gs pos="100000">
-              <a:schemeClr val="phClr">
-                <a:tint val="15000"/>
-                <a:satMod val="350000"/>
-              </a:schemeClr>
-            </a:gs>
-          </a:gsLst>
-          <a:lin ang="16200000" scaled="1"/>
-        </a:gradFill>
-        <a:gradFill rotWithShape="1">
-          <a:gsLst>
-            <a:gs pos="0">
-              <a:schemeClr val="phClr">
-                <a:tint val="100000"/>
-                <a:shade val="100000"/>
-                <a:satMod val="130000"/>
-              </a:schemeClr>
-            </a:gs>
-            <a:gs pos="100000">
-              <a:schemeClr val="phClr">
-                <a:tint val="50000"/>
-                <a:shade val="100000"/>
-                <a:satMod val="350000"/>
-              </a:schemeClr>
-            </a:gs>
-          </a:gsLst>
-          <a:lin ang="16200000" scaled="0"/>
-        </a:gradFill>
-      </a:fillStyleLst>
-      <a:lnStyleLst>
-        <a:ln w="9525" cap="flat" cmpd="sng" algn="ctr">
-          <a:solidFill>
-            <a:schemeClr val="phClr">
-              <a:shade val="95000"/>
-              <a:satMod val="105000"/>
-            </a:schemeClr>
-          </a:solidFill>
-          <a:prstDash val="solid"/>
-        </a:ln>
-        <a:ln w="25400" cap="flat" cmpd="sng" algn="ctr">
-          <a:solidFill>
-            <a:schemeClr val="phClr"/>
-          </a:solidFill>
-          <a:prstDash val="solid"/>
-        </a:ln>
-        <a:ln w="38100" cap="flat" cmpd="sng" algn="ctr">
-          <a:solidFill>
-            <a:schemeClr val="phClr"/>
-          </a:solidFill>
-          <a:prstDash val="solid"/>
-        </a:ln>
-      </a:lnStyleLst>
-      <a:effectStyleLst>
-        <a:effectStyle>
-          <a:effectLst>
-            <a:outerShdw blurRad="40000" dist="20000" dir="5400000" rotWithShape="0">
-              <a:srgbClr val="000000">
-                <a:alpha val="38000"/>
-              </a:srgbClr>
-            </a:outerShdw>
-          </a:effectLst>
-        </a:effectStyle>
-        <a:effectStyle>
-          <a:effectLst>
-            <a:outerShdw blurRad="40000" dist="23000" dir="5400000" rotWithShape="0">
-              <a:srgbClr val="000000">
-                <a:alpha val="35000"/>
-              </a:srgbClr>
-            </a:outerShdw>
-          </a:effectLst>
-        </a:effectStyle>
-        <a:effectStyle>
-          <a:effectLst>
-            <a:outerShdw blurRad="40000" dist="23000" dir="5400000" rotWithShape="0">
-              <a:srgbClr val="000000">
-                <a:alpha val="35000"/>
-              </a:srgbClr>
-            </a:outerShdw>
-          </a:effectLst>
-          <a:scene3d>
-            <a:camera prst="orthographicFront">
-              <a:rot lat="0" lon="0" rev="0"/>
-            </a:camera>
-            <a:lightRig rig="threePt" dir="t">
-              <a:rot lat="0" lon="0" rev="1200000"/>
-            </a:lightRig>
-          </a:scene3d>
-          <a:sp3d>
-            <a:bevelT w="63500" h="25400"/>
-          </a:sp3d>
-        </a:effectStyle>
-      </a:effectStyleLst>
-      <a:bgFillStyleLst>
-        <a:solidFill>
-          <a:schemeClr val="phClr"/>
-        </a:solidFill>
-        <a:gradFill rotWithShape="1">
-          <a:gsLst>
-            <a:gs pos="0">
-              <a:schemeClr val="phClr">
-                <a:tint val="40000"/>
-                <a:satMod val="350000"/>
-              </a:schemeClr>
-            </a:gs>
-            <a:gs pos="40000">
-              <a:schemeClr val="phClr">
-                <a:tint val="45000"/>
-                <a:shade val="99000"/>
-                <a:satMod val="350000"/>
-              </a:schemeClr>
-            </a:gs>
-            <a:gs pos="100000">
-              <a:schemeClr val="phClr">
-                <a:shade val="20000"/>
-                <a:satMod val="255000"/>
-              </a:schemeClr>
-            </a:gs>
-          </a:gsLst>
-          <a:path path="circle">
-            <a:fillToRect l="50000" t="-80000" r="50000" b="180000"/>
-          </a:path>
-        </a:gradFill>
-        <a:gradFill rotWithShape="1">
-          <a:gsLst>
-            <a:gs pos="0">
-              <a:schemeClr val="phClr">
-                <a:tint val="80000"/>
-                <a:satMod val="300000"/>
-              </a:schemeClr>
-            </a:gs>
-            <a:gs pos="100000">
-              <a:schemeClr val="phClr">
-                <a:shade val="30000"/>
-                <a:satMod val="200000"/>
-              </a:schemeClr>
-            </a:gs>
-          </a:gsLst>
-          <a:path path="circle">
-            <a:fillToRect l="50000" t="50000" r="50000" b="50000"/>
-          </a:path>
-        </a:gradFill>
-      </a:bgFillStyleLst>
-    </a:fmtScheme>
-  </a:themeElements>
+  <a:objectDefaults/>
+  <a:extraClrSchemeLst/>
 </a:theme>
 </file>
</xml_diff>